<commit_message>
modified episode title in agenda with inclusive language
</commit_message>
<xml_diff>
--- a/instructors/01_Why_are_we_here.pptx
+++ b/instructors/01_Why_are_we_here.pptx
@@ -219,7 +219,7 @@
           <a:p>
             <a:fld id="{B1D4AFAA-5545-4348-866E-082827204B28}" type="datetimeFigureOut">
               <a:rPr lang="en-GB" smtClean="0"/>
-              <a:t>18/07/2022</a:t>
+              <a:t>20/07/2022</a:t>
             </a:fld>
             <a:endParaRPr lang="en-GB"/>
           </a:p>
@@ -699,7 +699,7 @@
           <a:p>
             <a:fld id="{CC29EC85-173F-467E-B364-65AD14726A23}" type="datetimeFigureOut">
               <a:rPr lang="en-GB" smtClean="0"/>
-              <a:t>18/07/2022</a:t>
+              <a:t>20/07/2022</a:t>
             </a:fld>
             <a:endParaRPr lang="en-GB"/>
           </a:p>
@@ -916,7 +916,7 @@
           <a:p>
             <a:fld id="{CC29EC85-173F-467E-B364-65AD14726A23}" type="datetimeFigureOut">
               <a:rPr lang="en-GB" smtClean="0"/>
-              <a:t>18/07/2022</a:t>
+              <a:t>20/07/2022</a:t>
             </a:fld>
             <a:endParaRPr lang="en-GB"/>
           </a:p>
@@ -1096,7 +1096,7 @@
           <a:p>
             <a:fld id="{CC29EC85-173F-467E-B364-65AD14726A23}" type="datetimeFigureOut">
               <a:rPr lang="en-GB" smtClean="0"/>
-              <a:t>18/07/2022</a:t>
+              <a:t>20/07/2022</a:t>
             </a:fld>
             <a:endParaRPr lang="en-GB"/>
           </a:p>
@@ -1459,7 +1459,7 @@
           <a:p>
             <a:fld id="{CC29EC85-173F-467E-B364-65AD14726A23}" type="datetimeFigureOut">
               <a:rPr lang="en-GB" smtClean="0"/>
-              <a:t>18/07/2022</a:t>
+              <a:t>20/07/2022</a:t>
             </a:fld>
             <a:endParaRPr lang="en-GB"/>
           </a:p>
@@ -1705,7 +1705,7 @@
           <a:p>
             <a:fld id="{CC29EC85-173F-467E-B364-65AD14726A23}" type="datetimeFigureOut">
               <a:rPr lang="en-GB" smtClean="0"/>
-              <a:t>18/07/2022</a:t>
+              <a:t>20/07/2022</a:t>
             </a:fld>
             <a:endParaRPr lang="en-GB"/>
           </a:p>
@@ -1937,7 +1937,7 @@
           <a:p>
             <a:fld id="{CC29EC85-173F-467E-B364-65AD14726A23}" type="datetimeFigureOut">
               <a:rPr lang="en-GB" smtClean="0"/>
-              <a:t>18/07/2022</a:t>
+              <a:t>20/07/2022</a:t>
             </a:fld>
             <a:endParaRPr lang="en-GB"/>
           </a:p>
@@ -2304,7 +2304,7 @@
           <a:p>
             <a:fld id="{CC29EC85-173F-467E-B364-65AD14726A23}" type="datetimeFigureOut">
               <a:rPr lang="en-GB" smtClean="0"/>
-              <a:t>18/07/2022</a:t>
+              <a:t>20/07/2022</a:t>
             </a:fld>
             <a:endParaRPr lang="en-GB"/>
           </a:p>
@@ -2422,7 +2422,7 @@
           <a:p>
             <a:fld id="{CC29EC85-173F-467E-B364-65AD14726A23}" type="datetimeFigureOut">
               <a:rPr lang="en-GB" smtClean="0"/>
-              <a:t>18/07/2022</a:t>
+              <a:t>20/07/2022</a:t>
             </a:fld>
             <a:endParaRPr lang="en-GB"/>
           </a:p>
@@ -2517,7 +2517,7 @@
           <a:p>
             <a:fld id="{CC29EC85-173F-467E-B364-65AD14726A23}" type="datetimeFigureOut">
               <a:rPr lang="en-GB" smtClean="0"/>
-              <a:t>18/07/2022</a:t>
+              <a:t>20/07/2022</a:t>
             </a:fld>
             <a:endParaRPr lang="en-GB"/>
           </a:p>
@@ -2794,7 +2794,7 @@
           <a:p>
             <a:fld id="{CC29EC85-173F-467E-B364-65AD14726A23}" type="datetimeFigureOut">
               <a:rPr lang="en-GB" smtClean="0"/>
-              <a:t>18/07/2022</a:t>
+              <a:t>20/07/2022</a:t>
             </a:fld>
             <a:endParaRPr lang="en-GB"/>
           </a:p>
@@ -3047,7 +3047,7 @@
           <a:p>
             <a:fld id="{CC29EC85-173F-467E-B364-65AD14726A23}" type="datetimeFigureOut">
               <a:rPr lang="en-GB" smtClean="0"/>
-              <a:t>18/07/2022</a:t>
+              <a:t>20/07/2022</a:t>
             </a:fld>
             <a:endParaRPr lang="en-GB"/>
           </a:p>
@@ -3259,7 +3259,7 @@
             <a:fld id="{CC29EC85-173F-467E-B364-65AD14726A23}" type="datetimeFigureOut">
               <a:rPr lang="en-GB" smtClean="0"/>
               <a:pPr/>
-              <a:t>18/07/2022</a:t>
+              <a:t>20/07/2022</a:t>
             </a:fld>
             <a:endParaRPr lang="en-GB"/>
           </a:p>
@@ -3725,12 +3725,8 @@
           <a:lstStyle/>
           <a:p>
             <a:r>
-              <a:rPr lang="pl-PL" dirty="0"/>
-              <a:t>FAIR </a:t>
-            </a:r>
-            <a:r>
-              <a:rPr lang="pl-PL" dirty="0" smtClean="0"/>
-              <a:t>for leaders</a:t>
+              <a:rPr lang="pl-PL" smtClean="0"/>
+              <a:t>FAIR for leaders</a:t>
             </a:r>
             <a:endParaRPr lang="en-GB" dirty="0"/>
           </a:p>
@@ -3864,7 +3860,7 @@
           <a:effectLst/>
           <a:extLst>
             <a:ext uri="{AF507438-7753-43e0-B8FC-AC1667EBCBE1}">
-              <a14:hiddenEffects xmlns="" xmlns:a14="http://schemas.microsoft.com/office/drawing/2010/main">
+              <a14:hiddenEffects xmlns:a14="http://schemas.microsoft.com/office/drawing/2010/main" xmlns="">
                 <a:effectLst>
                   <a:outerShdw dist="35921" dir="2700000" algn="ctr" rotWithShape="0">
                     <a:schemeClr val="bg2"/>
@@ -4195,7 +4191,7 @@
             <a:effectLst/>
             <a:extLst>
               <a:ext uri="{AF507438-7753-43e0-B8FC-AC1667EBCBE1}">
-                <a14:hiddenEffects xmlns="" xmlns:a14="http://schemas.microsoft.com/office/drawing/2010/main">
+                <a14:hiddenEffects xmlns:a14="http://schemas.microsoft.com/office/drawing/2010/main" xmlns="">
                   <a:effectLst>
                     <a:outerShdw dist="35921" dir="2700000" algn="ctr" rotWithShape="0">
                       <a:schemeClr val="bg2"/>
@@ -4257,7 +4253,7 @@
             <a:effectLst/>
             <a:extLst>
               <a:ext uri="{AF507438-7753-43e0-B8FC-AC1667EBCBE1}">
-                <a14:hiddenEffects xmlns="" xmlns:a14="http://schemas.microsoft.com/office/drawing/2010/main">
+                <a14:hiddenEffects xmlns:a14="http://schemas.microsoft.com/office/drawing/2010/main" xmlns="">
                   <a:effectLst>
                     <a:outerShdw dist="35921" dir="2700000" algn="ctr" rotWithShape="0">
                       <a:schemeClr val="bg2"/>
@@ -4334,7 +4330,7 @@
             <a:effectLst/>
             <a:extLst>
               <a:ext uri="{AF507438-7753-43e0-B8FC-AC1667EBCBE1}">
-                <a14:hiddenEffects xmlns="" xmlns:a14="http://schemas.microsoft.com/office/drawing/2010/main">
+                <a14:hiddenEffects xmlns:a14="http://schemas.microsoft.com/office/drawing/2010/main" xmlns="">
                   <a:effectLst>
                     <a:outerShdw dist="35921" dir="2700000" algn="ctr" rotWithShape="0">
                       <a:schemeClr val="bg2"/>
@@ -4396,7 +4392,7 @@
             <a:effectLst/>
             <a:extLst>
               <a:ext uri="{AF507438-7753-43e0-B8FC-AC1667EBCBE1}">
-                <a14:hiddenEffects xmlns="" xmlns:a14="http://schemas.microsoft.com/office/drawing/2010/main">
+                <a14:hiddenEffects xmlns:a14="http://schemas.microsoft.com/office/drawing/2010/main" xmlns="">
                   <a:effectLst>
                     <a:outerShdw dist="35921" dir="2700000" algn="ctr" rotWithShape="0">
                       <a:schemeClr val="bg2"/>
@@ -5629,7 +5625,7 @@
           <a:effectLst/>
           <a:extLst>
             <a:ext uri="{AF507438-7753-43e0-B8FC-AC1667EBCBE1}">
-              <a14:hiddenEffects xmlns="" xmlns:a14="http://schemas.microsoft.com/office/drawing/2010/main">
+              <a14:hiddenEffects xmlns:a14="http://schemas.microsoft.com/office/drawing/2010/main" xmlns="">
                 <a:effectLst>
                   <a:outerShdw dist="35921" dir="2700000" algn="ctr" rotWithShape="0">
                     <a:schemeClr val="bg2"/>
@@ -8336,7 +8332,15 @@
           <a:p>
             <a:r>
               <a:rPr lang="en-GB" sz="4000" dirty="0" smtClean="0"/>
-              <a:t>Tools for overlords</a:t>
+              <a:t>Tools </a:t>
+            </a:r>
+            <a:r>
+              <a:rPr lang="en-GB" sz="4000" smtClean="0"/>
+              <a:t>for </a:t>
+            </a:r>
+            <a:r>
+              <a:rPr lang="en-GB" sz="4000" smtClean="0"/>
+              <a:t>oracles and overlords</a:t>
             </a:r>
             <a:endParaRPr lang="pl-PL" sz="4000" dirty="0"/>
           </a:p>
@@ -9300,7 +9304,7 @@
                 <a14:useLocalDpi xmlns:a14="http://schemas.microsoft.com/office/drawing/2010/main" val="0"/>
               </a:ext>
               <a:ext uri="{96DAC541-7B7A-43D3-8B79-37D633B846F1}">
-                <asvg:svgBlip xmlns="" xmlns:asvg="http://schemas.microsoft.com/office/drawing/2016/SVG/main" r:embed="rId3"/>
+                <asvg:svgBlip xmlns:asvg="http://schemas.microsoft.com/office/drawing/2016/SVG/main" xmlns="" r:embed="rId3"/>
               </a:ext>
             </a:extLst>
           </a:blip>
@@ -9339,7 +9343,7 @@
                 <a14:useLocalDpi xmlns:a14="http://schemas.microsoft.com/office/drawing/2010/main" val="0"/>
               </a:ext>
               <a:ext uri="{96DAC541-7B7A-43D3-8B79-37D633B846F1}">
-                <asvg:svgBlip xmlns="" xmlns:asvg="http://schemas.microsoft.com/office/drawing/2016/SVG/main" r:embed="rId5"/>
+                <asvg:svgBlip xmlns:asvg="http://schemas.microsoft.com/office/drawing/2016/SVG/main" xmlns="" r:embed="rId5"/>
               </a:ext>
             </a:extLst>
           </a:blip>
@@ -9378,7 +9382,7 @@
                 <a14:useLocalDpi xmlns:a14="http://schemas.microsoft.com/office/drawing/2010/main" val="0"/>
               </a:ext>
               <a:ext uri="{96DAC541-7B7A-43D3-8B79-37D633B846F1}">
-                <asvg:svgBlip xmlns="" xmlns:asvg="http://schemas.microsoft.com/office/drawing/2016/SVG/main" r:embed="rId7"/>
+                <asvg:svgBlip xmlns:asvg="http://schemas.microsoft.com/office/drawing/2016/SVG/main" xmlns="" r:embed="rId7"/>
               </a:ext>
             </a:extLst>
           </a:blip>
@@ -9417,7 +9421,7 @@
                 <a14:useLocalDpi xmlns:a14="http://schemas.microsoft.com/office/drawing/2010/main" val="0"/>
               </a:ext>
               <a:ext uri="{96DAC541-7B7A-43D3-8B79-37D633B846F1}">
-                <asvg:svgBlip xmlns="" xmlns:asvg="http://schemas.microsoft.com/office/drawing/2016/SVG/main" r:embed="rId9"/>
+                <asvg:svgBlip xmlns:asvg="http://schemas.microsoft.com/office/drawing/2016/SVG/main" xmlns="" r:embed="rId9"/>
               </a:ext>
             </a:extLst>
           </a:blip>
@@ -9456,7 +9460,7 @@
                 <a14:useLocalDpi xmlns:a14="http://schemas.microsoft.com/office/drawing/2010/main" val="0"/>
               </a:ext>
               <a:ext uri="{96DAC541-7B7A-43D3-8B79-37D633B846F1}">
-                <asvg:svgBlip xmlns="" xmlns:asvg="http://schemas.microsoft.com/office/drawing/2016/SVG/main" r:embed="rId11"/>
+                <asvg:svgBlip xmlns:asvg="http://schemas.microsoft.com/office/drawing/2016/SVG/main" xmlns="" r:embed="rId11"/>
               </a:ext>
             </a:extLst>
           </a:blip>
@@ -9495,7 +9499,7 @@
                 <a14:useLocalDpi xmlns:a14="http://schemas.microsoft.com/office/drawing/2010/main" val="0"/>
               </a:ext>
               <a:ext uri="{96DAC541-7B7A-43D3-8B79-37D633B846F1}">
-                <asvg:svgBlip xmlns="" xmlns:asvg="http://schemas.microsoft.com/office/drawing/2016/SVG/main" r:embed="rId13"/>
+                <asvg:svgBlip xmlns:asvg="http://schemas.microsoft.com/office/drawing/2016/SVG/main" xmlns="" r:embed="rId13"/>
               </a:ext>
             </a:extLst>
           </a:blip>
@@ -9859,7 +9863,7 @@
                 <a14:useLocalDpi xmlns:a14="http://schemas.microsoft.com/office/drawing/2010/main" val="0"/>
               </a:ext>
               <a:ext uri="{96DAC541-7B7A-43D3-8B79-37D633B846F1}">
-                <asvg:svgBlip xmlns="" xmlns:asvg="http://schemas.microsoft.com/office/drawing/2016/SVG/main" r:embed="rId3"/>
+                <asvg:svgBlip xmlns:asvg="http://schemas.microsoft.com/office/drawing/2016/SVG/main" xmlns="" r:embed="rId3"/>
               </a:ext>
             </a:extLst>
           </a:blip>
@@ -10074,7 +10078,7 @@
                 <a14:useLocalDpi xmlns:a14="http://schemas.microsoft.com/office/drawing/2010/main" val="0"/>
               </a:ext>
               <a:ext uri="{96DAC541-7B7A-43D3-8B79-37D633B846F1}">
-                <asvg:svgBlip xmlns="" xmlns:asvg="http://schemas.microsoft.com/office/drawing/2016/SVG/main" r:embed="rId3"/>
+                <asvg:svgBlip xmlns:asvg="http://schemas.microsoft.com/office/drawing/2016/SVG/main" xmlns="" r:embed="rId3"/>
               </a:ext>
             </a:extLst>
           </a:blip>
@@ -11385,7 +11389,7 @@
             <a:effectLst/>
             <a:extLst>
               <a:ext uri="{AF507438-7753-43e0-B8FC-AC1667EBCBE1}">
-                <a14:hiddenEffects xmlns="" xmlns:a14="http://schemas.microsoft.com/office/drawing/2010/main">
+                <a14:hiddenEffects xmlns:a14="http://schemas.microsoft.com/office/drawing/2010/main" xmlns="">
                   <a:effectLst>
                     <a:outerShdw dist="35921" dir="2700000" algn="ctr" rotWithShape="0">
                       <a:schemeClr val="bg2"/>
@@ -11447,7 +11451,7 @@
             <a:effectLst/>
             <a:extLst>
               <a:ext uri="{AF507438-7753-43e0-B8FC-AC1667EBCBE1}">
-                <a14:hiddenEffects xmlns="" xmlns:a14="http://schemas.microsoft.com/office/drawing/2010/main">
+                <a14:hiddenEffects xmlns:a14="http://schemas.microsoft.com/office/drawing/2010/main" xmlns="">
                   <a:effectLst>
                     <a:outerShdw dist="35921" dir="2700000" algn="ctr" rotWithShape="0">
                       <a:schemeClr val="bg2"/>
@@ -11509,7 +11513,7 @@
             <a:effectLst/>
             <a:extLst>
               <a:ext uri="{AF507438-7753-43e0-B8FC-AC1667EBCBE1}">
-                <a14:hiddenEffects xmlns="" xmlns:a14="http://schemas.microsoft.com/office/drawing/2010/main">
+                <a14:hiddenEffects xmlns:a14="http://schemas.microsoft.com/office/drawing/2010/main" xmlns="">
                   <a:effectLst>
                     <a:outerShdw dist="35921" dir="2700000" algn="ctr" rotWithShape="0">
                       <a:schemeClr val="bg2"/>

</xml_diff>

<commit_message>
modified library silhouettes image
</commit_message>
<xml_diff>
--- a/instructors/01_Why_are_we_here.pptx
+++ b/instructors/01_Why_are_we_here.pptx
@@ -3860,7 +3860,7 @@
           <a:effectLst/>
           <a:extLst>
             <a:ext uri="{AF507438-7753-43e0-B8FC-AC1667EBCBE1}">
-              <a14:hiddenEffects xmlns:a14="http://schemas.microsoft.com/office/drawing/2010/main" xmlns="">
+              <a14:hiddenEffects xmlns="" xmlns:a14="http://schemas.microsoft.com/office/drawing/2010/main">
                 <a:effectLst>
                   <a:outerShdw dist="35921" dir="2700000" algn="ctr" rotWithShape="0">
                     <a:schemeClr val="bg2"/>
@@ -4191,7 +4191,7 @@
             <a:effectLst/>
             <a:extLst>
               <a:ext uri="{AF507438-7753-43e0-B8FC-AC1667EBCBE1}">
-                <a14:hiddenEffects xmlns:a14="http://schemas.microsoft.com/office/drawing/2010/main" xmlns="">
+                <a14:hiddenEffects xmlns="" xmlns:a14="http://schemas.microsoft.com/office/drawing/2010/main">
                   <a:effectLst>
                     <a:outerShdw dist="35921" dir="2700000" algn="ctr" rotWithShape="0">
                       <a:schemeClr val="bg2"/>
@@ -4253,7 +4253,7 @@
             <a:effectLst/>
             <a:extLst>
               <a:ext uri="{AF507438-7753-43e0-B8FC-AC1667EBCBE1}">
-                <a14:hiddenEffects xmlns:a14="http://schemas.microsoft.com/office/drawing/2010/main" xmlns="">
+                <a14:hiddenEffects xmlns="" xmlns:a14="http://schemas.microsoft.com/office/drawing/2010/main">
                   <a:effectLst>
                     <a:outerShdw dist="35921" dir="2700000" algn="ctr" rotWithShape="0">
                       <a:schemeClr val="bg2"/>
@@ -4330,7 +4330,7 @@
             <a:effectLst/>
             <a:extLst>
               <a:ext uri="{AF507438-7753-43e0-B8FC-AC1667EBCBE1}">
-                <a14:hiddenEffects xmlns:a14="http://schemas.microsoft.com/office/drawing/2010/main" xmlns="">
+                <a14:hiddenEffects xmlns="" xmlns:a14="http://schemas.microsoft.com/office/drawing/2010/main">
                   <a:effectLst>
                     <a:outerShdw dist="35921" dir="2700000" algn="ctr" rotWithShape="0">
                       <a:schemeClr val="bg2"/>
@@ -4392,7 +4392,7 @@
             <a:effectLst/>
             <a:extLst>
               <a:ext uri="{AF507438-7753-43e0-B8FC-AC1667EBCBE1}">
-                <a14:hiddenEffects xmlns:a14="http://schemas.microsoft.com/office/drawing/2010/main" xmlns="">
+                <a14:hiddenEffects xmlns="" xmlns:a14="http://schemas.microsoft.com/office/drawing/2010/main">
                   <a:effectLst>
                     <a:outerShdw dist="35921" dir="2700000" algn="ctr" rotWithShape="0">
                       <a:schemeClr val="bg2"/>
@@ -5625,7 +5625,7 @@
           <a:effectLst/>
           <a:extLst>
             <a:ext uri="{AF507438-7753-43e0-B8FC-AC1667EBCBE1}">
-              <a14:hiddenEffects xmlns:a14="http://schemas.microsoft.com/office/drawing/2010/main" xmlns="">
+              <a14:hiddenEffects xmlns="" xmlns:a14="http://schemas.microsoft.com/office/drawing/2010/main">
                 <a:effectLst>
                   <a:outerShdw dist="35921" dir="2700000" algn="ctr" rotWithShape="0">
                     <a:schemeClr val="bg2"/>
@@ -8336,11 +8336,7 @@
             </a:r>
             <a:r>
               <a:rPr lang="en-GB" sz="4000" smtClean="0"/>
-              <a:t>for </a:t>
-            </a:r>
-            <a:r>
-              <a:rPr lang="en-GB" sz="4000" smtClean="0"/>
-              <a:t>oracles and overlords</a:t>
+              <a:t>for oracles and overlords</a:t>
             </a:r>
             <a:endParaRPr lang="pl-PL" sz="4000" dirty="0"/>
           </a:p>
@@ -8845,27 +8841,28 @@
       </p:grpSpPr>
       <p:pic>
         <p:nvPicPr>
-          <p:cNvPr id="4" name="Picture 3">
-            <a:extLst>
-              <a:ext uri="{FF2B5EF4-FFF2-40B4-BE49-F238E27FC236}">
-                <a16:creationId xmlns:a16="http://schemas.microsoft.com/office/drawing/2014/main" id="{43824753-16F4-EA4C-A410-95B7DF1D0C80}"/>
-              </a:ext>
-            </a:extLst>
-          </p:cNvPr>
+          <p:cNvPr id="3" name="Picture 2"/>
           <p:cNvPicPr>
             <a:picLocks noChangeAspect="1"/>
           </p:cNvPicPr>
           <p:nvPr/>
         </p:nvPicPr>
         <p:blipFill>
-          <a:blip r:embed="rId2"/>
-          <a:srcRect/>
-          <a:stretch/>
+          <a:blip r:embed="rId2">
+            <a:extLst>
+              <a:ext uri="{28A0092B-C50C-407E-A947-70E740481C1C}">
+                <a14:useLocalDpi xmlns:a14="http://schemas.microsoft.com/office/drawing/2010/main" val="0"/>
+              </a:ext>
+            </a:extLst>
+          </a:blip>
+          <a:stretch>
+            <a:fillRect/>
+          </a:stretch>
         </p:blipFill>
         <p:spPr>
           <a:xfrm>
-            <a:off x="0" y="0"/>
-            <a:ext cx="12192000" cy="6858000"/>
+            <a:off x="71689" y="424873"/>
+            <a:ext cx="12112302" cy="6433127"/>
           </a:xfrm>
           <a:prstGeom prst="rect">
             <a:avLst/>
@@ -9304,7 +9301,7 @@
                 <a14:useLocalDpi xmlns:a14="http://schemas.microsoft.com/office/drawing/2010/main" val="0"/>
               </a:ext>
               <a:ext uri="{96DAC541-7B7A-43D3-8B79-37D633B846F1}">
-                <asvg:svgBlip xmlns:asvg="http://schemas.microsoft.com/office/drawing/2016/SVG/main" xmlns="" r:embed="rId3"/>
+                <asvg:svgBlip xmlns="" xmlns:asvg="http://schemas.microsoft.com/office/drawing/2016/SVG/main" r:embed="rId3"/>
               </a:ext>
             </a:extLst>
           </a:blip>
@@ -9343,7 +9340,7 @@
                 <a14:useLocalDpi xmlns:a14="http://schemas.microsoft.com/office/drawing/2010/main" val="0"/>
               </a:ext>
               <a:ext uri="{96DAC541-7B7A-43D3-8B79-37D633B846F1}">
-                <asvg:svgBlip xmlns:asvg="http://schemas.microsoft.com/office/drawing/2016/SVG/main" xmlns="" r:embed="rId5"/>
+                <asvg:svgBlip xmlns="" xmlns:asvg="http://schemas.microsoft.com/office/drawing/2016/SVG/main" r:embed="rId5"/>
               </a:ext>
             </a:extLst>
           </a:blip>
@@ -9382,7 +9379,7 @@
                 <a14:useLocalDpi xmlns:a14="http://schemas.microsoft.com/office/drawing/2010/main" val="0"/>
               </a:ext>
               <a:ext uri="{96DAC541-7B7A-43D3-8B79-37D633B846F1}">
-                <asvg:svgBlip xmlns:asvg="http://schemas.microsoft.com/office/drawing/2016/SVG/main" xmlns="" r:embed="rId7"/>
+                <asvg:svgBlip xmlns="" xmlns:asvg="http://schemas.microsoft.com/office/drawing/2016/SVG/main" r:embed="rId7"/>
               </a:ext>
             </a:extLst>
           </a:blip>
@@ -9421,7 +9418,7 @@
                 <a14:useLocalDpi xmlns:a14="http://schemas.microsoft.com/office/drawing/2010/main" val="0"/>
               </a:ext>
               <a:ext uri="{96DAC541-7B7A-43D3-8B79-37D633B846F1}">
-                <asvg:svgBlip xmlns:asvg="http://schemas.microsoft.com/office/drawing/2016/SVG/main" xmlns="" r:embed="rId9"/>
+                <asvg:svgBlip xmlns="" xmlns:asvg="http://schemas.microsoft.com/office/drawing/2016/SVG/main" r:embed="rId9"/>
               </a:ext>
             </a:extLst>
           </a:blip>
@@ -9460,7 +9457,7 @@
                 <a14:useLocalDpi xmlns:a14="http://schemas.microsoft.com/office/drawing/2010/main" val="0"/>
               </a:ext>
               <a:ext uri="{96DAC541-7B7A-43D3-8B79-37D633B846F1}">
-                <asvg:svgBlip xmlns:asvg="http://schemas.microsoft.com/office/drawing/2016/SVG/main" xmlns="" r:embed="rId11"/>
+                <asvg:svgBlip xmlns="" xmlns:asvg="http://schemas.microsoft.com/office/drawing/2016/SVG/main" r:embed="rId11"/>
               </a:ext>
             </a:extLst>
           </a:blip>
@@ -9499,7 +9496,7 @@
                 <a14:useLocalDpi xmlns:a14="http://schemas.microsoft.com/office/drawing/2010/main" val="0"/>
               </a:ext>
               <a:ext uri="{96DAC541-7B7A-43D3-8B79-37D633B846F1}">
-                <asvg:svgBlip xmlns:asvg="http://schemas.microsoft.com/office/drawing/2016/SVG/main" xmlns="" r:embed="rId13"/>
+                <asvg:svgBlip xmlns="" xmlns:asvg="http://schemas.microsoft.com/office/drawing/2016/SVG/main" r:embed="rId13"/>
               </a:ext>
             </a:extLst>
           </a:blip>
@@ -9863,7 +9860,7 @@
                 <a14:useLocalDpi xmlns:a14="http://schemas.microsoft.com/office/drawing/2010/main" val="0"/>
               </a:ext>
               <a:ext uri="{96DAC541-7B7A-43D3-8B79-37D633B846F1}">
-                <asvg:svgBlip xmlns:asvg="http://schemas.microsoft.com/office/drawing/2016/SVG/main" xmlns="" r:embed="rId3"/>
+                <asvg:svgBlip xmlns="" xmlns:asvg="http://schemas.microsoft.com/office/drawing/2016/SVG/main" r:embed="rId3"/>
               </a:ext>
             </a:extLst>
           </a:blip>
@@ -10078,7 +10075,7 @@
                 <a14:useLocalDpi xmlns:a14="http://schemas.microsoft.com/office/drawing/2010/main" val="0"/>
               </a:ext>
               <a:ext uri="{96DAC541-7B7A-43D3-8B79-37D633B846F1}">
-                <asvg:svgBlip xmlns:asvg="http://schemas.microsoft.com/office/drawing/2016/SVG/main" xmlns="" r:embed="rId3"/>
+                <asvg:svgBlip xmlns="" xmlns:asvg="http://schemas.microsoft.com/office/drawing/2016/SVG/main" r:embed="rId3"/>
               </a:ext>
             </a:extLst>
           </a:blip>
@@ -11389,7 +11386,7 @@
             <a:effectLst/>
             <a:extLst>
               <a:ext uri="{AF507438-7753-43e0-B8FC-AC1667EBCBE1}">
-                <a14:hiddenEffects xmlns:a14="http://schemas.microsoft.com/office/drawing/2010/main" xmlns="">
+                <a14:hiddenEffects xmlns="" xmlns:a14="http://schemas.microsoft.com/office/drawing/2010/main">
                   <a:effectLst>
                     <a:outerShdw dist="35921" dir="2700000" algn="ctr" rotWithShape="0">
                       <a:schemeClr val="bg2"/>
@@ -11451,7 +11448,7 @@
             <a:effectLst/>
             <a:extLst>
               <a:ext uri="{AF507438-7753-43e0-B8FC-AC1667EBCBE1}">
-                <a14:hiddenEffects xmlns:a14="http://schemas.microsoft.com/office/drawing/2010/main" xmlns="">
+                <a14:hiddenEffects xmlns="" xmlns:a14="http://schemas.microsoft.com/office/drawing/2010/main">
                   <a:effectLst>
                     <a:outerShdw dist="35921" dir="2700000" algn="ctr" rotWithShape="0">
                       <a:schemeClr val="bg2"/>
@@ -11513,7 +11510,7 @@
             <a:effectLst/>
             <a:extLst>
               <a:ext uri="{AF507438-7753-43e0-B8FC-AC1667EBCBE1}">
-                <a14:hiddenEffects xmlns:a14="http://schemas.microsoft.com/office/drawing/2010/main" xmlns="">
+                <a14:hiddenEffects xmlns="" xmlns:a14="http://schemas.microsoft.com/office/drawing/2010/main">
                   <a:effectLst>
                     <a:outerShdw dist="35921" dir="2700000" algn="ctr" rotWithShape="0">
                       <a:schemeClr val="bg2"/>

</xml_diff>

<commit_message>
added funding info about Ed-DaSH to the credits slide
</commit_message>
<xml_diff>
--- a/instructors/01_Why_are_we_here.pptx
+++ b/instructors/01_Why_are_we_here.pptx
@@ -8450,7 +8450,7 @@
         <p:spPr>
           <a:xfrm>
             <a:off x="838200" y="1825625"/>
-            <a:ext cx="11043729" cy="2478627"/>
+            <a:ext cx="10984345" cy="4044184"/>
           </a:xfrm>
           <a:prstGeom prst="rect">
             <a:avLst/>
@@ -8458,7 +8458,7 @@
           <a:noFill/>
         </p:spPr>
         <p:txBody>
-          <a:bodyPr wrap="none" rtlCol="0">
+          <a:bodyPr wrap="square" rtlCol="0">
             <a:spAutoFit/>
           </a:bodyPr>
           <a:lstStyle/>
@@ -8698,8 +8698,89 @@
               <a:t>DORA </a:t>
             </a:r>
             <a:r>
-              <a:rPr lang="pl-PL" sz="1400" dirty="0"/>
-              <a:t>https://sfdora.org/resource/dora-slide-presentations/</a:t>
+              <a:rPr lang="pl-PL" sz="1400" dirty="0">
+                <a:hlinkClick r:id="rId7"/>
+              </a:rPr>
+              <a:t>https://</a:t>
+            </a:r>
+            <a:r>
+              <a:rPr lang="pl-PL" sz="1400">
+                <a:hlinkClick r:id="rId7"/>
+              </a:rPr>
+              <a:t>sfdora.org/resource/dora-slide-presentations</a:t>
+            </a:r>
+            <a:r>
+              <a:rPr lang="pl-PL" sz="1400" smtClean="0">
+                <a:hlinkClick r:id="rId7"/>
+              </a:rPr>
+              <a:t>/</a:t>
+            </a:r>
+            <a:endParaRPr lang="en-GB" sz="1400" smtClean="0"/>
+          </a:p>
+          <a:p>
+            <a:endParaRPr lang="en-GB" sz="1400"/>
+          </a:p>
+          <a:p>
+            <a:pPr marL="0" indent="0">
+              <a:buNone/>
+            </a:pPr>
+            <a:r>
+              <a:rPr lang="en-GB" sz="2000" smtClean="0"/>
+              <a:t>Funding</a:t>
+            </a:r>
+          </a:p>
+          <a:p>
+            <a:pPr marL="0" indent="0">
+              <a:buNone/>
+            </a:pPr>
+            <a:r>
+              <a:rPr lang="en-GB" sz="1400" smtClean="0"/>
+              <a:t>Ed-DaSH </a:t>
+            </a:r>
+            <a:r>
+              <a:rPr lang="en-GB" sz="1400"/>
+              <a:t>is a Data Science training programme for </a:t>
+            </a:r>
+            <a:r>
+              <a:rPr lang="en-GB" sz="1400"/>
+              <a:t>Health </a:t>
+            </a:r>
+            <a:r>
+              <a:rPr lang="en-GB" sz="1400"/>
+              <a:t>and Biosciences. This work was supported by UK Research and Innovation [grant number MR/V039075/1].</a:t>
+            </a:r>
+          </a:p>
+          <a:p>
+            <a:pPr marL="0" indent="0">
+              <a:buNone/>
+            </a:pPr>
+            <a:r>
+              <a:rPr lang="en-GB" sz="1400" smtClean="0">
+                <a:hlinkClick r:id="rId8"/>
+              </a:rPr>
+              <a:t>https</a:t>
+            </a:r>
+            <a:r>
+              <a:rPr lang="en-GB" sz="1400">
+                <a:hlinkClick r:id="rId8"/>
+              </a:rPr>
+              <a:t>://</a:t>
+            </a:r>
+            <a:r>
+              <a:rPr lang="en-GB" sz="1400">
+                <a:hlinkClick r:id="rId8"/>
+              </a:rPr>
+              <a:t>edcarp.github.io/Ed-DaSH</a:t>
+            </a:r>
+            <a:r>
+              <a:rPr lang="en-GB" sz="1400" smtClean="0">
+                <a:hlinkClick r:id="rId8"/>
+              </a:rPr>
+              <a:t>/</a:t>
+            </a:r>
+            <a:r>
+              <a:rPr lang="en-GB" sz="1400" smtClean="0"/>
+              <a:t> </a:t>
             </a:r>
             <a:endParaRPr lang="pl-PL" sz="1400" dirty="0" smtClean="0"/>
           </a:p>

</xml_diff>

<commit_message>
minor changes inc typo and formatting
</commit_message>
<xml_diff>
--- a/instructors/01_Why_are_we_here.pptx
+++ b/instructors/01_Why_are_we_here.pptx
@@ -6648,7 +6648,19 @@
             </a:r>
             <a:r>
               <a:rPr lang="en-GB" dirty="0"/>
-              <a:t>need to capitalize on the opportunities provided by online publication (such as relaxing unnecessary limits </a:t>
+              <a:t>need </a:t>
+            </a:r>
+            <a:r>
+              <a:rPr lang="en-GB"/>
+              <a:t>to </a:t>
+            </a:r>
+            <a:r>
+              <a:rPr lang="en-GB" smtClean="0"/>
+              <a:t>capitalise </a:t>
+            </a:r>
+            <a:r>
+              <a:rPr lang="en-GB" dirty="0"/>
+              <a:t>on the opportunities provided by online publication (such as relaxing unnecessary limits </a:t>
             </a:r>
             <a:r>
               <a:rPr lang="en-GB" dirty="0" smtClean="0"/>
@@ -6822,17 +6834,22 @@
         </p:blipFill>
         <p:spPr bwMode="auto">
           <a:xfrm>
-            <a:off x="609725" y="1680160"/>
-            <a:ext cx="5124450" cy="2290668"/>
+            <a:off x="609725" y="1790992"/>
+            <a:ext cx="4821257" cy="2155138"/>
           </a:xfrm>
           <a:prstGeom prst="rect">
             <a:avLst/>
           </a:prstGeom>
-          <a:noFill/>
           <a:ln>
             <a:noFill/>
           </a:ln>
-          <a:effectLst/>
+          <a:effectLst>
+            <a:outerShdw blurRad="292100" dist="139700" dir="2700000" algn="tl" rotWithShape="0">
+              <a:srgbClr val="333333">
+                <a:alpha val="65000"/>
+              </a:srgbClr>
+            </a:outerShdw>
+          </a:effectLst>
           <a:extLst>
             <a:ext uri="{909E8E84-426E-40DD-AFC4-6F175D3DCCD1}">
               <a14:hiddenFill xmlns:a14="http://schemas.microsoft.com/office/drawing/2010/main">
@@ -7011,8 +7028,8 @@
         </p:nvSpPr>
         <p:spPr>
           <a:xfrm>
-            <a:off x="6895293" y="4679360"/>
-            <a:ext cx="4557316" cy="1774845"/>
+            <a:off x="6895293" y="4556250"/>
+            <a:ext cx="4557316" cy="2021066"/>
           </a:xfrm>
           <a:prstGeom prst="rect">
             <a:avLst/>
@@ -7113,7 +7130,79 @@
                 </a:solidFill>
                 <a:sym typeface="Helvetica Neue"/>
               </a:rPr>
-              <a:t>Reminds peer reviewers and committee members of DORA principles throughout funding process</a:t>
+              <a:t>Reminds peer reviewers and </a:t>
+            </a:r>
+            <a:r>
+              <a:rPr lang="en-US" sz="1600">
+                <a:solidFill>
+                  <a:srgbClr val="0070C0"/>
+                </a:solidFill>
+                <a:sym typeface="Helvetica Neue"/>
+              </a:rPr>
+              <a:t>committee </a:t>
+            </a:r>
+            <a:endParaRPr lang="en-US" sz="1600" smtClean="0">
+              <a:solidFill>
+                <a:srgbClr val="0070C0"/>
+              </a:solidFill>
+              <a:sym typeface="Helvetica Neue"/>
+            </a:endParaRPr>
+          </a:p>
+          <a:p>
+            <a:pPr defTabSz="412750" hangingPunct="0"/>
+            <a:r>
+              <a:rPr lang="en-US" sz="1600" smtClean="0">
+                <a:solidFill>
+                  <a:srgbClr val="0070C0"/>
+                </a:solidFill>
+                <a:sym typeface="Helvetica Neue"/>
+              </a:rPr>
+              <a:t>members </a:t>
+            </a:r>
+            <a:r>
+              <a:rPr lang="en-US" sz="1600" dirty="0">
+                <a:solidFill>
+                  <a:srgbClr val="0070C0"/>
+                </a:solidFill>
+                <a:sym typeface="Helvetica Neue"/>
+              </a:rPr>
+              <a:t>of DORA principles </a:t>
+            </a:r>
+            <a:r>
+              <a:rPr lang="en-US" sz="1600">
+                <a:solidFill>
+                  <a:srgbClr val="0070C0"/>
+                </a:solidFill>
+                <a:sym typeface="Helvetica Neue"/>
+              </a:rPr>
+              <a:t>throughout </a:t>
+            </a:r>
+            <a:endParaRPr lang="en-US" sz="1600" smtClean="0">
+              <a:solidFill>
+                <a:srgbClr val="0070C0"/>
+              </a:solidFill>
+              <a:sym typeface="Helvetica Neue"/>
+            </a:endParaRPr>
+          </a:p>
+          <a:p>
+            <a:pPr defTabSz="412750" hangingPunct="0"/>
+            <a:r>
+              <a:rPr lang="en-US" sz="1600" smtClean="0">
+                <a:solidFill>
+                  <a:srgbClr val="0070C0"/>
+                </a:solidFill>
+                <a:sym typeface="Helvetica Neue"/>
+              </a:rPr>
+              <a:t>funding </a:t>
+            </a:r>
+            <a:r>
+              <a:rPr lang="en-US" sz="1600" dirty="0">
+                <a:solidFill>
+                  <a:srgbClr val="0070C0"/>
+                </a:solidFill>
+                <a:sym typeface="Helvetica Neue"/>
+              </a:rPr>
+              <a:t>process</a:t>
             </a:r>
             <a:endParaRPr lang="en-US" sz="1600" dirty="0">
               <a:solidFill>
@@ -7279,11 +7368,16 @@
           <a:prstGeom prst="rect">
             <a:avLst/>
           </a:prstGeom>
-          <a:noFill/>
           <a:ln>
             <a:noFill/>
           </a:ln>
-          <a:effectLst/>
+          <a:effectLst>
+            <a:outerShdw blurRad="292100" dist="139700" dir="2700000" algn="tl" rotWithShape="0">
+              <a:srgbClr val="333333">
+                <a:alpha val="65000"/>
+              </a:srgbClr>
+            </a:outerShdw>
+          </a:effectLst>
           <a:extLst>
             <a:ext uri="{909E8E84-426E-40DD-AFC4-6F175D3DCCD1}">
               <a14:hiddenFill xmlns:a14="http://schemas.microsoft.com/office/drawing/2010/main">
@@ -8469,8 +8563,31 @@
             </a:r>
             <a:r>
               <a:rPr lang="pl-PL" sz="1400" dirty="0"/>
-              <a:t>1] Gema Bueno de la Fuente, “What is Open Science? Introduction”, https://www.fosteropenscience.eu/content/what-open-science-introduction</a:t>
-            </a:r>
+              <a:t>1] Gema Bueno de la Fuente, “What is Open Science? Introduction”, </a:t>
+            </a:r>
+            <a:r>
+              <a:rPr lang="pl-PL" sz="1400" dirty="0">
+                <a:hlinkClick r:id="rId2"/>
+              </a:rPr>
+              <a:t>https</a:t>
+            </a:r>
+            <a:r>
+              <a:rPr lang="pl-PL" sz="1400">
+                <a:hlinkClick r:id="rId2"/>
+              </a:rPr>
+              <a:t>://</a:t>
+            </a:r>
+            <a:r>
+              <a:rPr lang="pl-PL" sz="1400" smtClean="0">
+                <a:hlinkClick r:id="rId2"/>
+              </a:rPr>
+              <a:t>www.fosteropenscience.eu/content/what-open-science-introduction</a:t>
+            </a:r>
+            <a:r>
+              <a:rPr lang="en-GB" sz="1400" smtClean="0"/>
+              <a:t> </a:t>
+            </a:r>
+            <a:endParaRPr lang="pl-PL" sz="1400" dirty="0"/>
           </a:p>
           <a:p>
             <a:r>
@@ -8507,43 +8624,6 @@
             <a:r>
               <a:rPr lang="en-GB" sz="1400" dirty="0" smtClean="0"/>
               <a:t>Evangeline Shaw </a:t>
-            </a:r>
-            <a:r>
-              <a:rPr lang="pl-PL" sz="1400" dirty="0" smtClean="0">
-                <a:hlinkClick r:id="rId2"/>
-              </a:rPr>
-              <a:t>https</a:t>
-            </a:r>
-            <a:r>
-              <a:rPr lang="pl-PL" sz="1400" dirty="0">
-                <a:hlinkClick r:id="rId2"/>
-              </a:rPr>
-              <a:t>://</a:t>
-            </a:r>
-            <a:r>
-              <a:rPr lang="pl-PL" sz="1400" dirty="0" smtClean="0">
-                <a:hlinkClick r:id="rId2"/>
-              </a:rPr>
-              <a:t>unsplash.com/photos/nwLTVwb7DbU</a:t>
-            </a:r>
-            <a:r>
-              <a:rPr lang="pl-PL" sz="1400" dirty="0"/>
-              <a:t/>
-            </a:r>
-            <a:br>
-              <a:rPr lang="pl-PL" sz="1400" dirty="0"/>
-            </a:br>
-            <a:r>
-              <a:rPr lang="en-GB" sz="1400" dirty="0"/>
-              <a:t>Alexei </a:t>
-            </a:r>
-            <a:r>
-              <a:rPr lang="en-GB" sz="1400" dirty="0" err="1" smtClean="0"/>
-              <a:t>Scutar</a:t>
-            </a:r>
-            <a:r>
-              <a:rPr lang="pl-PL" sz="1400" dirty="0" smtClean="0"/>
-              <a:t> </a:t>
             </a:r>
             <a:r>
               <a:rPr lang="pl-PL" sz="1400" dirty="0" smtClean="0">
@@ -8561,7 +8641,7 @@
               <a:rPr lang="pl-PL" sz="1400" dirty="0" smtClean="0">
                 <a:hlinkClick r:id="rId3"/>
               </a:rPr>
-              <a:t>unsplash.com/photos/5Zg64OwXJg8</a:t>
+              <a:t>unsplash.com/photos/nwLTVwb7DbU</a:t>
             </a:r>
             <a:r>
               <a:rPr lang="pl-PL" sz="1400" dirty="0"/>
@@ -8572,11 +8652,11 @@
             </a:br>
             <a:r>
               <a:rPr lang="en-GB" sz="1400" dirty="0"/>
-              <a:t>Markus </a:t>
+              <a:t>Alexei </a:t>
             </a:r>
             <a:r>
               <a:rPr lang="en-GB" sz="1400" dirty="0" err="1" smtClean="0"/>
-              <a:t>Spiske</a:t>
+              <a:t>Scutar</a:t>
             </a:r>
             <a:r>
               <a:rPr lang="pl-PL" sz="1400" dirty="0" smtClean="0"/>
@@ -8598,81 +8678,67 @@
               <a:rPr lang="pl-PL" sz="1400" dirty="0" smtClean="0">
                 <a:hlinkClick r:id="rId4"/>
               </a:rPr>
-              <a:t>unsplash.com/photos/7PMGUqYQpYc</a:t>
-            </a:r>
-            <a:endParaRPr lang="pl-PL" sz="1400" dirty="0" smtClean="0"/>
-          </a:p>
-          <a:p>
+              <a:t>unsplash.com/photos/5Zg64OwXJg8</a:t>
+            </a:r>
+            <a:r>
+              <a:rPr lang="pl-PL" sz="1400" dirty="0"/>
+              <a:t/>
+            </a:r>
+            <a:br>
+              <a:rPr lang="pl-PL" sz="1400" dirty="0"/>
+            </a:br>
+            <a:r>
+              <a:rPr lang="en-GB" sz="1400" dirty="0"/>
+              <a:t>Markus </a:t>
+            </a:r>
+            <a:r>
+              <a:rPr lang="en-GB" sz="1400" dirty="0" err="1" smtClean="0"/>
+              <a:t>Spiske</a:t>
+            </a:r>
             <a:r>
               <a:rPr lang="pl-PL" sz="1400" dirty="0" smtClean="0"/>
-              <a:t>[3</a:t>
-            </a:r>
-            <a:r>
-              <a:rPr lang="pl-PL" sz="1400" smtClean="0"/>
-              <a:t>] Photo Jonathunder, Medal</a:t>
-            </a:r>
-            <a:r>
-              <a:rPr lang="pl-PL" sz="1400" dirty="0"/>
-              <a:t>: Erik Lindberg (1873-1966) - </a:t>
-            </a:r>
-            <a:r>
-              <a:rPr lang="pl-PL" sz="1400" dirty="0" smtClean="0"/>
-              <a:t>NobelPrize.JPG</a:t>
-            </a:r>
-            <a:r>
-              <a:rPr lang="pl-PL" sz="1400" dirty="0"/>
-              <a:t>, PD-US, </a:t>
+              <a:t> </a:t>
+            </a:r>
+            <a:r>
+              <a:rPr lang="pl-PL" sz="1400" dirty="0" smtClean="0">
+                <a:hlinkClick r:id="rId5"/>
+              </a:rPr>
+              <a:t>https</a:t>
             </a:r>
             <a:r>
               <a:rPr lang="pl-PL" sz="1400" dirty="0">
                 <a:hlinkClick r:id="rId5"/>
               </a:rPr>
-              <a:t>https://</a:t>
+              <a:t>://</a:t>
             </a:r>
             <a:r>
               <a:rPr lang="pl-PL" sz="1400" dirty="0" smtClean="0">
                 <a:hlinkClick r:id="rId5"/>
               </a:rPr>
-              <a:t>en.wikipedia.org/w/index.php?curid=58432969</a:t>
+              <a:t>unsplash.com/photos/7PMGUqYQpYc</a:t>
             </a:r>
             <a:endParaRPr lang="pl-PL" sz="1400" dirty="0" smtClean="0"/>
           </a:p>
           <a:p>
             <a:r>
               <a:rPr lang="pl-PL" sz="1400" dirty="0" smtClean="0"/>
-              <a:t>[4] </a:t>
-            </a:r>
-            <a:r>
-              <a:rPr lang="en-GB" sz="1400" dirty="0" smtClean="0"/>
-              <a:t>Photo</a:t>
+              <a:t>[3</a:t>
+            </a:r>
+            <a:r>
+              <a:rPr lang="pl-PL" sz="1400" smtClean="0"/>
+              <a:t>] Photo Jonathunder, Medal</a:t>
+            </a:r>
+            <a:r>
+              <a:rPr lang="pl-PL" sz="1400" dirty="0"/>
+              <a:t>: Erik Lindberg (1873-1966) - </a:t>
             </a:r>
             <a:r>
               <a:rPr lang="pl-PL" sz="1400" dirty="0" smtClean="0"/>
-              <a:t> </a:t>
+              <a:t>NobelPrize.JPG</a:t>
             </a:r>
             <a:r>
               <a:rPr lang="pl-PL" sz="1400" dirty="0"/>
-              <a:t>Unsplash</a:t>
-            </a:r>
-            <a:r>
-              <a:rPr lang="en-GB" sz="1400" dirty="0"/>
-              <a:t> by</a:t>
-            </a:r>
-            <a:r>
-              <a:rPr lang="pl-PL" sz="1400" dirty="0" smtClean="0"/>
-              <a:t>: </a:t>
-            </a:r>
-            <a:r>
-              <a:rPr lang="en-GB" sz="1400" dirty="0" err="1"/>
-              <a:t>Wyron</a:t>
-            </a:r>
-            <a:r>
-              <a:rPr lang="en-GB" sz="1400" dirty="0"/>
-              <a:t> A</a:t>
-            </a:r>
-            <a:r>
-              <a:rPr lang="pl-PL" sz="1400" dirty="0" smtClean="0"/>
-              <a:t> </a:t>
+              <a:t>, PD-US, </a:t>
             </a:r>
             <a:r>
               <a:rPr lang="pl-PL" sz="1400" dirty="0">
@@ -8684,18 +8750,46 @@
               <a:rPr lang="pl-PL" sz="1400" dirty="0" smtClean="0">
                 <a:hlinkClick r:id="rId6"/>
               </a:rPr>
-              <a:t>unsplash.com/photos/6ZR-f5bkrGE</a:t>
+              <a:t>en.wikipedia.org/w/index.php?curid=58432969</a:t>
             </a:r>
             <a:endParaRPr lang="pl-PL" sz="1400" dirty="0" smtClean="0"/>
           </a:p>
           <a:p>
             <a:r>
+              <a:rPr lang="pl-PL" sz="1400" dirty="0" smtClean="0"/>
+              <a:t>[4] </a:t>
+            </a:r>
+            <a:r>
+              <a:rPr lang="en-GB" sz="1400" dirty="0" smtClean="0"/>
+              <a:t>Photo</a:t>
+            </a:r>
+            <a:r>
+              <a:rPr lang="pl-PL" sz="1400" dirty="0" smtClean="0"/>
+              <a:t> </a:t>
+            </a:r>
+            <a:r>
               <a:rPr lang="pl-PL" sz="1400" dirty="0"/>
-              <a:t>[5] </a:t>
+              <a:t>Unsplash</a:t>
+            </a:r>
+            <a:r>
+              <a:rPr lang="en-GB" sz="1400" dirty="0"/>
+              <a:t> by</a:t>
             </a:r>
             <a:r>
               <a:rPr lang="pl-PL" sz="1400" dirty="0" smtClean="0"/>
-              <a:t>DORA </a:t>
+              <a:t>: </a:t>
+            </a:r>
+            <a:r>
+              <a:rPr lang="en-GB" sz="1400" dirty="0" err="1"/>
+              <a:t>Wyron</a:t>
+            </a:r>
+            <a:r>
+              <a:rPr lang="en-GB" sz="1400" dirty="0"/>
+              <a:t> A</a:t>
+            </a:r>
+            <a:r>
+              <a:rPr lang="pl-PL" sz="1400" dirty="0" smtClean="0"/>
+              <a:t> </a:t>
             </a:r>
             <a:r>
               <a:rPr lang="pl-PL" sz="1400" dirty="0">
@@ -8704,14 +8798,37 @@
               <a:t>https://</a:t>
             </a:r>
             <a:r>
-              <a:rPr lang="pl-PL" sz="1400">
+              <a:rPr lang="pl-PL" sz="1400" dirty="0" smtClean="0">
                 <a:hlinkClick r:id="rId7"/>
               </a:rPr>
+              <a:t>unsplash.com/photos/6ZR-f5bkrGE</a:t>
+            </a:r>
+            <a:endParaRPr lang="pl-PL" sz="1400" dirty="0" smtClean="0"/>
+          </a:p>
+          <a:p>
+            <a:r>
+              <a:rPr lang="pl-PL" sz="1400" dirty="0"/>
+              <a:t>[5] </a:t>
+            </a:r>
+            <a:r>
+              <a:rPr lang="pl-PL" sz="1400" dirty="0" smtClean="0"/>
+              <a:t>DORA </a:t>
+            </a:r>
+            <a:r>
+              <a:rPr lang="pl-PL" sz="1400" dirty="0">
+                <a:hlinkClick r:id="rId8"/>
+              </a:rPr>
+              <a:t>https://</a:t>
+            </a:r>
+            <a:r>
+              <a:rPr lang="pl-PL" sz="1400">
+                <a:hlinkClick r:id="rId8"/>
+              </a:rPr>
               <a:t>sfdora.org/resource/dora-slide-presentations</a:t>
             </a:r>
             <a:r>
               <a:rPr lang="pl-PL" sz="1400" smtClean="0">
-                <a:hlinkClick r:id="rId7"/>
+                <a:hlinkClick r:id="rId8"/>
               </a:rPr>
               <a:t>/</a:t>
             </a:r>
@@ -8756,25 +8873,25 @@
             </a:pPr>
             <a:r>
               <a:rPr lang="en-GB" sz="1400" smtClean="0">
-                <a:hlinkClick r:id="rId8"/>
+                <a:hlinkClick r:id="rId9"/>
               </a:rPr>
               <a:t>https</a:t>
             </a:r>
             <a:r>
               <a:rPr lang="en-GB" sz="1400">
-                <a:hlinkClick r:id="rId8"/>
+                <a:hlinkClick r:id="rId9"/>
               </a:rPr>
               <a:t>://</a:t>
             </a:r>
             <a:r>
               <a:rPr lang="en-GB" sz="1400">
-                <a:hlinkClick r:id="rId8"/>
+                <a:hlinkClick r:id="rId9"/>
               </a:rPr>
               <a:t>edcarp.github.io/Ed-DaSH</a:t>
             </a:r>
             <a:r>
               <a:rPr lang="en-GB" sz="1400" smtClean="0">
-                <a:hlinkClick r:id="rId8"/>
+                <a:hlinkClick r:id="rId9"/>
               </a:rPr>
               <a:t>/</a:t>
             </a:r>
@@ -9149,17 +9266,14 @@
               <a:t>accessible to all levels </a:t>
             </a:r>
             <a:r>
-              <a:rPr lang="en-GB" dirty="0"/>
+              <a:rPr lang="en-GB"/>
               <a:t>of </a:t>
             </a:r>
             <a:r>
-              <a:rPr lang="pl-PL" dirty="0"/>
-              <a:t>the </a:t>
-            </a:r>
-            <a:r>
-              <a:rPr lang="en-GB" dirty="0"/>
+              <a:rPr lang="en-GB" smtClean="0"/>
               <a:t>society</a:t>
             </a:r>
+            <a:endParaRPr lang="en-GB" dirty="0"/>
           </a:p>
           <a:p>
             <a:pPr marL="0" indent="0">

</xml_diff>

<commit_message>
formatting for accessibility by using headers to give consistent structure
</commit_message>
<xml_diff>
--- a/instructors/01_Why_are_we_here.pptx
+++ b/instructors/01_Why_are_we_here.pptx
@@ -7759,15 +7759,19 @@
             </a:r>
             <a:r>
               <a:rPr lang="en-US" dirty="0" smtClean="0"/>
-              <a:t>downloads, </a:t>
-            </a:r>
-            <a:r>
-              <a:rPr lang="en-US" dirty="0"/>
-              <a:t>discussions </a:t>
+              <a:t>downloads</a:t>
+            </a:r>
+            <a:r>
+              <a:rPr lang="en-US" smtClean="0"/>
+              <a:t>, </a:t>
+            </a:r>
+            <a:r>
+              <a:rPr lang="en-US" smtClean="0"/>
+              <a:t>discussions, </a:t>
             </a:r>
             <a:r>
               <a:rPr lang="en-US" dirty="0" smtClean="0"/>
-              <a:t>, presence in mass </a:t>
+              <a:t>presence in mass </a:t>
             </a:r>
             <a:r>
               <a:rPr lang="en-US" dirty="0"/>
@@ -7841,7 +7845,27 @@
             </a:r>
             <a:r>
               <a:rPr lang="pl-PL" dirty="0" smtClean="0"/>
-              <a:t>easier to be prepered than to fake it</a:t>
+              <a:t>easier to </a:t>
+            </a:r>
+            <a:r>
+              <a:rPr lang="pl-PL" smtClean="0"/>
+              <a:t>be </a:t>
+            </a:r>
+            <a:r>
+              <a:rPr lang="pl-PL" smtClean="0"/>
+              <a:t>prep</a:t>
+            </a:r>
+            <a:r>
+              <a:rPr lang="en-GB" smtClean="0"/>
+              <a:t>a</a:t>
+            </a:r>
+            <a:r>
+              <a:rPr lang="pl-PL" smtClean="0"/>
+              <a:t>red </a:t>
+            </a:r>
+            <a:r>
+              <a:rPr lang="pl-PL" dirty="0" smtClean="0"/>
+              <a:t>than to fake it</a:t>
             </a:r>
             <a:endParaRPr lang="en-GB" dirty="0"/>
           </a:p>

</xml_diff>

<commit_message>
state content in initial slide
</commit_message>
<xml_diff>
--- a/instructors/01_Why_are_we_here.pptx
+++ b/instructors/01_Why_are_we_here.pptx
@@ -5,32 +5,33 @@
     <p:sldMasterId id="2147483648" r:id="rId1"/>
   </p:sldMasterIdLst>
   <p:notesMasterIdLst>
-    <p:notesMasterId r:id="rId25"/>
+    <p:notesMasterId r:id="rId26"/>
   </p:notesMasterIdLst>
   <p:sldIdLst>
     <p:sldId id="256" r:id="rId2"/>
-    <p:sldId id="262" r:id="rId3"/>
-    <p:sldId id="257" r:id="rId4"/>
-    <p:sldId id="264" r:id="rId5"/>
-    <p:sldId id="265" r:id="rId6"/>
-    <p:sldId id="263" r:id="rId7"/>
-    <p:sldId id="266" r:id="rId8"/>
-    <p:sldId id="267" r:id="rId9"/>
-    <p:sldId id="258" r:id="rId10"/>
-    <p:sldId id="259" r:id="rId11"/>
-    <p:sldId id="268" r:id="rId12"/>
-    <p:sldId id="269" r:id="rId13"/>
-    <p:sldId id="270" r:id="rId14"/>
-    <p:sldId id="271" r:id="rId15"/>
-    <p:sldId id="273" r:id="rId16"/>
-    <p:sldId id="272" r:id="rId17"/>
-    <p:sldId id="274" r:id="rId18"/>
-    <p:sldId id="275" r:id="rId19"/>
-    <p:sldId id="276" r:id="rId20"/>
-    <p:sldId id="277" r:id="rId21"/>
-    <p:sldId id="278" r:id="rId22"/>
-    <p:sldId id="260" r:id="rId23"/>
-    <p:sldId id="261" r:id="rId24"/>
+    <p:sldId id="257" r:id="rId3"/>
+    <p:sldId id="279" r:id="rId4"/>
+    <p:sldId id="262" r:id="rId5"/>
+    <p:sldId id="264" r:id="rId6"/>
+    <p:sldId id="265" r:id="rId7"/>
+    <p:sldId id="263" r:id="rId8"/>
+    <p:sldId id="266" r:id="rId9"/>
+    <p:sldId id="267" r:id="rId10"/>
+    <p:sldId id="258" r:id="rId11"/>
+    <p:sldId id="259" r:id="rId12"/>
+    <p:sldId id="268" r:id="rId13"/>
+    <p:sldId id="269" r:id="rId14"/>
+    <p:sldId id="270" r:id="rId15"/>
+    <p:sldId id="271" r:id="rId16"/>
+    <p:sldId id="273" r:id="rId17"/>
+    <p:sldId id="272" r:id="rId18"/>
+    <p:sldId id="274" r:id="rId19"/>
+    <p:sldId id="275" r:id="rId20"/>
+    <p:sldId id="276" r:id="rId21"/>
+    <p:sldId id="277" r:id="rId22"/>
+    <p:sldId id="278" r:id="rId23"/>
+    <p:sldId id="260" r:id="rId24"/>
+    <p:sldId id="261" r:id="rId25"/>
   </p:sldIdLst>
   <p:sldSz cx="12192000" cy="6858000"/>
   <p:notesSz cx="6858000" cy="9144000"/>
@@ -3790,6 +3791,1520 @@
       </p:grpSpPr>
       <p:sp>
         <p:nvSpPr>
+          <p:cNvPr id="2" name="Title 1"/>
+          <p:cNvSpPr>
+            <a:spLocks noGrp="1"/>
+          </p:cNvSpPr>
+          <p:nvPr>
+            <p:ph type="title"/>
+          </p:nvPr>
+        </p:nvSpPr>
+        <p:spPr>
+          <a:xfrm>
+            <a:off x="838200" y="365125"/>
+            <a:ext cx="10515600" cy="723367"/>
+          </a:xfrm>
+        </p:spPr>
+        <p:txBody>
+          <a:bodyPr/>
+          <a:lstStyle/>
+          <a:p>
+            <a:r>
+              <a:rPr lang="pl-PL" dirty="0"/>
+              <a:t>Sharing as part of the workflow</a:t>
+            </a:r>
+            <a:endParaRPr lang="en-GB" dirty="0"/>
+          </a:p>
+        </p:txBody>
+      </p:sp>
+      <p:grpSp>
+        <p:nvGrpSpPr>
+          <p:cNvPr id="4" name="Group 3"/>
+          <p:cNvGrpSpPr/>
+          <p:nvPr/>
+        </p:nvGrpSpPr>
+        <p:grpSpPr>
+          <a:xfrm>
+            <a:off x="5089775" y="1135453"/>
+            <a:ext cx="3876021" cy="3915317"/>
+            <a:chOff x="2051720" y="1700808"/>
+            <a:chExt cx="4633544" cy="4680520"/>
+          </a:xfrm>
+        </p:grpSpPr>
+        <p:grpSp>
+          <p:nvGrpSpPr>
+            <p:cNvPr id="5" name="Group 4"/>
+            <p:cNvGrpSpPr/>
+            <p:nvPr/>
+          </p:nvGrpSpPr>
+          <p:grpSpPr>
+            <a:xfrm>
+              <a:off x="2051720" y="1700808"/>
+              <a:ext cx="4633544" cy="4680520"/>
+              <a:chOff x="1979712" y="1916832"/>
+              <a:chExt cx="4633544" cy="4680520"/>
+            </a:xfrm>
+          </p:grpSpPr>
+          <p:sp>
+            <p:nvSpPr>
+              <p:cNvPr id="12" name="Oval 11"/>
+              <p:cNvSpPr/>
+              <p:nvPr/>
+            </p:nvSpPr>
+            <p:spPr>
+              <a:xfrm>
+                <a:off x="2310826" y="2348880"/>
+                <a:ext cx="3942390" cy="3942390"/>
+              </a:xfrm>
+              <a:prstGeom prst="ellipse">
+                <a:avLst/>
+              </a:prstGeom>
+              <a:noFill/>
+              <a:ln w="57150">
+                <a:solidFill>
+                  <a:schemeClr val="accent1">
+                    <a:lumMod val="40000"/>
+                    <a:lumOff val="60000"/>
+                  </a:schemeClr>
+                </a:solidFill>
+              </a:ln>
+            </p:spPr>
+            <p:style>
+              <a:lnRef idx="2">
+                <a:schemeClr val="accent1">
+                  <a:shade val="50000"/>
+                </a:schemeClr>
+              </a:lnRef>
+              <a:fillRef idx="1">
+                <a:schemeClr val="accent1"/>
+              </a:fillRef>
+              <a:effectRef idx="0">
+                <a:schemeClr val="accent1"/>
+              </a:effectRef>
+              <a:fontRef idx="minor">
+                <a:schemeClr val="lt1"/>
+              </a:fontRef>
+            </p:style>
+            <p:txBody>
+              <a:bodyPr rtlCol="0" anchor="ctr"/>
+              <a:lstStyle/>
+              <a:p>
+                <a:pPr algn="ctr"/>
+                <a:endParaRPr lang="en-GB" dirty="0"/>
+              </a:p>
+            </p:txBody>
+          </p:sp>
+          <p:grpSp>
+            <p:nvGrpSpPr>
+              <p:cNvPr id="13" name="Group 12"/>
+              <p:cNvGrpSpPr/>
+              <p:nvPr/>
+            </p:nvGrpSpPr>
+            <p:grpSpPr>
+              <a:xfrm>
+                <a:off x="3563888" y="1916832"/>
+                <a:ext cx="1224136" cy="1224136"/>
+                <a:chOff x="3923928" y="2492896"/>
+                <a:chExt cx="1224136" cy="1224136"/>
+              </a:xfrm>
+            </p:grpSpPr>
+            <p:sp>
+              <p:nvSpPr>
+                <p:cNvPr id="29" name="Oval 28"/>
+                <p:cNvSpPr/>
+                <p:nvPr/>
+              </p:nvSpPr>
+              <p:spPr>
+                <a:xfrm>
+                  <a:off x="3923928" y="2492896"/>
+                  <a:ext cx="1224136" cy="1224136"/>
+                </a:xfrm>
+                <a:prstGeom prst="ellipse">
+                  <a:avLst/>
+                </a:prstGeom>
+                <a:solidFill>
+                  <a:srgbClr val="5B9BD5"/>
+                </a:solidFill>
+              </p:spPr>
+              <p:style>
+                <a:lnRef idx="2">
+                  <a:schemeClr val="accent1">
+                    <a:shade val="50000"/>
+                  </a:schemeClr>
+                </a:lnRef>
+                <a:fillRef idx="1">
+                  <a:schemeClr val="accent1"/>
+                </a:fillRef>
+                <a:effectRef idx="0">
+                  <a:schemeClr val="accent1"/>
+                </a:effectRef>
+                <a:fontRef idx="minor">
+                  <a:schemeClr val="lt1"/>
+                </a:fontRef>
+              </p:style>
+              <p:txBody>
+                <a:bodyPr rtlCol="0" anchor="ctr"/>
+                <a:lstStyle/>
+                <a:p>
+                  <a:pPr algn="ctr"/>
+                  <a:endParaRPr lang="en-GB" sz="1000" dirty="0">
+                    <a:latin typeface="Arial" panose="020B0604020202020204" pitchFamily="34" charset="0"/>
+                    <a:cs typeface="Arial" panose="020B0604020202020204" pitchFamily="34" charset="0"/>
+                  </a:endParaRPr>
+                </a:p>
+              </p:txBody>
+            </p:sp>
+            <p:sp>
+              <p:nvSpPr>
+                <p:cNvPr id="30" name="TextBox 29"/>
+                <p:cNvSpPr txBox="1"/>
+                <p:nvPr/>
+              </p:nvSpPr>
+              <p:spPr>
+                <a:xfrm>
+                  <a:off x="3959932" y="2843354"/>
+                  <a:ext cx="1152128" cy="551892"/>
+                </a:xfrm>
+                <a:prstGeom prst="rect">
+                  <a:avLst/>
+                </a:prstGeom>
+                <a:noFill/>
+              </p:spPr>
+              <p:txBody>
+                <a:bodyPr wrap="square" rtlCol="0">
+                  <a:spAutoFit/>
+                </a:bodyPr>
+                <a:lstStyle/>
+                <a:p>
+                  <a:pPr algn="ctr"/>
+                  <a:r>
+                    <a:rPr lang="pl-PL" sz="1200" dirty="0">
+                      <a:solidFill>
+                        <a:schemeClr val="bg1"/>
+                      </a:solidFill>
+                      <a:latin typeface="Arial" panose="020B0604020202020204" pitchFamily="34" charset="0"/>
+                      <a:cs typeface="Arial" panose="020B0604020202020204" pitchFamily="34" charset="0"/>
+                    </a:rPr>
+                    <a:t>CREATING DATA</a:t>
+                  </a:r>
+                  <a:endParaRPr lang="en-GB" sz="1200" dirty="0">
+                    <a:solidFill>
+                      <a:schemeClr val="bg1"/>
+                    </a:solidFill>
+                    <a:latin typeface="Arial" panose="020B0604020202020204" pitchFamily="34" charset="0"/>
+                    <a:cs typeface="Arial" panose="020B0604020202020204" pitchFamily="34" charset="0"/>
+                  </a:endParaRPr>
+                </a:p>
+              </p:txBody>
+            </p:sp>
+          </p:grpSp>
+          <p:grpSp>
+            <p:nvGrpSpPr>
+              <p:cNvPr id="14" name="Group 13"/>
+              <p:cNvGrpSpPr/>
+              <p:nvPr/>
+            </p:nvGrpSpPr>
+            <p:grpSpPr>
+              <a:xfrm>
+                <a:off x="5148065" y="2780928"/>
+                <a:ext cx="1465191" cy="1224136"/>
+                <a:chOff x="3815917" y="2492896"/>
+                <a:chExt cx="1465191" cy="1224136"/>
+              </a:xfrm>
+            </p:grpSpPr>
+            <p:sp>
+              <p:nvSpPr>
+                <p:cNvPr id="27" name="Oval 26"/>
+                <p:cNvSpPr/>
+                <p:nvPr/>
+              </p:nvSpPr>
+              <p:spPr>
+                <a:xfrm>
+                  <a:off x="3923928" y="2492896"/>
+                  <a:ext cx="1224136" cy="1224136"/>
+                </a:xfrm>
+                <a:prstGeom prst="ellipse">
+                  <a:avLst/>
+                </a:prstGeom>
+                <a:solidFill>
+                  <a:srgbClr val="5B9BD5"/>
+                </a:solidFill>
+              </p:spPr>
+              <p:style>
+                <a:lnRef idx="2">
+                  <a:schemeClr val="accent1">
+                    <a:shade val="50000"/>
+                  </a:schemeClr>
+                </a:lnRef>
+                <a:fillRef idx="1">
+                  <a:schemeClr val="accent1"/>
+                </a:fillRef>
+                <a:effectRef idx="0">
+                  <a:schemeClr val="accent1"/>
+                </a:effectRef>
+                <a:fontRef idx="minor">
+                  <a:schemeClr val="lt1"/>
+                </a:fontRef>
+              </p:style>
+              <p:txBody>
+                <a:bodyPr rtlCol="0" anchor="ctr"/>
+                <a:lstStyle/>
+                <a:p>
+                  <a:pPr algn="ctr"/>
+                  <a:endParaRPr lang="en-GB" sz="1000" dirty="0">
+                    <a:latin typeface="Arial" panose="020B0604020202020204" pitchFamily="34" charset="0"/>
+                    <a:cs typeface="Arial" panose="020B0604020202020204" pitchFamily="34" charset="0"/>
+                  </a:endParaRPr>
+                </a:p>
+              </p:txBody>
+            </p:sp>
+            <p:sp>
+              <p:nvSpPr>
+                <p:cNvPr id="28" name="TextBox 27"/>
+                <p:cNvSpPr txBox="1"/>
+                <p:nvPr/>
+              </p:nvSpPr>
+              <p:spPr>
+                <a:xfrm>
+                  <a:off x="3815917" y="2843354"/>
+                  <a:ext cx="1465191" cy="551892"/>
+                </a:xfrm>
+                <a:prstGeom prst="rect">
+                  <a:avLst/>
+                </a:prstGeom>
+                <a:noFill/>
+              </p:spPr>
+              <p:txBody>
+                <a:bodyPr wrap="square" rtlCol="0">
+                  <a:spAutoFit/>
+                </a:bodyPr>
+                <a:lstStyle/>
+                <a:p>
+                  <a:pPr algn="ctr"/>
+                  <a:r>
+                    <a:rPr lang="pl-PL" sz="1100" dirty="0">
+                      <a:solidFill>
+                        <a:schemeClr val="bg1"/>
+                      </a:solidFill>
+                      <a:latin typeface="Arial" panose="020B0604020202020204" pitchFamily="34" charset="0"/>
+                      <a:cs typeface="Arial" panose="020B0604020202020204" pitchFamily="34" charset="0"/>
+                    </a:rPr>
+                    <a:t>PROCESSING</a:t>
+                  </a:r>
+                  <a:r>
+                    <a:rPr lang="pl-PL" sz="1200" dirty="0">
+                      <a:solidFill>
+                        <a:schemeClr val="bg1"/>
+                      </a:solidFill>
+                      <a:latin typeface="Arial" panose="020B0604020202020204" pitchFamily="34" charset="0"/>
+                      <a:cs typeface="Arial" panose="020B0604020202020204" pitchFamily="34" charset="0"/>
+                    </a:rPr>
+                    <a:t> DATA</a:t>
+                  </a:r>
+                  <a:endParaRPr lang="en-GB" sz="1200" dirty="0">
+                    <a:solidFill>
+                      <a:schemeClr val="bg1"/>
+                    </a:solidFill>
+                    <a:latin typeface="Arial" panose="020B0604020202020204" pitchFamily="34" charset="0"/>
+                    <a:cs typeface="Arial" panose="020B0604020202020204" pitchFamily="34" charset="0"/>
+                  </a:endParaRPr>
+                </a:p>
+              </p:txBody>
+            </p:sp>
+          </p:grpSp>
+          <p:grpSp>
+            <p:nvGrpSpPr>
+              <p:cNvPr id="15" name="Group 14"/>
+              <p:cNvGrpSpPr/>
+              <p:nvPr/>
+            </p:nvGrpSpPr>
+            <p:grpSpPr>
+              <a:xfrm>
+                <a:off x="5148065" y="4509120"/>
+                <a:ext cx="1400261" cy="1224136"/>
+                <a:chOff x="3851921" y="2492896"/>
+                <a:chExt cx="1400261" cy="1224136"/>
+              </a:xfrm>
+            </p:grpSpPr>
+            <p:sp>
+              <p:nvSpPr>
+                <p:cNvPr id="25" name="Oval 24"/>
+                <p:cNvSpPr/>
+                <p:nvPr/>
+              </p:nvSpPr>
+              <p:spPr>
+                <a:xfrm>
+                  <a:off x="3923928" y="2492896"/>
+                  <a:ext cx="1224136" cy="1224136"/>
+                </a:xfrm>
+                <a:prstGeom prst="ellipse">
+                  <a:avLst/>
+                </a:prstGeom>
+                <a:solidFill>
+                  <a:srgbClr val="5B9BD5"/>
+                </a:solidFill>
+              </p:spPr>
+              <p:style>
+                <a:lnRef idx="2">
+                  <a:schemeClr val="accent1">
+                    <a:shade val="50000"/>
+                  </a:schemeClr>
+                </a:lnRef>
+                <a:fillRef idx="1">
+                  <a:schemeClr val="accent1"/>
+                </a:fillRef>
+                <a:effectRef idx="0">
+                  <a:schemeClr val="accent1"/>
+                </a:effectRef>
+                <a:fontRef idx="minor">
+                  <a:schemeClr val="lt1"/>
+                </a:fontRef>
+              </p:style>
+              <p:txBody>
+                <a:bodyPr rtlCol="0" anchor="ctr"/>
+                <a:lstStyle/>
+                <a:p>
+                  <a:pPr algn="ctr"/>
+                  <a:endParaRPr lang="en-GB" sz="1000" dirty="0">
+                    <a:latin typeface="Arial" panose="020B0604020202020204" pitchFamily="34" charset="0"/>
+                    <a:cs typeface="Arial" panose="020B0604020202020204" pitchFamily="34" charset="0"/>
+                  </a:endParaRPr>
+                </a:p>
+              </p:txBody>
+            </p:sp>
+            <p:sp>
+              <p:nvSpPr>
+                <p:cNvPr id="26" name="TextBox 25"/>
+                <p:cNvSpPr txBox="1"/>
+                <p:nvPr/>
+              </p:nvSpPr>
+              <p:spPr>
+                <a:xfrm>
+                  <a:off x="3851921" y="2843354"/>
+                  <a:ext cx="1400261" cy="588685"/>
+                </a:xfrm>
+                <a:prstGeom prst="rect">
+                  <a:avLst/>
+                </a:prstGeom>
+                <a:noFill/>
+              </p:spPr>
+              <p:txBody>
+                <a:bodyPr wrap="square" rtlCol="0">
+                  <a:spAutoFit/>
+                </a:bodyPr>
+                <a:lstStyle/>
+                <a:p>
+                  <a:pPr algn="ctr"/>
+                  <a:r>
+                    <a:rPr lang="pl-PL" sz="1200" dirty="0">
+                      <a:solidFill>
+                        <a:schemeClr val="bg1"/>
+                      </a:solidFill>
+                      <a:latin typeface="Arial" panose="020B0604020202020204" pitchFamily="34" charset="0"/>
+                      <a:cs typeface="Arial" panose="020B0604020202020204" pitchFamily="34" charset="0"/>
+                    </a:rPr>
+                    <a:t>ANALYSING</a:t>
+                  </a:r>
+                  <a:r>
+                    <a:rPr lang="pl-PL" sz="1400" dirty="0">
+                      <a:solidFill>
+                        <a:schemeClr val="bg1"/>
+                      </a:solidFill>
+                      <a:latin typeface="Arial" panose="020B0604020202020204" pitchFamily="34" charset="0"/>
+                      <a:cs typeface="Arial" panose="020B0604020202020204" pitchFamily="34" charset="0"/>
+                    </a:rPr>
+                    <a:t> </a:t>
+                  </a:r>
+                  <a:r>
+                    <a:rPr lang="pl-PL" sz="1200" dirty="0">
+                      <a:solidFill>
+                        <a:schemeClr val="bg1"/>
+                      </a:solidFill>
+                      <a:latin typeface="Arial" panose="020B0604020202020204" pitchFamily="34" charset="0"/>
+                      <a:cs typeface="Arial" panose="020B0604020202020204" pitchFamily="34" charset="0"/>
+                    </a:rPr>
+                    <a:t>DATA</a:t>
+                  </a:r>
+                  <a:endParaRPr lang="en-GB" sz="1200" dirty="0">
+                    <a:solidFill>
+                      <a:schemeClr val="bg1"/>
+                    </a:solidFill>
+                    <a:latin typeface="Arial" panose="020B0604020202020204" pitchFamily="34" charset="0"/>
+                    <a:cs typeface="Arial" panose="020B0604020202020204" pitchFamily="34" charset="0"/>
+                  </a:endParaRPr>
+                </a:p>
+              </p:txBody>
+            </p:sp>
+          </p:grpSp>
+          <p:grpSp>
+            <p:nvGrpSpPr>
+              <p:cNvPr id="16" name="Group 15"/>
+              <p:cNvGrpSpPr/>
+              <p:nvPr/>
+            </p:nvGrpSpPr>
+            <p:grpSpPr>
+              <a:xfrm>
+                <a:off x="3498957" y="5373216"/>
+                <a:ext cx="1509656" cy="1224136"/>
+                <a:chOff x="3786989" y="2492896"/>
+                <a:chExt cx="1509656" cy="1224136"/>
+              </a:xfrm>
+            </p:grpSpPr>
+            <p:sp>
+              <p:nvSpPr>
+                <p:cNvPr id="23" name="Oval 22"/>
+                <p:cNvSpPr/>
+                <p:nvPr/>
+              </p:nvSpPr>
+              <p:spPr>
+                <a:xfrm>
+                  <a:off x="3923928" y="2492896"/>
+                  <a:ext cx="1224136" cy="1224136"/>
+                </a:xfrm>
+                <a:prstGeom prst="ellipse">
+                  <a:avLst/>
+                </a:prstGeom>
+              </p:spPr>
+              <p:style>
+                <a:lnRef idx="2">
+                  <a:schemeClr val="accent1">
+                    <a:shade val="50000"/>
+                  </a:schemeClr>
+                </a:lnRef>
+                <a:fillRef idx="1">
+                  <a:schemeClr val="accent1"/>
+                </a:fillRef>
+                <a:effectRef idx="0">
+                  <a:schemeClr val="accent1"/>
+                </a:effectRef>
+                <a:fontRef idx="minor">
+                  <a:schemeClr val="lt1"/>
+                </a:fontRef>
+              </p:style>
+              <p:txBody>
+                <a:bodyPr rtlCol="0" anchor="ctr"/>
+                <a:lstStyle/>
+                <a:p>
+                  <a:pPr algn="ctr"/>
+                  <a:endParaRPr lang="en-GB" sz="1000" dirty="0">
+                    <a:latin typeface="Arial" panose="020B0604020202020204" pitchFamily="34" charset="0"/>
+                    <a:cs typeface="Arial" panose="020B0604020202020204" pitchFamily="34" charset="0"/>
+                  </a:endParaRPr>
+                </a:p>
+              </p:txBody>
+            </p:sp>
+            <p:sp>
+              <p:nvSpPr>
+                <p:cNvPr id="24" name="TextBox 23"/>
+                <p:cNvSpPr txBox="1"/>
+                <p:nvPr/>
+              </p:nvSpPr>
+              <p:spPr>
+                <a:xfrm>
+                  <a:off x="3786989" y="2843354"/>
+                  <a:ext cx="1509656" cy="551892"/>
+                </a:xfrm>
+                <a:prstGeom prst="rect">
+                  <a:avLst/>
+                </a:prstGeom>
+                <a:noFill/>
+              </p:spPr>
+              <p:txBody>
+                <a:bodyPr wrap="square" rtlCol="0">
+                  <a:spAutoFit/>
+                </a:bodyPr>
+                <a:lstStyle/>
+                <a:p>
+                  <a:pPr algn="ctr"/>
+                  <a:r>
+                    <a:rPr lang="pl-PL" sz="1100" dirty="0">
+                      <a:solidFill>
+                        <a:schemeClr val="bg1"/>
+                      </a:solidFill>
+                      <a:latin typeface="Arial" panose="020B0604020202020204" pitchFamily="34" charset="0"/>
+                      <a:cs typeface="Arial" panose="020B0604020202020204" pitchFamily="34" charset="0"/>
+                    </a:rPr>
+                    <a:t>PRESERVING</a:t>
+                  </a:r>
+                  <a:r>
+                    <a:rPr lang="pl-PL" sz="1200" dirty="0">
+                      <a:solidFill>
+                        <a:schemeClr val="bg1"/>
+                      </a:solidFill>
+                      <a:latin typeface="Arial" panose="020B0604020202020204" pitchFamily="34" charset="0"/>
+                      <a:cs typeface="Arial" panose="020B0604020202020204" pitchFamily="34" charset="0"/>
+                    </a:rPr>
+                    <a:t> DATA</a:t>
+                  </a:r>
+                  <a:endParaRPr lang="en-GB" sz="1200" dirty="0">
+                    <a:solidFill>
+                      <a:schemeClr val="bg1"/>
+                    </a:solidFill>
+                    <a:latin typeface="Arial" panose="020B0604020202020204" pitchFamily="34" charset="0"/>
+                    <a:cs typeface="Arial" panose="020B0604020202020204" pitchFamily="34" charset="0"/>
+                  </a:endParaRPr>
+                </a:p>
+              </p:txBody>
+            </p:sp>
+          </p:grpSp>
+          <p:grpSp>
+            <p:nvGrpSpPr>
+              <p:cNvPr id="17" name="Group 16"/>
+              <p:cNvGrpSpPr/>
+              <p:nvPr/>
+            </p:nvGrpSpPr>
+            <p:grpSpPr>
+              <a:xfrm>
+                <a:off x="1979712" y="4509120"/>
+                <a:ext cx="1224136" cy="1224136"/>
+                <a:chOff x="3923928" y="2564904"/>
+                <a:chExt cx="1224136" cy="1224136"/>
+              </a:xfrm>
+            </p:grpSpPr>
+            <p:sp>
+              <p:nvSpPr>
+                <p:cNvPr id="21" name="Oval 20"/>
+                <p:cNvSpPr/>
+                <p:nvPr/>
+              </p:nvSpPr>
+              <p:spPr>
+                <a:xfrm>
+                  <a:off x="3923928" y="2564904"/>
+                  <a:ext cx="1224136" cy="1224136"/>
+                </a:xfrm>
+                <a:prstGeom prst="ellipse">
+                  <a:avLst/>
+                </a:prstGeom>
+                <a:solidFill>
+                  <a:srgbClr val="FF0000"/>
+                </a:solidFill>
+              </p:spPr>
+              <p:style>
+                <a:lnRef idx="2">
+                  <a:schemeClr val="accent1">
+                    <a:shade val="50000"/>
+                  </a:schemeClr>
+                </a:lnRef>
+                <a:fillRef idx="1">
+                  <a:schemeClr val="accent1"/>
+                </a:fillRef>
+                <a:effectRef idx="0">
+                  <a:schemeClr val="accent1"/>
+                </a:effectRef>
+                <a:fontRef idx="minor">
+                  <a:schemeClr val="lt1"/>
+                </a:fontRef>
+              </p:style>
+              <p:txBody>
+                <a:bodyPr rtlCol="0" anchor="ctr"/>
+                <a:lstStyle/>
+                <a:p>
+                  <a:pPr algn="ctr"/>
+                  <a:endParaRPr lang="en-GB" sz="1000" dirty="0">
+                    <a:latin typeface="Arial" panose="020B0604020202020204" pitchFamily="34" charset="0"/>
+                    <a:cs typeface="Arial" panose="020B0604020202020204" pitchFamily="34" charset="0"/>
+                  </a:endParaRPr>
+                </a:p>
+              </p:txBody>
+            </p:sp>
+            <p:sp>
+              <p:nvSpPr>
+                <p:cNvPr id="22" name="TextBox 21"/>
+                <p:cNvSpPr txBox="1"/>
+                <p:nvPr/>
+              </p:nvSpPr>
+              <p:spPr>
+                <a:xfrm>
+                  <a:off x="3959932" y="2941834"/>
+                  <a:ext cx="1152128" cy="551892"/>
+                </a:xfrm>
+                <a:prstGeom prst="rect">
+                  <a:avLst/>
+                </a:prstGeom>
+                <a:noFill/>
+              </p:spPr>
+              <p:txBody>
+                <a:bodyPr wrap="square" rtlCol="0">
+                  <a:spAutoFit/>
+                </a:bodyPr>
+                <a:lstStyle/>
+                <a:p>
+                  <a:pPr algn="ctr"/>
+                  <a:r>
+                    <a:rPr lang="pl-PL" sz="1200" dirty="0">
+                      <a:solidFill>
+                        <a:schemeClr val="bg1"/>
+                      </a:solidFill>
+                      <a:latin typeface="Arial" panose="020B0604020202020204" pitchFamily="34" charset="0"/>
+                      <a:cs typeface="Arial" panose="020B0604020202020204" pitchFamily="34" charset="0"/>
+                    </a:rPr>
+                    <a:t>SHARING</a:t>
+                  </a:r>
+                </a:p>
+                <a:p>
+                  <a:pPr algn="ctr"/>
+                  <a:r>
+                    <a:rPr lang="pl-PL" sz="1200" dirty="0">
+                      <a:solidFill>
+                        <a:schemeClr val="bg1"/>
+                      </a:solidFill>
+                      <a:latin typeface="Arial" panose="020B0604020202020204" pitchFamily="34" charset="0"/>
+                      <a:cs typeface="Arial" panose="020B0604020202020204" pitchFamily="34" charset="0"/>
+                    </a:rPr>
+                    <a:t>DATA</a:t>
+                  </a:r>
+                  <a:endParaRPr lang="en-GB" sz="1200" dirty="0">
+                    <a:solidFill>
+                      <a:schemeClr val="bg1"/>
+                    </a:solidFill>
+                    <a:latin typeface="Arial" panose="020B0604020202020204" pitchFamily="34" charset="0"/>
+                    <a:cs typeface="Arial" panose="020B0604020202020204" pitchFamily="34" charset="0"/>
+                  </a:endParaRPr>
+                </a:p>
+              </p:txBody>
+            </p:sp>
+          </p:grpSp>
+          <p:grpSp>
+            <p:nvGrpSpPr>
+              <p:cNvPr id="18" name="Group 17"/>
+              <p:cNvGrpSpPr/>
+              <p:nvPr/>
+            </p:nvGrpSpPr>
+            <p:grpSpPr>
+              <a:xfrm>
+                <a:off x="1979712" y="2708920"/>
+                <a:ext cx="1224136" cy="1224136"/>
+                <a:chOff x="3923928" y="2420888"/>
+                <a:chExt cx="1224136" cy="1224136"/>
+              </a:xfrm>
+            </p:grpSpPr>
+            <p:sp>
+              <p:nvSpPr>
+                <p:cNvPr id="19" name="Oval 18"/>
+                <p:cNvSpPr/>
+                <p:nvPr/>
+              </p:nvSpPr>
+              <p:spPr>
+                <a:xfrm>
+                  <a:off x="3923928" y="2420888"/>
+                  <a:ext cx="1224136" cy="1224136"/>
+                </a:xfrm>
+                <a:prstGeom prst="ellipse">
+                  <a:avLst/>
+                </a:prstGeom>
+              </p:spPr>
+              <p:style>
+                <a:lnRef idx="2">
+                  <a:schemeClr val="accent1">
+                    <a:shade val="50000"/>
+                  </a:schemeClr>
+                </a:lnRef>
+                <a:fillRef idx="1">
+                  <a:schemeClr val="accent1"/>
+                </a:fillRef>
+                <a:effectRef idx="0">
+                  <a:schemeClr val="accent1"/>
+                </a:effectRef>
+                <a:fontRef idx="minor">
+                  <a:schemeClr val="lt1"/>
+                </a:fontRef>
+              </p:style>
+              <p:txBody>
+                <a:bodyPr rtlCol="0" anchor="ctr"/>
+                <a:lstStyle/>
+                <a:p>
+                  <a:pPr algn="ctr"/>
+                  <a:endParaRPr lang="en-GB" sz="1000" dirty="0">
+                    <a:latin typeface="Arial" panose="020B0604020202020204" pitchFamily="34" charset="0"/>
+                    <a:cs typeface="Arial" panose="020B0604020202020204" pitchFamily="34" charset="0"/>
+                  </a:endParaRPr>
+                </a:p>
+              </p:txBody>
+            </p:sp>
+            <p:sp>
+              <p:nvSpPr>
+                <p:cNvPr id="20" name="TextBox 19"/>
+                <p:cNvSpPr txBox="1"/>
+                <p:nvPr/>
+              </p:nvSpPr>
+              <p:spPr>
+                <a:xfrm>
+                  <a:off x="3959932" y="2813809"/>
+                  <a:ext cx="1152128" cy="551892"/>
+                </a:xfrm>
+                <a:prstGeom prst="rect">
+                  <a:avLst/>
+                </a:prstGeom>
+                <a:noFill/>
+              </p:spPr>
+              <p:txBody>
+                <a:bodyPr wrap="square" rtlCol="0">
+                  <a:spAutoFit/>
+                </a:bodyPr>
+                <a:lstStyle/>
+                <a:p>
+                  <a:pPr algn="ctr"/>
+                  <a:r>
+                    <a:rPr lang="pl-PL" sz="1200" dirty="0">
+                      <a:solidFill>
+                        <a:schemeClr val="bg1"/>
+                      </a:solidFill>
+                      <a:latin typeface="Arial" panose="020B0604020202020204" pitchFamily="34" charset="0"/>
+                      <a:cs typeface="Arial" panose="020B0604020202020204" pitchFamily="34" charset="0"/>
+                    </a:rPr>
+                    <a:t>RE-USING DATA</a:t>
+                  </a:r>
+                  <a:endParaRPr lang="en-GB" sz="1200" dirty="0">
+                    <a:solidFill>
+                      <a:schemeClr val="bg1"/>
+                    </a:solidFill>
+                    <a:latin typeface="Arial" panose="020B0604020202020204" pitchFamily="34" charset="0"/>
+                    <a:cs typeface="Arial" panose="020B0604020202020204" pitchFamily="34" charset="0"/>
+                  </a:endParaRPr>
+                </a:p>
+              </p:txBody>
+            </p:sp>
+          </p:grpSp>
+        </p:grpSp>
+        <p:sp>
+          <p:nvSpPr>
+            <p:cNvPr id="6" name="Right Arrow 5"/>
+            <p:cNvSpPr/>
+            <p:nvPr/>
+          </p:nvSpPr>
+          <p:spPr>
+            <a:xfrm rot="1619807" flipV="1">
+              <a:off x="5174188" y="2303398"/>
+              <a:ext cx="253828" cy="151064"/>
+            </a:xfrm>
+            <a:prstGeom prst="rightArrow">
+              <a:avLst>
+                <a:gd name="adj1" fmla="val 27886"/>
+                <a:gd name="adj2" fmla="val 50000"/>
+              </a:avLst>
+            </a:prstGeom>
+            <a:solidFill>
+              <a:srgbClr val="91C6F7"/>
+            </a:solidFill>
+            <a:ln>
+              <a:solidFill>
+                <a:srgbClr val="91C6F7"/>
+              </a:solidFill>
+            </a:ln>
+          </p:spPr>
+          <p:style>
+            <a:lnRef idx="2">
+              <a:schemeClr val="accent1">
+                <a:shade val="50000"/>
+              </a:schemeClr>
+            </a:lnRef>
+            <a:fillRef idx="1">
+              <a:schemeClr val="accent1"/>
+            </a:fillRef>
+            <a:effectRef idx="0">
+              <a:schemeClr val="accent1"/>
+            </a:effectRef>
+            <a:fontRef idx="minor">
+              <a:schemeClr val="lt1"/>
+            </a:fontRef>
+          </p:style>
+          <p:txBody>
+            <a:bodyPr rtlCol="0" anchor="ctr"/>
+            <a:lstStyle/>
+            <a:p>
+              <a:pPr algn="ctr"/>
+              <a:endParaRPr lang="en-GB" dirty="0"/>
+            </a:p>
+          </p:txBody>
+        </p:sp>
+        <p:sp>
+          <p:nvSpPr>
+            <p:cNvPr id="7" name="Right Arrow 6"/>
+            <p:cNvSpPr/>
+            <p:nvPr/>
+          </p:nvSpPr>
+          <p:spPr>
+            <a:xfrm rot="5212365" flipV="1">
+              <a:off x="6197255" y="3995999"/>
+              <a:ext cx="253828" cy="151064"/>
+            </a:xfrm>
+            <a:prstGeom prst="rightArrow">
+              <a:avLst>
+                <a:gd name="adj1" fmla="val 27886"/>
+                <a:gd name="adj2" fmla="val 50000"/>
+              </a:avLst>
+            </a:prstGeom>
+            <a:solidFill>
+              <a:srgbClr val="91C6F7"/>
+            </a:solidFill>
+            <a:ln>
+              <a:solidFill>
+                <a:srgbClr val="91C6F7"/>
+              </a:solidFill>
+            </a:ln>
+          </p:spPr>
+          <p:style>
+            <a:lnRef idx="2">
+              <a:schemeClr val="accent1">
+                <a:shade val="50000"/>
+              </a:schemeClr>
+            </a:lnRef>
+            <a:fillRef idx="1">
+              <a:schemeClr val="accent1"/>
+            </a:fillRef>
+            <a:effectRef idx="0">
+              <a:schemeClr val="accent1"/>
+            </a:effectRef>
+            <a:fontRef idx="minor">
+              <a:schemeClr val="lt1"/>
+            </a:fontRef>
+          </p:style>
+          <p:txBody>
+            <a:bodyPr rtlCol="0" anchor="ctr"/>
+            <a:lstStyle/>
+            <a:p>
+              <a:pPr algn="ctr"/>
+              <a:endParaRPr lang="en-GB" dirty="0"/>
+            </a:p>
+          </p:txBody>
+        </p:sp>
+        <p:sp>
+          <p:nvSpPr>
+            <p:cNvPr id="8" name="Right Arrow 7"/>
+            <p:cNvSpPr/>
+            <p:nvPr/>
+          </p:nvSpPr>
+          <p:spPr>
+            <a:xfrm rot="8847248" flipV="1">
+              <a:off x="5300817" y="5674556"/>
+              <a:ext cx="253828" cy="151064"/>
+            </a:xfrm>
+            <a:prstGeom prst="rightArrow">
+              <a:avLst>
+                <a:gd name="adj1" fmla="val 27886"/>
+                <a:gd name="adj2" fmla="val 50000"/>
+              </a:avLst>
+            </a:prstGeom>
+            <a:solidFill>
+              <a:srgbClr val="91C6F7"/>
+            </a:solidFill>
+            <a:ln>
+              <a:solidFill>
+                <a:srgbClr val="91C6F7"/>
+              </a:solidFill>
+            </a:ln>
+          </p:spPr>
+          <p:style>
+            <a:lnRef idx="2">
+              <a:schemeClr val="accent1">
+                <a:shade val="50000"/>
+              </a:schemeClr>
+            </a:lnRef>
+            <a:fillRef idx="1">
+              <a:schemeClr val="accent1"/>
+            </a:fillRef>
+            <a:effectRef idx="0">
+              <a:schemeClr val="accent1"/>
+            </a:effectRef>
+            <a:fontRef idx="minor">
+              <a:schemeClr val="lt1"/>
+            </a:fontRef>
+          </p:style>
+          <p:txBody>
+            <a:bodyPr rtlCol="0" anchor="ctr"/>
+            <a:lstStyle/>
+            <a:p>
+              <a:pPr algn="ctr"/>
+              <a:endParaRPr lang="en-GB" dirty="0"/>
+            </a:p>
+          </p:txBody>
+        </p:sp>
+        <p:sp>
+          <p:nvSpPr>
+            <p:cNvPr id="9" name="Right Arrow 8"/>
+            <p:cNvSpPr/>
+            <p:nvPr/>
+          </p:nvSpPr>
+          <p:spPr>
+            <a:xfrm rot="12776736" flipV="1">
+              <a:off x="3097300" y="5646115"/>
+              <a:ext cx="253828" cy="151064"/>
+            </a:xfrm>
+            <a:prstGeom prst="rightArrow">
+              <a:avLst>
+                <a:gd name="adj1" fmla="val 27886"/>
+                <a:gd name="adj2" fmla="val 50000"/>
+              </a:avLst>
+            </a:prstGeom>
+            <a:solidFill>
+              <a:srgbClr val="91C6F7"/>
+            </a:solidFill>
+            <a:ln>
+              <a:solidFill>
+                <a:srgbClr val="91C6F7"/>
+              </a:solidFill>
+            </a:ln>
+          </p:spPr>
+          <p:style>
+            <a:lnRef idx="2">
+              <a:schemeClr val="accent1">
+                <a:shade val="50000"/>
+              </a:schemeClr>
+            </a:lnRef>
+            <a:fillRef idx="1">
+              <a:schemeClr val="accent1"/>
+            </a:fillRef>
+            <a:effectRef idx="0">
+              <a:schemeClr val="accent1"/>
+            </a:effectRef>
+            <a:fontRef idx="minor">
+              <a:schemeClr val="lt1"/>
+            </a:fontRef>
+          </p:style>
+          <p:txBody>
+            <a:bodyPr rtlCol="0" anchor="ctr"/>
+            <a:lstStyle/>
+            <a:p>
+              <a:pPr algn="ctr"/>
+              <a:endParaRPr lang="en-GB" dirty="0"/>
+            </a:p>
+          </p:txBody>
+        </p:sp>
+        <p:sp>
+          <p:nvSpPr>
+            <p:cNvPr id="10" name="Right Arrow 9"/>
+            <p:cNvSpPr/>
+            <p:nvPr/>
+          </p:nvSpPr>
+          <p:spPr>
+            <a:xfrm rot="16200000" flipV="1">
+              <a:off x="2254352" y="3914627"/>
+              <a:ext cx="253828" cy="151064"/>
+            </a:xfrm>
+            <a:prstGeom prst="rightArrow">
+              <a:avLst>
+                <a:gd name="adj1" fmla="val 27886"/>
+                <a:gd name="adj2" fmla="val 50000"/>
+              </a:avLst>
+            </a:prstGeom>
+            <a:solidFill>
+              <a:srgbClr val="91C6F7"/>
+            </a:solidFill>
+            <a:ln>
+              <a:solidFill>
+                <a:srgbClr val="91C6F7"/>
+              </a:solidFill>
+            </a:ln>
+          </p:spPr>
+          <p:style>
+            <a:lnRef idx="2">
+              <a:schemeClr val="accent1">
+                <a:shade val="50000"/>
+              </a:schemeClr>
+            </a:lnRef>
+            <a:fillRef idx="1">
+              <a:schemeClr val="accent1"/>
+            </a:fillRef>
+            <a:effectRef idx="0">
+              <a:schemeClr val="accent1"/>
+            </a:effectRef>
+            <a:fontRef idx="minor">
+              <a:schemeClr val="lt1"/>
+            </a:fontRef>
+          </p:style>
+          <p:txBody>
+            <a:bodyPr rtlCol="0" anchor="ctr"/>
+            <a:lstStyle/>
+            <a:p>
+              <a:pPr algn="ctr"/>
+              <a:endParaRPr lang="en-GB" dirty="0"/>
+            </a:p>
+          </p:txBody>
+        </p:sp>
+        <p:sp>
+          <p:nvSpPr>
+            <p:cNvPr id="11" name="Right Arrow 10"/>
+            <p:cNvSpPr/>
+            <p:nvPr/>
+          </p:nvSpPr>
+          <p:spPr>
+            <a:xfrm rot="19590936" flipV="1">
+              <a:off x="3218543" y="2332540"/>
+              <a:ext cx="253828" cy="151064"/>
+            </a:xfrm>
+            <a:prstGeom prst="rightArrow">
+              <a:avLst>
+                <a:gd name="adj1" fmla="val 27886"/>
+                <a:gd name="adj2" fmla="val 50000"/>
+              </a:avLst>
+            </a:prstGeom>
+            <a:solidFill>
+              <a:srgbClr val="91C6F7"/>
+            </a:solidFill>
+            <a:ln>
+              <a:solidFill>
+                <a:srgbClr val="91C6F7"/>
+              </a:solidFill>
+            </a:ln>
+          </p:spPr>
+          <p:style>
+            <a:lnRef idx="2">
+              <a:schemeClr val="accent1">
+                <a:shade val="50000"/>
+              </a:schemeClr>
+            </a:lnRef>
+            <a:fillRef idx="1">
+              <a:schemeClr val="accent1"/>
+            </a:fillRef>
+            <a:effectRef idx="0">
+              <a:schemeClr val="accent1"/>
+            </a:effectRef>
+            <a:fontRef idx="minor">
+              <a:schemeClr val="lt1"/>
+            </a:fontRef>
+          </p:style>
+          <p:txBody>
+            <a:bodyPr rtlCol="0" anchor="ctr"/>
+            <a:lstStyle/>
+            <a:p>
+              <a:pPr algn="ctr"/>
+              <a:endParaRPr lang="en-GB" dirty="0"/>
+            </a:p>
+          </p:txBody>
+        </p:sp>
+      </p:grpSp>
+      <p:cxnSp>
+        <p:nvCxnSpPr>
+          <p:cNvPr id="31" name="Straight Arrow Connector 30"/>
+          <p:cNvCxnSpPr/>
+          <p:nvPr/>
+        </p:nvCxnSpPr>
+        <p:spPr>
+          <a:xfrm flipV="1">
+            <a:off x="3035359" y="1083188"/>
+            <a:ext cx="0" cy="5032437"/>
+          </a:xfrm>
+          <a:prstGeom prst="straightConnector1">
+            <a:avLst/>
+          </a:prstGeom>
+          <a:ln w="38100">
+            <a:solidFill>
+              <a:schemeClr val="tx1"/>
+            </a:solidFill>
+            <a:tailEnd type="triangle"/>
+          </a:ln>
+        </p:spPr>
+        <p:style>
+          <a:lnRef idx="1">
+            <a:schemeClr val="accent1"/>
+          </a:lnRef>
+          <a:fillRef idx="0">
+            <a:schemeClr val="accent1"/>
+          </a:fillRef>
+          <a:effectRef idx="0">
+            <a:schemeClr val="accent1"/>
+          </a:effectRef>
+          <a:fontRef idx="minor">
+            <a:schemeClr val="tx1"/>
+          </a:fontRef>
+        </p:style>
+      </p:cxnSp>
+      <p:sp>
+        <p:nvSpPr>
+          <p:cNvPr id="32" name="TextBox 31"/>
+          <p:cNvSpPr txBox="1"/>
+          <p:nvPr/>
+        </p:nvSpPr>
+        <p:spPr>
+          <a:xfrm rot="16200000">
+            <a:off x="2017903" y="3319325"/>
+            <a:ext cx="1471813" cy="338554"/>
+          </a:xfrm>
+          <a:prstGeom prst="rect">
+            <a:avLst/>
+          </a:prstGeom>
+          <a:noFill/>
+        </p:spPr>
+        <p:txBody>
+          <a:bodyPr wrap="none" rtlCol="0">
+            <a:spAutoFit/>
+          </a:bodyPr>
+          <a:lstStyle/>
+          <a:p>
+            <a:r>
+              <a:rPr lang="pl-PL" sz="1600" dirty="0"/>
+              <a:t>Time and effort</a:t>
+            </a:r>
+            <a:endParaRPr lang="en-GB" sz="1600" dirty="0"/>
+          </a:p>
+        </p:txBody>
+      </p:sp>
+      <p:sp>
+        <p:nvSpPr>
+          <p:cNvPr id="33" name="Rectangle 32"/>
+          <p:cNvSpPr/>
+          <p:nvPr/>
+        </p:nvSpPr>
+        <p:spPr>
+          <a:xfrm>
+            <a:off x="3211997" y="1510141"/>
+            <a:ext cx="648072" cy="4608512"/>
+          </a:xfrm>
+          <a:prstGeom prst="rect">
+            <a:avLst/>
+          </a:prstGeom>
+          <a:solidFill>
+            <a:srgbClr val="FF0000"/>
+          </a:solidFill>
+          <a:ln>
+            <a:solidFill>
+              <a:srgbClr val="C00000"/>
+            </a:solidFill>
+          </a:ln>
+        </p:spPr>
+        <p:style>
+          <a:lnRef idx="2">
+            <a:schemeClr val="accent1">
+              <a:shade val="50000"/>
+            </a:schemeClr>
+          </a:lnRef>
+          <a:fillRef idx="1">
+            <a:schemeClr val="accent1"/>
+          </a:fillRef>
+          <a:effectRef idx="0">
+            <a:schemeClr val="accent1"/>
+          </a:effectRef>
+          <a:fontRef idx="minor">
+            <a:schemeClr val="lt1"/>
+          </a:fontRef>
+        </p:style>
+        <p:txBody>
+          <a:bodyPr rtlCol="0" anchor="ctr"/>
+          <a:lstStyle/>
+          <a:p>
+            <a:pPr algn="ctr"/>
+            <a:endParaRPr lang="en-GB"/>
+          </a:p>
+        </p:txBody>
+      </p:sp>
+      <p:grpSp>
+        <p:nvGrpSpPr>
+          <p:cNvPr id="34" name="Group 33"/>
+          <p:cNvGrpSpPr/>
+          <p:nvPr/>
+        </p:nvGrpSpPr>
+        <p:grpSpPr>
+          <a:xfrm>
+            <a:off x="3541430" y="1135455"/>
+            <a:ext cx="1425574" cy="1079202"/>
+            <a:chOff x="1589065" y="1341402"/>
+            <a:chExt cx="1425574" cy="1079202"/>
+          </a:xfrm>
+        </p:grpSpPr>
+        <p:sp>
+          <p:nvSpPr>
+            <p:cNvPr id="35" name="AutoShape 17"/>
+            <p:cNvSpPr>
+              <a:spLocks noChangeArrowheads="1"/>
+            </p:cNvSpPr>
+            <p:nvPr/>
+          </p:nvSpPr>
+          <p:spPr bwMode="auto">
+            <a:xfrm rot="16200000">
+              <a:off x="2076427" y="1396964"/>
+              <a:ext cx="800100" cy="1076325"/>
+            </a:xfrm>
+            <a:prstGeom prst="foldedCorner">
+              <a:avLst>
+                <a:gd name="adj" fmla="val 12500"/>
+              </a:avLst>
+            </a:prstGeom>
+            <a:gradFill rotWithShape="1">
+              <a:gsLst>
+                <a:gs pos="0">
+                  <a:srgbClr val="FFFF99">
+                    <a:gamma/>
+                    <a:shade val="85490"/>
+                    <a:invGamma/>
+                  </a:srgbClr>
+                </a:gs>
+                <a:gs pos="100000">
+                  <a:srgbClr val="FFFF99"/>
+                </a:gs>
+              </a:gsLst>
+              <a:lin ang="0" scaled="1"/>
+            </a:gradFill>
+            <a:ln w="9525">
+              <a:solidFill>
+                <a:schemeClr val="tx1"/>
+              </a:solidFill>
+              <a:round/>
+              <a:headEnd/>
+              <a:tailEnd/>
+            </a:ln>
+            <a:effectLst/>
+            <a:extLst>
+              <a:ext uri="{AF507438-7753-43e0-B8FC-AC1667EBCBE1}">
+                <a14:hiddenEffects xmlns="" xmlns:a14="http://schemas.microsoft.com/office/drawing/2010/main">
+                  <a:effectLst>
+                    <a:outerShdw dist="35921" dir="2700000" algn="ctr" rotWithShape="0">
+                      <a:schemeClr val="bg2"/>
+                    </a:outerShdw>
+                  </a:effectLst>
+                </a14:hiddenEffects>
+              </a:ext>
+            </a:extLst>
+          </p:spPr>
+          <p:txBody>
+            <a:bodyPr wrap="none" anchor="ctr"/>
+            <a:lstStyle/>
+            <a:p>
+              <a:endParaRPr lang="en-GB" dirty="0"/>
+            </a:p>
+          </p:txBody>
+        </p:sp>
+        <p:sp>
+          <p:nvSpPr>
+            <p:cNvPr id="36" name="AutoShape 18"/>
+            <p:cNvSpPr>
+              <a:spLocks noChangeArrowheads="1"/>
+            </p:cNvSpPr>
+            <p:nvPr/>
+          </p:nvSpPr>
+          <p:spPr bwMode="auto">
+            <a:xfrm rot="16200000">
+              <a:off x="1901802" y="1203289"/>
+              <a:ext cx="800100" cy="1076325"/>
+            </a:xfrm>
+            <a:prstGeom prst="foldedCorner">
+              <a:avLst>
+                <a:gd name="adj" fmla="val 12500"/>
+              </a:avLst>
+            </a:prstGeom>
+            <a:gradFill rotWithShape="1">
+              <a:gsLst>
+                <a:gs pos="0">
+                  <a:srgbClr val="FFFF99">
+                    <a:gamma/>
+                    <a:shade val="85490"/>
+                    <a:invGamma/>
+                  </a:srgbClr>
+                </a:gs>
+                <a:gs pos="100000">
+                  <a:srgbClr val="FFFF99"/>
+                </a:gs>
+              </a:gsLst>
+              <a:lin ang="0" scaled="1"/>
+            </a:gradFill>
+            <a:ln w="9525">
+              <a:solidFill>
+                <a:schemeClr val="tx1"/>
+              </a:solidFill>
+              <a:round/>
+              <a:headEnd/>
+              <a:tailEnd/>
+            </a:ln>
+            <a:effectLst/>
+            <a:extLst>
+              <a:ext uri="{AF507438-7753-43e0-B8FC-AC1667EBCBE1}">
+                <a14:hiddenEffects xmlns="" xmlns:a14="http://schemas.microsoft.com/office/drawing/2010/main">
+                  <a:effectLst>
+                    <a:outerShdw dist="35921" dir="2700000" algn="ctr" rotWithShape="0">
+                      <a:schemeClr val="bg2"/>
+                    </a:outerShdw>
+                  </a:effectLst>
+                </a14:hiddenEffects>
+              </a:ext>
+            </a:extLst>
+          </p:spPr>
+          <p:txBody>
+            <a:bodyPr wrap="none" anchor="ctr"/>
+            <a:lstStyle/>
+            <a:p>
+              <a:endParaRPr lang="en-GB" dirty="0"/>
+            </a:p>
+          </p:txBody>
+        </p:sp>
+        <p:sp>
+          <p:nvSpPr>
+            <p:cNvPr id="37" name="AutoShape 17"/>
+            <p:cNvSpPr>
+              <a:spLocks noChangeArrowheads="1"/>
+            </p:cNvSpPr>
+            <p:nvPr/>
+          </p:nvSpPr>
+          <p:spPr bwMode="auto">
+            <a:xfrm rot="16200000">
+              <a:off x="1727178" y="1482391"/>
+              <a:ext cx="800100" cy="1076325"/>
+            </a:xfrm>
+            <a:prstGeom prst="foldedCorner">
+              <a:avLst>
+                <a:gd name="adj" fmla="val 12500"/>
+              </a:avLst>
+            </a:prstGeom>
+            <a:gradFill rotWithShape="1">
+              <a:gsLst>
+                <a:gs pos="0">
+                  <a:srgbClr val="FFFF99">
+                    <a:gamma/>
+                    <a:shade val="85490"/>
+                    <a:invGamma/>
+                  </a:srgbClr>
+                </a:gs>
+                <a:gs pos="100000">
+                  <a:srgbClr val="FFFF99"/>
+                </a:gs>
+              </a:gsLst>
+              <a:lin ang="0" scaled="1"/>
+            </a:gradFill>
+            <a:ln w="9525">
+              <a:solidFill>
+                <a:schemeClr val="tx1"/>
+              </a:solidFill>
+              <a:round/>
+              <a:headEnd/>
+              <a:tailEnd/>
+            </a:ln>
+            <a:effectLst/>
+            <a:extLst>
+              <a:ext uri="{AF507438-7753-43e0-B8FC-AC1667EBCBE1}">
+                <a14:hiddenEffects xmlns="" xmlns:a14="http://schemas.microsoft.com/office/drawing/2010/main">
+                  <a:effectLst>
+                    <a:outerShdw dist="35921" dir="2700000" algn="ctr" rotWithShape="0">
+                      <a:schemeClr val="bg2"/>
+                    </a:outerShdw>
+                  </a:effectLst>
+                </a14:hiddenEffects>
+              </a:ext>
+            </a:extLst>
+          </p:spPr>
+          <p:txBody>
+            <a:bodyPr wrap="none" anchor="ctr"/>
+            <a:lstStyle/>
+            <a:p>
+              <a:endParaRPr lang="en-GB" dirty="0"/>
+            </a:p>
+          </p:txBody>
+        </p:sp>
+      </p:grpSp>
+      <p:sp>
+        <p:nvSpPr>
+          <p:cNvPr id="38" name="Rectangle 37"/>
+          <p:cNvSpPr/>
+          <p:nvPr/>
+        </p:nvSpPr>
+        <p:spPr>
+          <a:xfrm>
+            <a:off x="4653622" y="6412881"/>
+            <a:ext cx="404414" cy="197924"/>
+          </a:xfrm>
+          <a:prstGeom prst="rect">
+            <a:avLst/>
+          </a:prstGeom>
+          <a:solidFill>
+            <a:srgbClr val="FF0000"/>
+          </a:solidFill>
+          <a:ln>
+            <a:solidFill>
+              <a:srgbClr val="C00000"/>
+            </a:solidFill>
+          </a:ln>
+        </p:spPr>
+        <p:style>
+          <a:lnRef idx="2">
+            <a:schemeClr val="accent1">
+              <a:shade val="50000"/>
+            </a:schemeClr>
+          </a:lnRef>
+          <a:fillRef idx="1">
+            <a:schemeClr val="accent1"/>
+          </a:fillRef>
+          <a:effectRef idx="0">
+            <a:schemeClr val="accent1"/>
+          </a:effectRef>
+          <a:fontRef idx="minor">
+            <a:schemeClr val="lt1"/>
+          </a:fontRef>
+        </p:style>
+        <p:txBody>
+          <a:bodyPr rtlCol="0" anchor="ctr"/>
+          <a:lstStyle/>
+          <a:p>
+            <a:pPr algn="ctr"/>
+            <a:endParaRPr lang="en-GB"/>
+          </a:p>
+        </p:txBody>
+      </p:sp>
+      <p:sp>
+        <p:nvSpPr>
+          <p:cNvPr id="39" name="TextBox 38"/>
+          <p:cNvSpPr txBox="1"/>
+          <p:nvPr/>
+        </p:nvSpPr>
+        <p:spPr>
+          <a:xfrm>
+            <a:off x="5063896" y="6382597"/>
+            <a:ext cx="3445880" cy="276999"/>
+          </a:xfrm>
+          <a:prstGeom prst="rect">
+            <a:avLst/>
+          </a:prstGeom>
+          <a:noFill/>
+        </p:spPr>
+        <p:txBody>
+          <a:bodyPr wrap="none" rtlCol="0">
+            <a:spAutoFit/>
+          </a:bodyPr>
+          <a:lstStyle/>
+          <a:p>
+            <a:r>
+              <a:rPr lang="pl-PL" sz="1200" dirty="0"/>
+              <a:t>work necessary to make outputs suitable for sharing</a:t>
+            </a:r>
+            <a:endParaRPr lang="en-GB" sz="1200" dirty="0"/>
+          </a:p>
+        </p:txBody>
+      </p:sp>
+    </p:spTree>
+    <p:extLst>
+      <p:ext uri="{BB962C8B-B14F-4D97-AF65-F5344CB8AC3E}">
+        <p14:creationId xmlns:p14="http://schemas.microsoft.com/office/powerpoint/2010/main" val="3440693774"/>
+      </p:ext>
+    </p:extLst>
+  </p:cSld>
+  <p:clrMapOvr>
+    <a:masterClrMapping/>
+  </p:clrMapOvr>
+  <p:timing>
+    <p:tnLst>
+      <p:par>
+        <p:cTn id="1" dur="indefinite" restart="never" nodeType="tmRoot"/>
+      </p:par>
+    </p:tnLst>
+  </p:timing>
+</p:sld>
+</file>
+
+<file path=ppt/slides/slide11.xml><?xml version="1.0" encoding="utf-8"?>
+<p:sld xmlns:a="http://schemas.openxmlformats.org/drawingml/2006/main" xmlns:r="http://schemas.openxmlformats.org/officeDocument/2006/relationships" xmlns:p="http://schemas.openxmlformats.org/presentationml/2006/main">
+  <p:cSld>
+    <p:spTree>
+      <p:nvGrpSpPr>
+        <p:cNvPr id="1" name=""/>
+        <p:cNvGrpSpPr/>
+        <p:nvPr/>
+      </p:nvGrpSpPr>
+      <p:grpSpPr>
+        <a:xfrm>
+          <a:off x="0" y="0"/>
+          <a:ext cx="0" cy="0"/>
+          <a:chOff x="0" y="0"/>
+          <a:chExt cx="0" cy="0"/>
+        </a:xfrm>
+      </p:grpSpPr>
+      <p:sp>
+        <p:nvSpPr>
           <p:cNvPr id="5" name="Title 1"/>
           <p:cNvSpPr>
             <a:spLocks noGrp="1"/>
@@ -3860,7 +5375,7 @@
           <a:effectLst/>
           <a:extLst>
             <a:ext uri="{AF507438-7753-43e0-B8FC-AC1667EBCBE1}">
-              <a14:hiddenEffects xmlns:a14="http://schemas.microsoft.com/office/drawing/2010/main" xmlns="">
+              <a14:hiddenEffects xmlns="" xmlns:a14="http://schemas.microsoft.com/office/drawing/2010/main">
                 <a:effectLst>
                   <a:outerShdw dist="35921" dir="2700000" algn="ctr" rotWithShape="0">
                     <a:schemeClr val="bg2"/>
@@ -4191,7 +5706,7 @@
             <a:effectLst/>
             <a:extLst>
               <a:ext uri="{AF507438-7753-43e0-B8FC-AC1667EBCBE1}">
-                <a14:hiddenEffects xmlns:a14="http://schemas.microsoft.com/office/drawing/2010/main" xmlns="">
+                <a14:hiddenEffects xmlns="" xmlns:a14="http://schemas.microsoft.com/office/drawing/2010/main">
                   <a:effectLst>
                     <a:outerShdw dist="35921" dir="2700000" algn="ctr" rotWithShape="0">
                       <a:schemeClr val="bg2"/>
@@ -4253,7 +5768,7 @@
             <a:effectLst/>
             <a:extLst>
               <a:ext uri="{AF507438-7753-43e0-B8FC-AC1667EBCBE1}">
-                <a14:hiddenEffects xmlns:a14="http://schemas.microsoft.com/office/drawing/2010/main" xmlns="">
+                <a14:hiddenEffects xmlns="" xmlns:a14="http://schemas.microsoft.com/office/drawing/2010/main">
                   <a:effectLst>
                     <a:outerShdw dist="35921" dir="2700000" algn="ctr" rotWithShape="0">
                       <a:schemeClr val="bg2"/>
@@ -4330,7 +5845,7 @@
             <a:effectLst/>
             <a:extLst>
               <a:ext uri="{AF507438-7753-43e0-B8FC-AC1667EBCBE1}">
-                <a14:hiddenEffects xmlns:a14="http://schemas.microsoft.com/office/drawing/2010/main" xmlns="">
+                <a14:hiddenEffects xmlns="" xmlns:a14="http://schemas.microsoft.com/office/drawing/2010/main">
                   <a:effectLst>
                     <a:outerShdw dist="35921" dir="2700000" algn="ctr" rotWithShape="0">
                       <a:schemeClr val="bg2"/>
@@ -4392,7 +5907,7 @@
             <a:effectLst/>
             <a:extLst>
               <a:ext uri="{AF507438-7753-43e0-B8FC-AC1667EBCBE1}">
-                <a14:hiddenEffects xmlns:a14="http://schemas.microsoft.com/office/drawing/2010/main" xmlns="">
+                <a14:hiddenEffects xmlns="" xmlns:a14="http://schemas.microsoft.com/office/drawing/2010/main">
                   <a:effectLst>
                     <a:outerShdw dist="35921" dir="2700000" algn="ctr" rotWithShape="0">
                       <a:schemeClr val="bg2"/>
@@ -5625,7 +7140,7 @@
           <a:effectLst/>
           <a:extLst>
             <a:ext uri="{AF507438-7753-43e0-B8FC-AC1667EBCBE1}">
-              <a14:hiddenEffects xmlns:a14="http://schemas.microsoft.com/office/drawing/2010/main" xmlns="">
+              <a14:hiddenEffects xmlns="" xmlns:a14="http://schemas.microsoft.com/office/drawing/2010/main">
                 <a:effectLst>
                   <a:outerShdw dist="35921" dir="2700000" algn="ctr" rotWithShape="0">
                     <a:schemeClr val="bg2"/>
@@ -5885,7 +7400,7 @@
 </p:sld>
 </file>
 
-<file path=ppt/slides/slide11.xml><?xml version="1.0" encoding="utf-8"?>
+<file path=ppt/slides/slide12.xml><?xml version="1.0" encoding="utf-8"?>
 <p:sld xmlns:a="http://schemas.openxmlformats.org/drawingml/2006/main" xmlns:r="http://schemas.openxmlformats.org/officeDocument/2006/relationships" xmlns:p="http://schemas.openxmlformats.org/presentationml/2006/main">
   <p:cSld>
     <p:spTree>
@@ -5979,7 +7494,7 @@
 </p:sld>
 </file>
 
-<file path=ppt/slides/slide12.xml><?xml version="1.0" encoding="utf-8"?>
+<file path=ppt/slides/slide13.xml><?xml version="1.0" encoding="utf-8"?>
 <p:sld xmlns:a="http://schemas.openxmlformats.org/drawingml/2006/main" xmlns:r="http://schemas.openxmlformats.org/officeDocument/2006/relationships" xmlns:p="http://schemas.openxmlformats.org/presentationml/2006/main">
   <p:cSld>
     <p:spTree>
@@ -6324,7 +7839,7 @@
 </p:sld>
 </file>
 
-<file path=ppt/slides/slide13.xml><?xml version="1.0" encoding="utf-8"?>
+<file path=ppt/slides/slide14.xml><?xml version="1.0" encoding="utf-8"?>
 <p:sld xmlns:a="http://schemas.openxmlformats.org/drawingml/2006/main" xmlns:r="http://schemas.openxmlformats.org/officeDocument/2006/relationships" xmlns:p="http://schemas.openxmlformats.org/presentationml/2006/main">
   <p:cSld>
     <p:spTree>
@@ -6503,7 +8018,7 @@
 </p:sld>
 </file>
 
-<file path=ppt/slides/slide14.xml><?xml version="1.0" encoding="utf-8"?>
+<file path=ppt/slides/slide15.xml><?xml version="1.0" encoding="utf-8"?>
 <p:sld xmlns:a="http://schemas.openxmlformats.org/drawingml/2006/main" xmlns:r="http://schemas.openxmlformats.org/officeDocument/2006/relationships" xmlns:p="http://schemas.openxmlformats.org/presentationml/2006/main">
   <p:cSld>
     <p:spTree>
@@ -6755,7 +8270,7 @@
 </p:sld>
 </file>
 
-<file path=ppt/slides/slide15.xml><?xml version="1.0" encoding="utf-8"?>
+<file path=ppt/slides/slide16.xml><?xml version="1.0" encoding="utf-8"?>
 <p:sld xmlns:a="http://schemas.openxmlformats.org/drawingml/2006/main" xmlns:r="http://schemas.openxmlformats.org/officeDocument/2006/relationships" xmlns:p="http://schemas.openxmlformats.org/presentationml/2006/main">
   <p:cSld>
     <p:spTree>
@@ -7512,128 +9027,6 @@
 </p:sld>
 </file>
 
-<file path=ppt/slides/slide16.xml><?xml version="1.0" encoding="utf-8"?>
-<p:sld xmlns:a="http://schemas.openxmlformats.org/drawingml/2006/main" xmlns:r="http://schemas.openxmlformats.org/officeDocument/2006/relationships" xmlns:p="http://schemas.openxmlformats.org/presentationml/2006/main">
-  <p:cSld>
-    <p:spTree>
-      <p:nvGrpSpPr>
-        <p:cNvPr id="1" name=""/>
-        <p:cNvGrpSpPr/>
-        <p:nvPr/>
-      </p:nvGrpSpPr>
-      <p:grpSpPr>
-        <a:xfrm>
-          <a:off x="0" y="0"/>
-          <a:ext cx="0" cy="0"/>
-          <a:chOff x="0" y="0"/>
-          <a:chExt cx="0" cy="0"/>
-        </a:xfrm>
-      </p:grpSpPr>
-      <p:sp>
-        <p:nvSpPr>
-          <p:cNvPr id="2" name="Title 1"/>
-          <p:cNvSpPr>
-            <a:spLocks noGrp="1"/>
-          </p:cNvSpPr>
-          <p:nvPr>
-            <p:ph type="title"/>
-          </p:nvPr>
-        </p:nvSpPr>
-        <p:spPr/>
-        <p:txBody>
-          <a:bodyPr/>
-          <a:lstStyle/>
-          <a:p>
-            <a:r>
-              <a:rPr lang="en-GB" dirty="0" smtClean="0"/>
-              <a:t>Narrative CV</a:t>
-            </a:r>
-            <a:endParaRPr lang="en-GB" dirty="0"/>
-          </a:p>
-        </p:txBody>
-      </p:sp>
-      <p:sp>
-        <p:nvSpPr>
-          <p:cNvPr id="3" name="Content Placeholder 2"/>
-          <p:cNvSpPr>
-            <a:spLocks noGrp="1"/>
-          </p:cNvSpPr>
-          <p:nvPr>
-            <p:ph idx="1"/>
-          </p:nvPr>
-        </p:nvSpPr>
-        <p:spPr/>
-        <p:txBody>
-          <a:bodyPr>
-            <a:normAutofit/>
-          </a:bodyPr>
-          <a:lstStyle/>
-          <a:p>
-            <a:pPr lvl="0"/>
-            <a:r>
-              <a:rPr lang="en-IE" dirty="0"/>
-              <a:t>Generation of Knowledge</a:t>
-            </a:r>
-            <a:endParaRPr lang="en-GB" dirty="0"/>
-          </a:p>
-          <a:p>
-            <a:pPr lvl="0"/>
-            <a:r>
-              <a:rPr lang="en-IE" dirty="0"/>
-              <a:t>Development of Individuals and Collaborations  </a:t>
-            </a:r>
-            <a:endParaRPr lang="en-GB" dirty="0"/>
-          </a:p>
-          <a:p>
-            <a:pPr lvl="0"/>
-            <a:r>
-              <a:rPr lang="en-IE" dirty="0"/>
-              <a:t>Supporting Broader Society and the Economy  </a:t>
-            </a:r>
-            <a:endParaRPr lang="en-GB" dirty="0"/>
-          </a:p>
-          <a:p>
-            <a:pPr lvl="0"/>
-            <a:r>
-              <a:rPr lang="en-IE" dirty="0"/>
-              <a:t>Supporting the Research Community </a:t>
-            </a:r>
-            <a:endParaRPr lang="en-GB" dirty="0"/>
-          </a:p>
-          <a:p>
-            <a:pPr marL="0" indent="0">
-              <a:buNone/>
-            </a:pPr>
-            <a:endParaRPr lang="en-GB" dirty="0" smtClean="0"/>
-          </a:p>
-          <a:p>
-            <a:pPr marL="0" indent="0">
-              <a:buNone/>
-            </a:pPr>
-            <a:endParaRPr lang="en-GB" dirty="0"/>
-          </a:p>
-        </p:txBody>
-      </p:sp>
-    </p:spTree>
-    <p:extLst>
-      <p:ext uri="{BB962C8B-B14F-4D97-AF65-F5344CB8AC3E}">
-        <p14:creationId xmlns:p14="http://schemas.microsoft.com/office/powerpoint/2010/main" val="3839339038"/>
-      </p:ext>
-    </p:extLst>
-  </p:cSld>
-  <p:clrMapOvr>
-    <a:masterClrMapping/>
-  </p:clrMapOvr>
-  <p:timing>
-    <p:tnLst>
-      <p:par>
-        <p:cTn id="1" dur="indefinite" restart="never" nodeType="tmRoot"/>
-      </p:par>
-    </p:tnLst>
-  </p:timing>
-</p:sld>
-</file>
-
 <file path=ppt/slides/slide17.xml><?xml version="1.0" encoding="utf-8"?>
 <p:sld xmlns:a="http://schemas.openxmlformats.org/drawingml/2006/main" xmlns:r="http://schemas.openxmlformats.org/officeDocument/2006/relationships" xmlns:p="http://schemas.openxmlformats.org/presentationml/2006/main">
   <p:cSld>
@@ -7691,71 +9084,42 @@
           </a:bodyPr>
           <a:lstStyle/>
           <a:p>
-            <a:r>
-              <a:rPr lang="en-GB" dirty="0" smtClean="0"/>
-              <a:t>A </a:t>
-            </a:r>
-            <a:r>
-              <a:rPr lang="en-GB" dirty="0"/>
-              <a:t>broad definition of ‘output’ is </a:t>
-            </a:r>
-            <a:r>
-              <a:rPr lang="en-GB" dirty="0" smtClean="0"/>
-              <a:t>used, such </a:t>
-            </a:r>
-            <a:r>
-              <a:rPr lang="en-GB" dirty="0"/>
-              <a:t>as datasets, patents and software.</a:t>
-            </a:r>
-          </a:p>
-          <a:p>
-            <a:r>
-              <a:rPr lang="en-GB" dirty="0" smtClean="0"/>
-              <a:t>Special </a:t>
-            </a:r>
-            <a:r>
-              <a:rPr lang="en-GB" dirty="0"/>
-              <a:t>attention is paid to Open </a:t>
-            </a:r>
-            <a:r>
-              <a:rPr lang="en-GB" dirty="0" smtClean="0"/>
-              <a:t>Science, which outputs </a:t>
-            </a:r>
-            <a:r>
-              <a:rPr lang="en-GB" dirty="0"/>
-              <a:t>are openly available</a:t>
-            </a:r>
-            <a:r>
-              <a:rPr lang="en-GB" dirty="0" smtClean="0"/>
-              <a:t>.</a:t>
-            </a:r>
-          </a:p>
-          <a:p>
-            <a:r>
-              <a:rPr lang="en-US" dirty="0" smtClean="0"/>
-              <a:t>New metrics: retweets, </a:t>
-            </a:r>
-            <a:r>
-              <a:rPr lang="en-US" dirty="0"/>
-              <a:t>online views and </a:t>
-            </a:r>
-            <a:r>
-              <a:rPr lang="en-US" dirty="0" smtClean="0"/>
-              <a:t>downloads</a:t>
-            </a:r>
-            <a:r>
-              <a:rPr lang="en-US" smtClean="0"/>
-              <a:t>, discussions, </a:t>
-            </a:r>
-            <a:r>
-              <a:rPr lang="en-US" dirty="0" smtClean="0"/>
-              <a:t>presence in mass </a:t>
-            </a:r>
-            <a:r>
-              <a:rPr lang="en-US" dirty="0"/>
-              <a:t>media technology platforms</a:t>
+            <a:pPr lvl="0"/>
+            <a:r>
+              <a:rPr lang="en-IE" dirty="0"/>
+              <a:t>Generation of Knowledge</a:t>
             </a:r>
             <a:endParaRPr lang="en-GB" dirty="0"/>
+          </a:p>
+          <a:p>
+            <a:pPr lvl="0"/>
+            <a:r>
+              <a:rPr lang="en-IE" dirty="0"/>
+              <a:t>Development of Individuals and Collaborations  </a:t>
+            </a:r>
+            <a:endParaRPr lang="en-GB" dirty="0"/>
+          </a:p>
+          <a:p>
+            <a:pPr lvl="0"/>
+            <a:r>
+              <a:rPr lang="en-IE" dirty="0"/>
+              <a:t>Supporting Broader Society and the Economy  </a:t>
+            </a:r>
+            <a:endParaRPr lang="en-GB" dirty="0"/>
+          </a:p>
+          <a:p>
+            <a:pPr lvl="0"/>
+            <a:r>
+              <a:rPr lang="en-IE" dirty="0"/>
+              <a:t>Supporting the Research Community </a:t>
+            </a:r>
+            <a:endParaRPr lang="en-GB" dirty="0"/>
+          </a:p>
+          <a:p>
+            <a:pPr marL="0" indent="0">
+              <a:buNone/>
+            </a:pPr>
+            <a:endParaRPr lang="en-GB" dirty="0" smtClean="0"/>
           </a:p>
           <a:p>
             <a:pPr marL="0" indent="0">
@@ -7768,7 +9132,7 @@
     </p:spTree>
     <p:extLst>
       <p:ext uri="{BB962C8B-B14F-4D97-AF65-F5344CB8AC3E}">
-        <p14:creationId xmlns:p14="http://schemas.microsoft.com/office/powerpoint/2010/main" val="1364462461"/>
+        <p14:creationId xmlns:p14="http://schemas.microsoft.com/office/powerpoint/2010/main" val="3839339038"/>
       </p:ext>
     </p:extLst>
   </p:cSld>
@@ -7819,27 +9183,7 @@
           <a:p>
             <a:r>
               <a:rPr lang="en-GB" dirty="0" smtClean="0"/>
-              <a:t>It is </a:t>
-            </a:r>
-            <a:r>
-              <a:rPr lang="pl-PL" dirty="0" smtClean="0"/>
-              <a:t>easier to </a:t>
-            </a:r>
-            <a:r>
-              <a:rPr lang="pl-PL" smtClean="0"/>
-              <a:t>be prep</a:t>
-            </a:r>
-            <a:r>
-              <a:rPr lang="en-GB" smtClean="0"/>
-              <a:t>a</a:t>
-            </a:r>
-            <a:r>
-              <a:rPr lang="pl-PL" smtClean="0"/>
-              <a:t>red </a:t>
-            </a:r>
-            <a:r>
-              <a:rPr lang="pl-PL" dirty="0" smtClean="0"/>
-              <a:t>than to fake it</a:t>
+              <a:t>Narrative CV</a:t>
             </a:r>
             <a:endParaRPr lang="en-GB" dirty="0"/>
           </a:p>
@@ -7864,22 +9208,67 @@
           <a:p>
             <a:r>
               <a:rPr lang="en-GB" dirty="0" smtClean="0"/>
-              <a:t>It takes time to make the outputs public</a:t>
-            </a:r>
-          </a:p>
-          <a:p>
+              <a:t>A </a:t>
+            </a:r>
+            <a:r>
+              <a:rPr lang="en-GB" dirty="0"/>
+              <a:t>broad definition of ‘output’ is </a:t>
+            </a:r>
             <a:r>
               <a:rPr lang="en-GB" dirty="0" smtClean="0"/>
-              <a:t>The quality of open outputs is easy to assess</a:t>
-            </a:r>
-          </a:p>
-          <a:p>
-            <a:endParaRPr lang="en-GB" dirty="0" smtClean="0"/>
+              <a:t>used, such </a:t>
+            </a:r>
+            <a:r>
+              <a:rPr lang="en-GB" dirty="0"/>
+              <a:t>as datasets, patents and software.</a:t>
+            </a:r>
           </a:p>
           <a:p>
             <a:r>
               <a:rPr lang="en-GB" dirty="0" smtClean="0"/>
-              <a:t>Timestamps </a:t>
+              <a:t>Special </a:t>
+            </a:r>
+            <a:r>
+              <a:rPr lang="en-GB" dirty="0"/>
+              <a:t>attention is paid to Open </a:t>
+            </a:r>
+            <a:r>
+              <a:rPr lang="en-GB" dirty="0" smtClean="0"/>
+              <a:t>Science, which outputs </a:t>
+            </a:r>
+            <a:r>
+              <a:rPr lang="en-GB" dirty="0"/>
+              <a:t>are openly available</a:t>
+            </a:r>
+            <a:r>
+              <a:rPr lang="en-GB" dirty="0" smtClean="0"/>
+              <a:t>.</a:t>
+            </a:r>
+          </a:p>
+          <a:p>
+            <a:r>
+              <a:rPr lang="en-US" dirty="0" smtClean="0"/>
+              <a:t>New metrics: retweets, </a:t>
+            </a:r>
+            <a:r>
+              <a:rPr lang="en-US" dirty="0"/>
+              <a:t>online views and </a:t>
+            </a:r>
+            <a:r>
+              <a:rPr lang="en-US" dirty="0" smtClean="0"/>
+              <a:t>downloads</a:t>
+            </a:r>
+            <a:r>
+              <a:rPr lang="en-US" smtClean="0"/>
+              <a:t>, discussions, </a:t>
+            </a:r>
+            <a:r>
+              <a:rPr lang="en-US" dirty="0" smtClean="0"/>
+              <a:t>presence in mass </a:t>
+            </a:r>
+            <a:r>
+              <a:rPr lang="en-US" dirty="0"/>
+              <a:t>media technology platforms</a:t>
             </a:r>
             <a:endParaRPr lang="en-GB" dirty="0"/>
           </a:p>
@@ -7894,7 +9283,7 @@
     </p:spTree>
     <p:extLst>
       <p:ext uri="{BB962C8B-B14F-4D97-AF65-F5344CB8AC3E}">
-        <p14:creationId xmlns:p14="http://schemas.microsoft.com/office/powerpoint/2010/main" val="4706951"/>
+        <p14:creationId xmlns:p14="http://schemas.microsoft.com/office/powerpoint/2010/main" val="1364462461"/>
       </p:ext>
     </p:extLst>
   </p:cSld>
@@ -7943,7 +9332,31 @@
           <a:bodyPr/>
           <a:lstStyle/>
           <a:p>
-            <a:endParaRPr lang="en-GB"/>
+            <a:r>
+              <a:rPr lang="en-GB" dirty="0" smtClean="0"/>
+              <a:t>It is </a:t>
+            </a:r>
+            <a:r>
+              <a:rPr lang="pl-PL" dirty="0" smtClean="0"/>
+              <a:t>easier to </a:t>
+            </a:r>
+            <a:r>
+              <a:rPr lang="pl-PL" smtClean="0"/>
+              <a:t>be prep</a:t>
+            </a:r>
+            <a:r>
+              <a:rPr lang="en-GB" smtClean="0"/>
+              <a:t>a</a:t>
+            </a:r>
+            <a:r>
+              <a:rPr lang="pl-PL" smtClean="0"/>
+              <a:t>red </a:t>
+            </a:r>
+            <a:r>
+              <a:rPr lang="pl-PL" dirty="0" smtClean="0"/>
+              <a:t>than to fake it</a:t>
+            </a:r>
+            <a:endParaRPr lang="en-GB" dirty="0"/>
           </a:p>
         </p:txBody>
       </p:sp>
@@ -7959,36 +9372,44 @@
         </p:nvSpPr>
         <p:spPr/>
         <p:txBody>
-          <a:bodyPr/>
+          <a:bodyPr>
+            <a:normAutofit/>
+          </a:bodyPr>
           <a:lstStyle/>
+          <a:p>
+            <a:r>
+              <a:rPr lang="en-GB" dirty="0" smtClean="0"/>
+              <a:t>It takes time to make the outputs public</a:t>
+            </a:r>
+          </a:p>
+          <a:p>
+            <a:r>
+              <a:rPr lang="en-GB" dirty="0" smtClean="0"/>
+              <a:t>The quality of open outputs is easy to assess</a:t>
+            </a:r>
+          </a:p>
+          <a:p>
+            <a:endParaRPr lang="en-GB" dirty="0" smtClean="0"/>
+          </a:p>
+          <a:p>
+            <a:r>
+              <a:rPr lang="en-GB" dirty="0" smtClean="0"/>
+              <a:t>Timestamps </a:t>
+            </a:r>
+            <a:endParaRPr lang="en-GB" dirty="0"/>
+          </a:p>
           <a:p>
             <a:pPr marL="0" indent="0">
               <a:buNone/>
             </a:pPr>
-            <a:endParaRPr lang="pl-PL" dirty="0"/>
-          </a:p>
-          <a:p>
-            <a:pPr marL="0" indent="0">
-              <a:buNone/>
-            </a:pPr>
-            <a:endParaRPr lang="pl-PL" sz="4000" dirty="0"/>
-          </a:p>
-          <a:p>
-            <a:pPr marL="0" indent="0" algn="ctr">
-              <a:buNone/>
-            </a:pPr>
-            <a:r>
-              <a:rPr lang="en-GB" sz="4000" dirty="0" smtClean="0"/>
-              <a:t>Why you should do it</a:t>
-            </a:r>
-            <a:endParaRPr lang="en-GB" sz="4000" dirty="0"/>
+            <a:endParaRPr lang="en-GB" dirty="0"/>
           </a:p>
         </p:txBody>
       </p:sp>
     </p:spTree>
     <p:extLst>
       <p:ext uri="{BB962C8B-B14F-4D97-AF65-F5344CB8AC3E}">
-        <p14:creationId xmlns:p14="http://schemas.microsoft.com/office/powerpoint/2010/main" val="1602811390"/>
+        <p14:creationId xmlns:p14="http://schemas.microsoft.com/office/powerpoint/2010/main" val="4706951"/>
       </p:ext>
     </p:extLst>
   </p:cSld>
@@ -8072,8 +9493,8 @@
               <a:buNone/>
             </a:pPr>
             <a:r>
-              <a:rPr lang="en-GB" sz="4000" dirty="0" smtClean="0"/>
-              <a:t>Who we are and what we do</a:t>
+              <a:rPr lang="pl-PL" sz="4000" dirty="0"/>
+              <a:t>Better research by better sharing</a:t>
             </a:r>
             <a:endParaRPr lang="en-GB" sz="4000" dirty="0"/>
           </a:p>
@@ -8082,7 +9503,7 @@
     </p:spTree>
     <p:extLst>
       <p:ext uri="{BB962C8B-B14F-4D97-AF65-F5344CB8AC3E}">
-        <p14:creationId xmlns:p14="http://schemas.microsoft.com/office/powerpoint/2010/main" val="1895074327"/>
+        <p14:creationId xmlns:p14="http://schemas.microsoft.com/office/powerpoint/2010/main" val="759538198"/>
       </p:ext>
     </p:extLst>
   </p:cSld>
@@ -8131,11 +9552,7 @@
           <a:bodyPr/>
           <a:lstStyle/>
           <a:p>
-            <a:r>
-              <a:rPr lang="en-GB" dirty="0" smtClean="0"/>
-              <a:t>Hit by bus</a:t>
-            </a:r>
-            <a:endParaRPr lang="en-GB" dirty="0"/>
+            <a:endParaRPr lang="en-GB"/>
           </a:p>
         </p:txBody>
       </p:sp>
@@ -8165,12 +9582,22 @@
             </a:pPr>
             <a:endParaRPr lang="pl-PL" sz="4000" dirty="0"/>
           </a:p>
+          <a:p>
+            <a:pPr marL="0" indent="0" algn="ctr">
+              <a:buNone/>
+            </a:pPr>
+            <a:r>
+              <a:rPr lang="en-GB" sz="4000" dirty="0" smtClean="0"/>
+              <a:t>Why you should do it</a:t>
+            </a:r>
+            <a:endParaRPr lang="en-GB" sz="4000" dirty="0"/>
+          </a:p>
         </p:txBody>
       </p:sp>
     </p:spTree>
     <p:extLst>
       <p:ext uri="{BB962C8B-B14F-4D97-AF65-F5344CB8AC3E}">
-        <p14:creationId xmlns:p14="http://schemas.microsoft.com/office/powerpoint/2010/main" val="3118666459"/>
+        <p14:creationId xmlns:p14="http://schemas.microsoft.com/office/powerpoint/2010/main" val="1602811390"/>
       </p:ext>
     </p:extLst>
   </p:cSld>
@@ -8239,9 +9666,7 @@
         </p:nvSpPr>
         <p:spPr/>
         <p:txBody>
-          <a:bodyPr>
-            <a:normAutofit/>
-          </a:bodyPr>
+          <a:bodyPr/>
           <a:lstStyle/>
           <a:p>
             <a:pPr marL="0" indent="0">
@@ -8253,73 +9678,6 @@
             <a:pPr marL="0" indent="0">
               <a:buNone/>
             </a:pPr>
-            <a:r>
-              <a:rPr lang="en-GB" sz="4000" dirty="0" smtClean="0"/>
-              <a:t>Good data management</a:t>
-            </a:r>
-            <a:r>
-              <a:rPr lang="pl-PL" sz="4000" dirty="0" smtClean="0"/>
-              <a:t>:</a:t>
-            </a:r>
-          </a:p>
-          <a:p>
-            <a:pPr>
-              <a:buFontTx/>
-              <a:buChar char="-"/>
-            </a:pPr>
-            <a:r>
-              <a:rPr lang="en-GB" sz="4000" dirty="0" smtClean="0"/>
-              <a:t>improve</a:t>
-            </a:r>
-            <a:r>
-              <a:rPr lang="pl-PL" sz="4000" dirty="0" smtClean="0"/>
-              <a:t>s</a:t>
-            </a:r>
-            <a:r>
-              <a:rPr lang="en-GB" sz="4000" dirty="0" smtClean="0"/>
-              <a:t> productivity</a:t>
-            </a:r>
-            <a:endParaRPr lang="pl-PL" sz="4000" dirty="0" smtClean="0"/>
-          </a:p>
-          <a:p>
-            <a:pPr>
-              <a:buFontTx/>
-              <a:buChar char="-"/>
-            </a:pPr>
-            <a:r>
-              <a:rPr lang="en-GB" sz="4000" dirty="0" smtClean="0"/>
-              <a:t>assure</a:t>
-            </a:r>
-            <a:r>
-              <a:rPr lang="pl-PL" sz="4000" dirty="0" smtClean="0"/>
-              <a:t>s</a:t>
-            </a:r>
-            <a:r>
-              <a:rPr lang="en-GB" sz="4000" dirty="0" smtClean="0"/>
-              <a:t> safety of your research</a:t>
-            </a:r>
-            <a:endParaRPr lang="pl-PL" sz="4000" dirty="0" smtClean="0"/>
-          </a:p>
-          <a:p>
-            <a:pPr>
-              <a:buFontTx/>
-              <a:buChar char="-"/>
-            </a:pPr>
-            <a:r>
-              <a:rPr lang="en-GB" sz="4000" dirty="0" smtClean="0"/>
-              <a:t>speeds up induction</a:t>
-            </a:r>
-            <a:endParaRPr lang="pl-PL" sz="4000" dirty="0" smtClean="0"/>
-          </a:p>
-          <a:p>
-            <a:pPr>
-              <a:buFontTx/>
-              <a:buChar char="-"/>
-            </a:pPr>
-            <a:r>
-              <a:rPr lang="en-GB" sz="4000" dirty="0" smtClean="0"/>
-              <a:t>makes it easier to generate public outputs</a:t>
-            </a:r>
             <a:endParaRPr lang="pl-PL" sz="4000" dirty="0"/>
           </a:p>
         </p:txBody>
@@ -8327,7 +9685,7 @@
     </p:spTree>
     <p:extLst>
       <p:ext uri="{BB962C8B-B14F-4D97-AF65-F5344CB8AC3E}">
-        <p14:creationId xmlns:p14="http://schemas.microsoft.com/office/powerpoint/2010/main" val="3864240304"/>
+        <p14:creationId xmlns:p14="http://schemas.microsoft.com/office/powerpoint/2010/main" val="3118666459"/>
       </p:ext>
     </p:extLst>
   </p:cSld>
@@ -8363,6 +9721,163 @@
       </p:grpSpPr>
       <p:sp>
         <p:nvSpPr>
+          <p:cNvPr id="2" name="Title 1"/>
+          <p:cNvSpPr>
+            <a:spLocks noGrp="1"/>
+          </p:cNvSpPr>
+          <p:nvPr>
+            <p:ph type="title"/>
+          </p:nvPr>
+        </p:nvSpPr>
+        <p:spPr/>
+        <p:txBody>
+          <a:bodyPr/>
+          <a:lstStyle/>
+          <a:p>
+            <a:r>
+              <a:rPr lang="en-GB" dirty="0" smtClean="0"/>
+              <a:t>Hit by bus</a:t>
+            </a:r>
+            <a:endParaRPr lang="en-GB" dirty="0"/>
+          </a:p>
+        </p:txBody>
+      </p:sp>
+      <p:sp>
+        <p:nvSpPr>
+          <p:cNvPr id="3" name="Content Placeholder 2"/>
+          <p:cNvSpPr>
+            <a:spLocks noGrp="1"/>
+          </p:cNvSpPr>
+          <p:nvPr>
+            <p:ph idx="1"/>
+          </p:nvPr>
+        </p:nvSpPr>
+        <p:spPr/>
+        <p:txBody>
+          <a:bodyPr>
+            <a:normAutofit/>
+          </a:bodyPr>
+          <a:lstStyle/>
+          <a:p>
+            <a:pPr marL="0" indent="0">
+              <a:buNone/>
+            </a:pPr>
+            <a:endParaRPr lang="pl-PL" dirty="0"/>
+          </a:p>
+          <a:p>
+            <a:pPr marL="0" indent="0">
+              <a:buNone/>
+            </a:pPr>
+            <a:r>
+              <a:rPr lang="en-GB" sz="4000" dirty="0" smtClean="0"/>
+              <a:t>Good data management</a:t>
+            </a:r>
+            <a:r>
+              <a:rPr lang="pl-PL" sz="4000" dirty="0" smtClean="0"/>
+              <a:t>:</a:t>
+            </a:r>
+          </a:p>
+          <a:p>
+            <a:pPr>
+              <a:buFontTx/>
+              <a:buChar char="-"/>
+            </a:pPr>
+            <a:r>
+              <a:rPr lang="en-GB" sz="4000" dirty="0" smtClean="0"/>
+              <a:t>improve</a:t>
+            </a:r>
+            <a:r>
+              <a:rPr lang="pl-PL" sz="4000" dirty="0" smtClean="0"/>
+              <a:t>s</a:t>
+            </a:r>
+            <a:r>
+              <a:rPr lang="en-GB" sz="4000" dirty="0" smtClean="0"/>
+              <a:t> productivity</a:t>
+            </a:r>
+            <a:endParaRPr lang="pl-PL" sz="4000" dirty="0" smtClean="0"/>
+          </a:p>
+          <a:p>
+            <a:pPr>
+              <a:buFontTx/>
+              <a:buChar char="-"/>
+            </a:pPr>
+            <a:r>
+              <a:rPr lang="en-GB" sz="4000" dirty="0" smtClean="0"/>
+              <a:t>assure</a:t>
+            </a:r>
+            <a:r>
+              <a:rPr lang="pl-PL" sz="4000" dirty="0" smtClean="0"/>
+              <a:t>s</a:t>
+            </a:r>
+            <a:r>
+              <a:rPr lang="en-GB" sz="4000" dirty="0" smtClean="0"/>
+              <a:t> safety of your research</a:t>
+            </a:r>
+            <a:endParaRPr lang="pl-PL" sz="4000" dirty="0" smtClean="0"/>
+          </a:p>
+          <a:p>
+            <a:pPr>
+              <a:buFontTx/>
+              <a:buChar char="-"/>
+            </a:pPr>
+            <a:r>
+              <a:rPr lang="en-GB" sz="4000" dirty="0" smtClean="0"/>
+              <a:t>speeds up induction</a:t>
+            </a:r>
+            <a:endParaRPr lang="pl-PL" sz="4000" dirty="0" smtClean="0"/>
+          </a:p>
+          <a:p>
+            <a:pPr>
+              <a:buFontTx/>
+              <a:buChar char="-"/>
+            </a:pPr>
+            <a:r>
+              <a:rPr lang="en-GB" sz="4000" dirty="0" smtClean="0"/>
+              <a:t>makes it easier to generate public outputs</a:t>
+            </a:r>
+            <a:endParaRPr lang="pl-PL" sz="4000" dirty="0"/>
+          </a:p>
+        </p:txBody>
+      </p:sp>
+    </p:spTree>
+    <p:extLst>
+      <p:ext uri="{BB962C8B-B14F-4D97-AF65-F5344CB8AC3E}">
+        <p14:creationId xmlns:p14="http://schemas.microsoft.com/office/powerpoint/2010/main" val="3864240304"/>
+      </p:ext>
+    </p:extLst>
+  </p:cSld>
+  <p:clrMapOvr>
+    <a:masterClrMapping/>
+  </p:clrMapOvr>
+  <p:timing>
+    <p:tnLst>
+      <p:par>
+        <p:cTn id="1" dur="indefinite" restart="never" nodeType="tmRoot"/>
+      </p:par>
+    </p:tnLst>
+  </p:timing>
+</p:sld>
+</file>
+
+<file path=ppt/slides/slide23.xml><?xml version="1.0" encoding="utf-8"?>
+<p:sld xmlns:a="http://schemas.openxmlformats.org/drawingml/2006/main" xmlns:r="http://schemas.openxmlformats.org/officeDocument/2006/relationships" xmlns:p="http://schemas.openxmlformats.org/presentationml/2006/main">
+  <p:cSld>
+    <p:spTree>
+      <p:nvGrpSpPr>
+        <p:cNvPr id="1" name=""/>
+        <p:cNvGrpSpPr/>
+        <p:nvPr/>
+      </p:nvGrpSpPr>
+      <p:grpSpPr>
+        <a:xfrm>
+          <a:off x="0" y="0"/>
+          <a:ext cx="0" cy="0"/>
+          <a:chOff x="0" y="0"/>
+          <a:chExt cx="0" cy="0"/>
+        </a:xfrm>
+      </p:grpSpPr>
+      <p:sp>
+        <p:nvSpPr>
           <p:cNvPr id="5" name="Title 1"/>
           <p:cNvSpPr>
             <a:spLocks noGrp="1"/>
@@ -8478,7 +9993,7 @@
 </p:sld>
 </file>
 
-<file path=ppt/slides/slide23.xml><?xml version="1.0" encoding="utf-8"?>
+<file path=ppt/slides/slide24.xml><?xml version="1.0" encoding="utf-8"?>
 <p:sld xmlns:a="http://schemas.openxmlformats.org/drawingml/2006/main" xmlns:r="http://schemas.openxmlformats.org/officeDocument/2006/relationships" xmlns:p="http://schemas.openxmlformats.org/presentationml/2006/main">
   <p:cSld>
     <p:spTree>
@@ -8942,7 +10457,11 @@
           <a:bodyPr/>
           <a:lstStyle/>
           <a:p>
-            <a:endParaRPr lang="en-GB"/>
+            <a:r>
+              <a:rPr lang="en-GB" dirty="0" smtClean="0"/>
+              <a:t>Better research by better sharing</a:t>
+            </a:r>
+            <a:endParaRPr lang="en-GB" dirty="0"/>
           </a:p>
         </p:txBody>
       </p:sp>
@@ -8958,36 +10477,106 @@
         </p:nvSpPr>
         <p:spPr/>
         <p:txBody>
-          <a:bodyPr/>
+          <a:bodyPr>
+            <a:normAutofit/>
+          </a:bodyPr>
           <a:lstStyle/>
           <a:p>
-            <a:pPr marL="0" indent="0">
-              <a:buNone/>
-            </a:pPr>
-            <a:endParaRPr lang="pl-PL" dirty="0"/>
-          </a:p>
-          <a:p>
-            <a:pPr marL="0" indent="0">
-              <a:buNone/>
-            </a:pPr>
-            <a:endParaRPr lang="pl-PL" sz="4000" dirty="0"/>
-          </a:p>
-          <a:p>
-            <a:pPr marL="0" indent="0" algn="ctr">
-              <a:buNone/>
-            </a:pPr>
-            <a:r>
-              <a:rPr lang="pl-PL" sz="4000" dirty="0"/>
-              <a:t>Better research by better sharing</a:t>
-            </a:r>
-            <a:endParaRPr lang="en-GB" sz="4000" dirty="0"/>
+            <a:r>
+              <a:rPr lang="en-GB" sz="3200" dirty="0" smtClean="0"/>
+              <a:t>why </a:t>
+            </a:r>
+            <a:r>
+              <a:rPr lang="en-GB" sz="3200" dirty="0"/>
+              <a:t>you should know about Open </a:t>
+            </a:r>
+            <a:r>
+              <a:rPr lang="en-GB" sz="3200" dirty="0" smtClean="0"/>
+              <a:t>Science</a:t>
+            </a:r>
+            <a:r>
+              <a:rPr lang="en-GB" sz="3200" dirty="0"/>
+              <a:t>, FAIR and </a:t>
+            </a:r>
+            <a:r>
+              <a:rPr lang="en-GB" sz="3200" dirty="0" smtClean="0"/>
+              <a:t>data management </a:t>
+            </a:r>
+          </a:p>
+          <a:p>
+            <a:endParaRPr lang="en-GB" sz="3200" dirty="0" smtClean="0"/>
+          </a:p>
+          <a:p>
+            <a:r>
+              <a:rPr lang="en-GB" sz="3200" dirty="0" smtClean="0"/>
+              <a:t>how </a:t>
+            </a:r>
+            <a:r>
+              <a:rPr lang="en-GB" sz="3200" dirty="0"/>
+              <a:t>adoption of </a:t>
+            </a:r>
+            <a:r>
+              <a:rPr lang="en-GB" sz="3200" dirty="0" smtClean="0"/>
+              <a:t>these </a:t>
+            </a:r>
+            <a:r>
+              <a:rPr lang="en-GB" sz="3200" dirty="0"/>
+              <a:t>practices benefits </a:t>
+            </a:r>
+            <a:r>
+              <a:rPr lang="en-GB" sz="3200" dirty="0" smtClean="0"/>
+              <a:t>your </a:t>
+            </a:r>
+            <a:r>
+              <a:rPr lang="en-GB" sz="3200" dirty="0"/>
+              <a:t>group/organization by: </a:t>
+            </a:r>
+            <a:endParaRPr lang="en-GB" sz="3200" dirty="0" smtClean="0"/>
+          </a:p>
+          <a:p>
+            <a:pPr lvl="1"/>
+            <a:r>
+              <a:rPr lang="en-GB" sz="2800" dirty="0" smtClean="0"/>
+              <a:t>improving </a:t>
+            </a:r>
+            <a:r>
+              <a:rPr lang="en-GB" sz="2800" dirty="0"/>
+              <a:t>productivity </a:t>
+            </a:r>
+            <a:endParaRPr lang="en-GB" sz="2800" dirty="0" smtClean="0"/>
+          </a:p>
+          <a:p>
+            <a:pPr lvl="1"/>
+            <a:r>
+              <a:rPr lang="en-GB" sz="2800" dirty="0" smtClean="0"/>
+              <a:t>speeding </a:t>
+            </a:r>
+            <a:r>
+              <a:rPr lang="en-GB" sz="2800" dirty="0"/>
+              <a:t>up </a:t>
+            </a:r>
+            <a:r>
+              <a:rPr lang="en-GB" sz="2800" dirty="0" smtClean="0"/>
+              <a:t>inductions</a:t>
+            </a:r>
+          </a:p>
+          <a:p>
+            <a:pPr lvl="1"/>
+            <a:r>
+              <a:rPr lang="en-GB" sz="2800" dirty="0" smtClean="0"/>
+              <a:t>helping </a:t>
+            </a:r>
+            <a:r>
+              <a:rPr lang="en-GB" sz="2800" dirty="0"/>
+              <a:t>with your managerial responsibilities</a:t>
+            </a:r>
           </a:p>
         </p:txBody>
       </p:sp>
     </p:spTree>
     <p:extLst>
       <p:ext uri="{BB962C8B-B14F-4D97-AF65-F5344CB8AC3E}">
-        <p14:creationId xmlns:p14="http://schemas.microsoft.com/office/powerpoint/2010/main" val="759538198"/>
+        <p14:creationId xmlns:p14="http://schemas.microsoft.com/office/powerpoint/2010/main" val="1429238559"/>
       </p:ext>
     </p:extLst>
   </p:cSld>
@@ -9005,6 +10594,100 @@
 </file>
 
 <file path=ppt/slides/slide4.xml><?xml version="1.0" encoding="utf-8"?>
+<p:sld xmlns:a="http://schemas.openxmlformats.org/drawingml/2006/main" xmlns:r="http://schemas.openxmlformats.org/officeDocument/2006/relationships" xmlns:p="http://schemas.openxmlformats.org/presentationml/2006/main">
+  <p:cSld>
+    <p:spTree>
+      <p:nvGrpSpPr>
+        <p:cNvPr id="1" name=""/>
+        <p:cNvGrpSpPr/>
+        <p:nvPr/>
+      </p:nvGrpSpPr>
+      <p:grpSpPr>
+        <a:xfrm>
+          <a:off x="0" y="0"/>
+          <a:ext cx="0" cy="0"/>
+          <a:chOff x="0" y="0"/>
+          <a:chExt cx="0" cy="0"/>
+        </a:xfrm>
+      </p:grpSpPr>
+      <p:sp>
+        <p:nvSpPr>
+          <p:cNvPr id="2" name="Title 1"/>
+          <p:cNvSpPr>
+            <a:spLocks noGrp="1"/>
+          </p:cNvSpPr>
+          <p:nvPr>
+            <p:ph type="title"/>
+          </p:nvPr>
+        </p:nvSpPr>
+        <p:spPr/>
+        <p:txBody>
+          <a:bodyPr/>
+          <a:lstStyle/>
+          <a:p>
+            <a:endParaRPr lang="en-GB"/>
+          </a:p>
+        </p:txBody>
+      </p:sp>
+      <p:sp>
+        <p:nvSpPr>
+          <p:cNvPr id="3" name="Content Placeholder 2"/>
+          <p:cNvSpPr>
+            <a:spLocks noGrp="1"/>
+          </p:cNvSpPr>
+          <p:nvPr>
+            <p:ph idx="1"/>
+          </p:nvPr>
+        </p:nvSpPr>
+        <p:spPr/>
+        <p:txBody>
+          <a:bodyPr/>
+          <a:lstStyle/>
+          <a:p>
+            <a:pPr marL="0" indent="0">
+              <a:buNone/>
+            </a:pPr>
+            <a:endParaRPr lang="pl-PL" dirty="0"/>
+          </a:p>
+          <a:p>
+            <a:pPr marL="0" indent="0">
+              <a:buNone/>
+            </a:pPr>
+            <a:endParaRPr lang="pl-PL" sz="4000" dirty="0"/>
+          </a:p>
+          <a:p>
+            <a:pPr marL="0" indent="0" algn="ctr">
+              <a:buNone/>
+            </a:pPr>
+            <a:r>
+              <a:rPr lang="en-GB" sz="4000" dirty="0" smtClean="0"/>
+              <a:t>Who we are and what we do</a:t>
+            </a:r>
+            <a:endParaRPr lang="en-GB" sz="4000" dirty="0"/>
+          </a:p>
+        </p:txBody>
+      </p:sp>
+    </p:spTree>
+    <p:extLst>
+      <p:ext uri="{BB962C8B-B14F-4D97-AF65-F5344CB8AC3E}">
+        <p14:creationId xmlns:p14="http://schemas.microsoft.com/office/powerpoint/2010/main" val="1895074327"/>
+      </p:ext>
+    </p:extLst>
+  </p:cSld>
+  <p:clrMapOvr>
+    <a:masterClrMapping/>
+  </p:clrMapOvr>
+  <p:timing>
+    <p:tnLst>
+      <p:par>
+        <p:cTn id="1" dur="indefinite" restart="never" nodeType="tmRoot"/>
+      </p:par>
+    </p:tnLst>
+  </p:timing>
+</p:sld>
+</file>
+
+<file path=ppt/slides/slide5.xml><?xml version="1.0" encoding="utf-8"?>
 <p:sld xmlns:a="http://schemas.openxmlformats.org/drawingml/2006/main" xmlns:r="http://schemas.openxmlformats.org/officeDocument/2006/relationships" xmlns:p="http://schemas.openxmlformats.org/presentationml/2006/main">
   <p:cSld>
     <p:spTree>
@@ -9158,7 +10841,7 @@
 </p:sld>
 </file>
 
-<file path=ppt/slides/slide5.xml><?xml version="1.0" encoding="utf-8"?>
+<file path=ppt/slides/slide6.xml><?xml version="1.0" encoding="utf-8"?>
 <p:sld xmlns:a="http://schemas.openxmlformats.org/drawingml/2006/main" xmlns:r="http://schemas.openxmlformats.org/officeDocument/2006/relationships" xmlns:p="http://schemas.openxmlformats.org/presentationml/2006/main">
   <p:cSld>
     <p:spTree>
@@ -9480,7 +11163,7 @@
                 <a14:useLocalDpi xmlns:a14="http://schemas.microsoft.com/office/drawing/2010/main" val="0"/>
               </a:ext>
               <a:ext uri="{96DAC541-7B7A-43D3-8B79-37D633B846F1}">
-                <asvg:svgBlip xmlns:asvg="http://schemas.microsoft.com/office/drawing/2016/SVG/main" xmlns="" r:embed="rId3"/>
+                <asvg:svgBlip xmlns="" xmlns:asvg="http://schemas.microsoft.com/office/drawing/2016/SVG/main" r:embed="rId3"/>
               </a:ext>
             </a:extLst>
           </a:blip>
@@ -9519,7 +11202,7 @@
                 <a14:useLocalDpi xmlns:a14="http://schemas.microsoft.com/office/drawing/2010/main" val="0"/>
               </a:ext>
               <a:ext uri="{96DAC541-7B7A-43D3-8B79-37D633B846F1}">
-                <asvg:svgBlip xmlns:asvg="http://schemas.microsoft.com/office/drawing/2016/SVG/main" xmlns="" r:embed="rId5"/>
+                <asvg:svgBlip xmlns="" xmlns:asvg="http://schemas.microsoft.com/office/drawing/2016/SVG/main" r:embed="rId5"/>
               </a:ext>
             </a:extLst>
           </a:blip>
@@ -9558,7 +11241,7 @@
                 <a14:useLocalDpi xmlns:a14="http://schemas.microsoft.com/office/drawing/2010/main" val="0"/>
               </a:ext>
               <a:ext uri="{96DAC541-7B7A-43D3-8B79-37D633B846F1}">
-                <asvg:svgBlip xmlns:asvg="http://schemas.microsoft.com/office/drawing/2016/SVG/main" xmlns="" r:embed="rId7"/>
+                <asvg:svgBlip xmlns="" xmlns:asvg="http://schemas.microsoft.com/office/drawing/2016/SVG/main" r:embed="rId7"/>
               </a:ext>
             </a:extLst>
           </a:blip>
@@ -9597,7 +11280,7 @@
                 <a14:useLocalDpi xmlns:a14="http://schemas.microsoft.com/office/drawing/2010/main" val="0"/>
               </a:ext>
               <a:ext uri="{96DAC541-7B7A-43D3-8B79-37D633B846F1}">
-                <asvg:svgBlip xmlns:asvg="http://schemas.microsoft.com/office/drawing/2016/SVG/main" xmlns="" r:embed="rId9"/>
+                <asvg:svgBlip xmlns="" xmlns:asvg="http://schemas.microsoft.com/office/drawing/2016/SVG/main" r:embed="rId9"/>
               </a:ext>
             </a:extLst>
           </a:blip>
@@ -9636,7 +11319,7 @@
                 <a14:useLocalDpi xmlns:a14="http://schemas.microsoft.com/office/drawing/2010/main" val="0"/>
               </a:ext>
               <a:ext uri="{96DAC541-7B7A-43D3-8B79-37D633B846F1}">
-                <asvg:svgBlip xmlns:asvg="http://schemas.microsoft.com/office/drawing/2016/SVG/main" xmlns="" r:embed="rId11"/>
+                <asvg:svgBlip xmlns="" xmlns:asvg="http://schemas.microsoft.com/office/drawing/2016/SVG/main" r:embed="rId11"/>
               </a:ext>
             </a:extLst>
           </a:blip>
@@ -9675,7 +11358,7 @@
                 <a14:useLocalDpi xmlns:a14="http://schemas.microsoft.com/office/drawing/2010/main" val="0"/>
               </a:ext>
               <a:ext uri="{96DAC541-7B7A-43D3-8B79-37D633B846F1}">
-                <asvg:svgBlip xmlns:asvg="http://schemas.microsoft.com/office/drawing/2016/SVG/main" xmlns="" r:embed="rId13"/>
+                <asvg:svgBlip xmlns="" xmlns:asvg="http://schemas.microsoft.com/office/drawing/2016/SVG/main" r:embed="rId13"/>
               </a:ext>
             </a:extLst>
           </a:blip>
@@ -9795,7 +11478,7 @@
 </p:sld>
 </file>
 
-<file path=ppt/slides/slide6.xml><?xml version="1.0" encoding="utf-8"?>
+<file path=ppt/slides/slide7.xml><?xml version="1.0" encoding="utf-8"?>
 <p:sld xmlns:a="http://schemas.openxmlformats.org/drawingml/2006/main" xmlns:r="http://schemas.openxmlformats.org/officeDocument/2006/relationships" xmlns:p="http://schemas.openxmlformats.org/presentationml/2006/main">
   <p:cSld>
     <p:spTree>
@@ -9931,7 +11614,7 @@
 </p:sld>
 </file>
 
-<file path=ppt/slides/slide7.xml><?xml version="1.0" encoding="utf-8"?>
+<file path=ppt/slides/slide8.xml><?xml version="1.0" encoding="utf-8"?>
 <p:sld xmlns:a="http://schemas.openxmlformats.org/drawingml/2006/main" xmlns:r="http://schemas.openxmlformats.org/officeDocument/2006/relationships" xmlns:p="http://schemas.openxmlformats.org/presentationml/2006/main">
   <p:cSld>
     <p:spTree>
@@ -10039,7 +11722,7 @@
                 <a14:useLocalDpi xmlns:a14="http://schemas.microsoft.com/office/drawing/2010/main" val="0"/>
               </a:ext>
               <a:ext uri="{96DAC541-7B7A-43D3-8B79-37D633B846F1}">
-                <asvg:svgBlip xmlns:asvg="http://schemas.microsoft.com/office/drawing/2016/SVG/main" xmlns="" r:embed="rId3"/>
+                <asvg:svgBlip xmlns="" xmlns:asvg="http://schemas.microsoft.com/office/drawing/2016/SVG/main" r:embed="rId3"/>
               </a:ext>
             </a:extLst>
           </a:blip>
@@ -10077,7 +11760,7 @@
 </p:sld>
 </file>
 
-<file path=ppt/slides/slide8.xml><?xml version="1.0" encoding="utf-8"?>
+<file path=ppt/slides/slide9.xml><?xml version="1.0" encoding="utf-8"?>
 <p:sld xmlns:a="http://schemas.openxmlformats.org/drawingml/2006/main" xmlns:r="http://schemas.openxmlformats.org/officeDocument/2006/relationships" xmlns:p="http://schemas.openxmlformats.org/presentationml/2006/main">
   <p:cSld>
     <p:spTree>
@@ -10254,7 +11937,7 @@
                 <a14:useLocalDpi xmlns:a14="http://schemas.microsoft.com/office/drawing/2010/main" val="0"/>
               </a:ext>
               <a:ext uri="{96DAC541-7B7A-43D3-8B79-37D633B846F1}">
-                <asvg:svgBlip xmlns:asvg="http://schemas.microsoft.com/office/drawing/2016/SVG/main" xmlns="" r:embed="rId3"/>
+                <asvg:svgBlip xmlns="" xmlns:asvg="http://schemas.microsoft.com/office/drawing/2016/SVG/main" r:embed="rId3"/>
               </a:ext>
             </a:extLst>
           </a:blip>
@@ -10276,1520 +11959,6 @@
     <p:extLst>
       <p:ext uri="{BB962C8B-B14F-4D97-AF65-F5344CB8AC3E}">
         <p14:creationId xmlns:p14="http://schemas.microsoft.com/office/powerpoint/2010/main" val="1509898712"/>
-      </p:ext>
-    </p:extLst>
-  </p:cSld>
-  <p:clrMapOvr>
-    <a:masterClrMapping/>
-  </p:clrMapOvr>
-  <p:timing>
-    <p:tnLst>
-      <p:par>
-        <p:cTn id="1" dur="indefinite" restart="never" nodeType="tmRoot"/>
-      </p:par>
-    </p:tnLst>
-  </p:timing>
-</p:sld>
-</file>
-
-<file path=ppt/slides/slide9.xml><?xml version="1.0" encoding="utf-8"?>
-<p:sld xmlns:a="http://schemas.openxmlformats.org/drawingml/2006/main" xmlns:r="http://schemas.openxmlformats.org/officeDocument/2006/relationships" xmlns:p="http://schemas.openxmlformats.org/presentationml/2006/main">
-  <p:cSld>
-    <p:spTree>
-      <p:nvGrpSpPr>
-        <p:cNvPr id="1" name=""/>
-        <p:cNvGrpSpPr/>
-        <p:nvPr/>
-      </p:nvGrpSpPr>
-      <p:grpSpPr>
-        <a:xfrm>
-          <a:off x="0" y="0"/>
-          <a:ext cx="0" cy="0"/>
-          <a:chOff x="0" y="0"/>
-          <a:chExt cx="0" cy="0"/>
-        </a:xfrm>
-      </p:grpSpPr>
-      <p:sp>
-        <p:nvSpPr>
-          <p:cNvPr id="2" name="Title 1"/>
-          <p:cNvSpPr>
-            <a:spLocks noGrp="1"/>
-          </p:cNvSpPr>
-          <p:nvPr>
-            <p:ph type="title"/>
-          </p:nvPr>
-        </p:nvSpPr>
-        <p:spPr>
-          <a:xfrm>
-            <a:off x="838200" y="365125"/>
-            <a:ext cx="10515600" cy="723367"/>
-          </a:xfrm>
-        </p:spPr>
-        <p:txBody>
-          <a:bodyPr/>
-          <a:lstStyle/>
-          <a:p>
-            <a:r>
-              <a:rPr lang="pl-PL" dirty="0"/>
-              <a:t>Sharing as part of the workflow</a:t>
-            </a:r>
-            <a:endParaRPr lang="en-GB" dirty="0"/>
-          </a:p>
-        </p:txBody>
-      </p:sp>
-      <p:grpSp>
-        <p:nvGrpSpPr>
-          <p:cNvPr id="4" name="Group 3"/>
-          <p:cNvGrpSpPr/>
-          <p:nvPr/>
-        </p:nvGrpSpPr>
-        <p:grpSpPr>
-          <a:xfrm>
-            <a:off x="5089775" y="1135453"/>
-            <a:ext cx="3876021" cy="3915317"/>
-            <a:chOff x="2051720" y="1700808"/>
-            <a:chExt cx="4633544" cy="4680520"/>
-          </a:xfrm>
-        </p:grpSpPr>
-        <p:grpSp>
-          <p:nvGrpSpPr>
-            <p:cNvPr id="5" name="Group 4"/>
-            <p:cNvGrpSpPr/>
-            <p:nvPr/>
-          </p:nvGrpSpPr>
-          <p:grpSpPr>
-            <a:xfrm>
-              <a:off x="2051720" y="1700808"/>
-              <a:ext cx="4633544" cy="4680520"/>
-              <a:chOff x="1979712" y="1916832"/>
-              <a:chExt cx="4633544" cy="4680520"/>
-            </a:xfrm>
-          </p:grpSpPr>
-          <p:sp>
-            <p:nvSpPr>
-              <p:cNvPr id="12" name="Oval 11"/>
-              <p:cNvSpPr/>
-              <p:nvPr/>
-            </p:nvSpPr>
-            <p:spPr>
-              <a:xfrm>
-                <a:off x="2310826" y="2348880"/>
-                <a:ext cx="3942390" cy="3942390"/>
-              </a:xfrm>
-              <a:prstGeom prst="ellipse">
-                <a:avLst/>
-              </a:prstGeom>
-              <a:noFill/>
-              <a:ln w="57150">
-                <a:solidFill>
-                  <a:schemeClr val="accent1">
-                    <a:lumMod val="40000"/>
-                    <a:lumOff val="60000"/>
-                  </a:schemeClr>
-                </a:solidFill>
-              </a:ln>
-            </p:spPr>
-            <p:style>
-              <a:lnRef idx="2">
-                <a:schemeClr val="accent1">
-                  <a:shade val="50000"/>
-                </a:schemeClr>
-              </a:lnRef>
-              <a:fillRef idx="1">
-                <a:schemeClr val="accent1"/>
-              </a:fillRef>
-              <a:effectRef idx="0">
-                <a:schemeClr val="accent1"/>
-              </a:effectRef>
-              <a:fontRef idx="minor">
-                <a:schemeClr val="lt1"/>
-              </a:fontRef>
-            </p:style>
-            <p:txBody>
-              <a:bodyPr rtlCol="0" anchor="ctr"/>
-              <a:lstStyle/>
-              <a:p>
-                <a:pPr algn="ctr"/>
-                <a:endParaRPr lang="en-GB" dirty="0"/>
-              </a:p>
-            </p:txBody>
-          </p:sp>
-          <p:grpSp>
-            <p:nvGrpSpPr>
-              <p:cNvPr id="13" name="Group 12"/>
-              <p:cNvGrpSpPr/>
-              <p:nvPr/>
-            </p:nvGrpSpPr>
-            <p:grpSpPr>
-              <a:xfrm>
-                <a:off x="3563888" y="1916832"/>
-                <a:ext cx="1224136" cy="1224136"/>
-                <a:chOff x="3923928" y="2492896"/>
-                <a:chExt cx="1224136" cy="1224136"/>
-              </a:xfrm>
-            </p:grpSpPr>
-            <p:sp>
-              <p:nvSpPr>
-                <p:cNvPr id="29" name="Oval 28"/>
-                <p:cNvSpPr/>
-                <p:nvPr/>
-              </p:nvSpPr>
-              <p:spPr>
-                <a:xfrm>
-                  <a:off x="3923928" y="2492896"/>
-                  <a:ext cx="1224136" cy="1224136"/>
-                </a:xfrm>
-                <a:prstGeom prst="ellipse">
-                  <a:avLst/>
-                </a:prstGeom>
-                <a:solidFill>
-                  <a:srgbClr val="5B9BD5"/>
-                </a:solidFill>
-              </p:spPr>
-              <p:style>
-                <a:lnRef idx="2">
-                  <a:schemeClr val="accent1">
-                    <a:shade val="50000"/>
-                  </a:schemeClr>
-                </a:lnRef>
-                <a:fillRef idx="1">
-                  <a:schemeClr val="accent1"/>
-                </a:fillRef>
-                <a:effectRef idx="0">
-                  <a:schemeClr val="accent1"/>
-                </a:effectRef>
-                <a:fontRef idx="minor">
-                  <a:schemeClr val="lt1"/>
-                </a:fontRef>
-              </p:style>
-              <p:txBody>
-                <a:bodyPr rtlCol="0" anchor="ctr"/>
-                <a:lstStyle/>
-                <a:p>
-                  <a:pPr algn="ctr"/>
-                  <a:endParaRPr lang="en-GB" sz="1000" dirty="0">
-                    <a:latin typeface="Arial" panose="020B0604020202020204" pitchFamily="34" charset="0"/>
-                    <a:cs typeface="Arial" panose="020B0604020202020204" pitchFamily="34" charset="0"/>
-                  </a:endParaRPr>
-                </a:p>
-              </p:txBody>
-            </p:sp>
-            <p:sp>
-              <p:nvSpPr>
-                <p:cNvPr id="30" name="TextBox 29"/>
-                <p:cNvSpPr txBox="1"/>
-                <p:nvPr/>
-              </p:nvSpPr>
-              <p:spPr>
-                <a:xfrm>
-                  <a:off x="3959932" y="2843354"/>
-                  <a:ext cx="1152128" cy="551892"/>
-                </a:xfrm>
-                <a:prstGeom prst="rect">
-                  <a:avLst/>
-                </a:prstGeom>
-                <a:noFill/>
-              </p:spPr>
-              <p:txBody>
-                <a:bodyPr wrap="square" rtlCol="0">
-                  <a:spAutoFit/>
-                </a:bodyPr>
-                <a:lstStyle/>
-                <a:p>
-                  <a:pPr algn="ctr"/>
-                  <a:r>
-                    <a:rPr lang="pl-PL" sz="1200" dirty="0">
-                      <a:solidFill>
-                        <a:schemeClr val="bg1"/>
-                      </a:solidFill>
-                      <a:latin typeface="Arial" panose="020B0604020202020204" pitchFamily="34" charset="0"/>
-                      <a:cs typeface="Arial" panose="020B0604020202020204" pitchFamily="34" charset="0"/>
-                    </a:rPr>
-                    <a:t>CREATING DATA</a:t>
-                  </a:r>
-                  <a:endParaRPr lang="en-GB" sz="1200" dirty="0">
-                    <a:solidFill>
-                      <a:schemeClr val="bg1"/>
-                    </a:solidFill>
-                    <a:latin typeface="Arial" panose="020B0604020202020204" pitchFamily="34" charset="0"/>
-                    <a:cs typeface="Arial" panose="020B0604020202020204" pitchFamily="34" charset="0"/>
-                  </a:endParaRPr>
-                </a:p>
-              </p:txBody>
-            </p:sp>
-          </p:grpSp>
-          <p:grpSp>
-            <p:nvGrpSpPr>
-              <p:cNvPr id="14" name="Group 13"/>
-              <p:cNvGrpSpPr/>
-              <p:nvPr/>
-            </p:nvGrpSpPr>
-            <p:grpSpPr>
-              <a:xfrm>
-                <a:off x="5148065" y="2780928"/>
-                <a:ext cx="1465191" cy="1224136"/>
-                <a:chOff x="3815917" y="2492896"/>
-                <a:chExt cx="1465191" cy="1224136"/>
-              </a:xfrm>
-            </p:grpSpPr>
-            <p:sp>
-              <p:nvSpPr>
-                <p:cNvPr id="27" name="Oval 26"/>
-                <p:cNvSpPr/>
-                <p:nvPr/>
-              </p:nvSpPr>
-              <p:spPr>
-                <a:xfrm>
-                  <a:off x="3923928" y="2492896"/>
-                  <a:ext cx="1224136" cy="1224136"/>
-                </a:xfrm>
-                <a:prstGeom prst="ellipse">
-                  <a:avLst/>
-                </a:prstGeom>
-                <a:solidFill>
-                  <a:srgbClr val="5B9BD5"/>
-                </a:solidFill>
-              </p:spPr>
-              <p:style>
-                <a:lnRef idx="2">
-                  <a:schemeClr val="accent1">
-                    <a:shade val="50000"/>
-                  </a:schemeClr>
-                </a:lnRef>
-                <a:fillRef idx="1">
-                  <a:schemeClr val="accent1"/>
-                </a:fillRef>
-                <a:effectRef idx="0">
-                  <a:schemeClr val="accent1"/>
-                </a:effectRef>
-                <a:fontRef idx="minor">
-                  <a:schemeClr val="lt1"/>
-                </a:fontRef>
-              </p:style>
-              <p:txBody>
-                <a:bodyPr rtlCol="0" anchor="ctr"/>
-                <a:lstStyle/>
-                <a:p>
-                  <a:pPr algn="ctr"/>
-                  <a:endParaRPr lang="en-GB" sz="1000" dirty="0">
-                    <a:latin typeface="Arial" panose="020B0604020202020204" pitchFamily="34" charset="0"/>
-                    <a:cs typeface="Arial" panose="020B0604020202020204" pitchFamily="34" charset="0"/>
-                  </a:endParaRPr>
-                </a:p>
-              </p:txBody>
-            </p:sp>
-            <p:sp>
-              <p:nvSpPr>
-                <p:cNvPr id="28" name="TextBox 27"/>
-                <p:cNvSpPr txBox="1"/>
-                <p:nvPr/>
-              </p:nvSpPr>
-              <p:spPr>
-                <a:xfrm>
-                  <a:off x="3815917" y="2843354"/>
-                  <a:ext cx="1465191" cy="551892"/>
-                </a:xfrm>
-                <a:prstGeom prst="rect">
-                  <a:avLst/>
-                </a:prstGeom>
-                <a:noFill/>
-              </p:spPr>
-              <p:txBody>
-                <a:bodyPr wrap="square" rtlCol="0">
-                  <a:spAutoFit/>
-                </a:bodyPr>
-                <a:lstStyle/>
-                <a:p>
-                  <a:pPr algn="ctr"/>
-                  <a:r>
-                    <a:rPr lang="pl-PL" sz="1100" dirty="0">
-                      <a:solidFill>
-                        <a:schemeClr val="bg1"/>
-                      </a:solidFill>
-                      <a:latin typeface="Arial" panose="020B0604020202020204" pitchFamily="34" charset="0"/>
-                      <a:cs typeface="Arial" panose="020B0604020202020204" pitchFamily="34" charset="0"/>
-                    </a:rPr>
-                    <a:t>PROCESSING</a:t>
-                  </a:r>
-                  <a:r>
-                    <a:rPr lang="pl-PL" sz="1200" dirty="0">
-                      <a:solidFill>
-                        <a:schemeClr val="bg1"/>
-                      </a:solidFill>
-                      <a:latin typeface="Arial" panose="020B0604020202020204" pitchFamily="34" charset="0"/>
-                      <a:cs typeface="Arial" panose="020B0604020202020204" pitchFamily="34" charset="0"/>
-                    </a:rPr>
-                    <a:t> DATA</a:t>
-                  </a:r>
-                  <a:endParaRPr lang="en-GB" sz="1200" dirty="0">
-                    <a:solidFill>
-                      <a:schemeClr val="bg1"/>
-                    </a:solidFill>
-                    <a:latin typeface="Arial" panose="020B0604020202020204" pitchFamily="34" charset="0"/>
-                    <a:cs typeface="Arial" panose="020B0604020202020204" pitchFamily="34" charset="0"/>
-                  </a:endParaRPr>
-                </a:p>
-              </p:txBody>
-            </p:sp>
-          </p:grpSp>
-          <p:grpSp>
-            <p:nvGrpSpPr>
-              <p:cNvPr id="15" name="Group 14"/>
-              <p:cNvGrpSpPr/>
-              <p:nvPr/>
-            </p:nvGrpSpPr>
-            <p:grpSpPr>
-              <a:xfrm>
-                <a:off x="5148065" y="4509120"/>
-                <a:ext cx="1400261" cy="1224136"/>
-                <a:chOff x="3851921" y="2492896"/>
-                <a:chExt cx="1400261" cy="1224136"/>
-              </a:xfrm>
-            </p:grpSpPr>
-            <p:sp>
-              <p:nvSpPr>
-                <p:cNvPr id="25" name="Oval 24"/>
-                <p:cNvSpPr/>
-                <p:nvPr/>
-              </p:nvSpPr>
-              <p:spPr>
-                <a:xfrm>
-                  <a:off x="3923928" y="2492896"/>
-                  <a:ext cx="1224136" cy="1224136"/>
-                </a:xfrm>
-                <a:prstGeom prst="ellipse">
-                  <a:avLst/>
-                </a:prstGeom>
-                <a:solidFill>
-                  <a:srgbClr val="5B9BD5"/>
-                </a:solidFill>
-              </p:spPr>
-              <p:style>
-                <a:lnRef idx="2">
-                  <a:schemeClr val="accent1">
-                    <a:shade val="50000"/>
-                  </a:schemeClr>
-                </a:lnRef>
-                <a:fillRef idx="1">
-                  <a:schemeClr val="accent1"/>
-                </a:fillRef>
-                <a:effectRef idx="0">
-                  <a:schemeClr val="accent1"/>
-                </a:effectRef>
-                <a:fontRef idx="minor">
-                  <a:schemeClr val="lt1"/>
-                </a:fontRef>
-              </p:style>
-              <p:txBody>
-                <a:bodyPr rtlCol="0" anchor="ctr"/>
-                <a:lstStyle/>
-                <a:p>
-                  <a:pPr algn="ctr"/>
-                  <a:endParaRPr lang="en-GB" sz="1000" dirty="0">
-                    <a:latin typeface="Arial" panose="020B0604020202020204" pitchFamily="34" charset="0"/>
-                    <a:cs typeface="Arial" panose="020B0604020202020204" pitchFamily="34" charset="0"/>
-                  </a:endParaRPr>
-                </a:p>
-              </p:txBody>
-            </p:sp>
-            <p:sp>
-              <p:nvSpPr>
-                <p:cNvPr id="26" name="TextBox 25"/>
-                <p:cNvSpPr txBox="1"/>
-                <p:nvPr/>
-              </p:nvSpPr>
-              <p:spPr>
-                <a:xfrm>
-                  <a:off x="3851921" y="2843354"/>
-                  <a:ext cx="1400261" cy="588685"/>
-                </a:xfrm>
-                <a:prstGeom prst="rect">
-                  <a:avLst/>
-                </a:prstGeom>
-                <a:noFill/>
-              </p:spPr>
-              <p:txBody>
-                <a:bodyPr wrap="square" rtlCol="0">
-                  <a:spAutoFit/>
-                </a:bodyPr>
-                <a:lstStyle/>
-                <a:p>
-                  <a:pPr algn="ctr"/>
-                  <a:r>
-                    <a:rPr lang="pl-PL" sz="1200" dirty="0">
-                      <a:solidFill>
-                        <a:schemeClr val="bg1"/>
-                      </a:solidFill>
-                      <a:latin typeface="Arial" panose="020B0604020202020204" pitchFamily="34" charset="0"/>
-                      <a:cs typeface="Arial" panose="020B0604020202020204" pitchFamily="34" charset="0"/>
-                    </a:rPr>
-                    <a:t>ANALYSING</a:t>
-                  </a:r>
-                  <a:r>
-                    <a:rPr lang="pl-PL" sz="1400" dirty="0">
-                      <a:solidFill>
-                        <a:schemeClr val="bg1"/>
-                      </a:solidFill>
-                      <a:latin typeface="Arial" panose="020B0604020202020204" pitchFamily="34" charset="0"/>
-                      <a:cs typeface="Arial" panose="020B0604020202020204" pitchFamily="34" charset="0"/>
-                    </a:rPr>
-                    <a:t> </a:t>
-                  </a:r>
-                  <a:r>
-                    <a:rPr lang="pl-PL" sz="1200" dirty="0">
-                      <a:solidFill>
-                        <a:schemeClr val="bg1"/>
-                      </a:solidFill>
-                      <a:latin typeface="Arial" panose="020B0604020202020204" pitchFamily="34" charset="0"/>
-                      <a:cs typeface="Arial" panose="020B0604020202020204" pitchFamily="34" charset="0"/>
-                    </a:rPr>
-                    <a:t>DATA</a:t>
-                  </a:r>
-                  <a:endParaRPr lang="en-GB" sz="1200" dirty="0">
-                    <a:solidFill>
-                      <a:schemeClr val="bg1"/>
-                    </a:solidFill>
-                    <a:latin typeface="Arial" panose="020B0604020202020204" pitchFamily="34" charset="0"/>
-                    <a:cs typeface="Arial" panose="020B0604020202020204" pitchFamily="34" charset="0"/>
-                  </a:endParaRPr>
-                </a:p>
-              </p:txBody>
-            </p:sp>
-          </p:grpSp>
-          <p:grpSp>
-            <p:nvGrpSpPr>
-              <p:cNvPr id="16" name="Group 15"/>
-              <p:cNvGrpSpPr/>
-              <p:nvPr/>
-            </p:nvGrpSpPr>
-            <p:grpSpPr>
-              <a:xfrm>
-                <a:off x="3498957" y="5373216"/>
-                <a:ext cx="1509656" cy="1224136"/>
-                <a:chOff x="3786989" y="2492896"/>
-                <a:chExt cx="1509656" cy="1224136"/>
-              </a:xfrm>
-            </p:grpSpPr>
-            <p:sp>
-              <p:nvSpPr>
-                <p:cNvPr id="23" name="Oval 22"/>
-                <p:cNvSpPr/>
-                <p:nvPr/>
-              </p:nvSpPr>
-              <p:spPr>
-                <a:xfrm>
-                  <a:off x="3923928" y="2492896"/>
-                  <a:ext cx="1224136" cy="1224136"/>
-                </a:xfrm>
-                <a:prstGeom prst="ellipse">
-                  <a:avLst/>
-                </a:prstGeom>
-              </p:spPr>
-              <p:style>
-                <a:lnRef idx="2">
-                  <a:schemeClr val="accent1">
-                    <a:shade val="50000"/>
-                  </a:schemeClr>
-                </a:lnRef>
-                <a:fillRef idx="1">
-                  <a:schemeClr val="accent1"/>
-                </a:fillRef>
-                <a:effectRef idx="0">
-                  <a:schemeClr val="accent1"/>
-                </a:effectRef>
-                <a:fontRef idx="minor">
-                  <a:schemeClr val="lt1"/>
-                </a:fontRef>
-              </p:style>
-              <p:txBody>
-                <a:bodyPr rtlCol="0" anchor="ctr"/>
-                <a:lstStyle/>
-                <a:p>
-                  <a:pPr algn="ctr"/>
-                  <a:endParaRPr lang="en-GB" sz="1000" dirty="0">
-                    <a:latin typeface="Arial" panose="020B0604020202020204" pitchFamily="34" charset="0"/>
-                    <a:cs typeface="Arial" panose="020B0604020202020204" pitchFamily="34" charset="0"/>
-                  </a:endParaRPr>
-                </a:p>
-              </p:txBody>
-            </p:sp>
-            <p:sp>
-              <p:nvSpPr>
-                <p:cNvPr id="24" name="TextBox 23"/>
-                <p:cNvSpPr txBox="1"/>
-                <p:nvPr/>
-              </p:nvSpPr>
-              <p:spPr>
-                <a:xfrm>
-                  <a:off x="3786989" y="2843354"/>
-                  <a:ext cx="1509656" cy="551892"/>
-                </a:xfrm>
-                <a:prstGeom prst="rect">
-                  <a:avLst/>
-                </a:prstGeom>
-                <a:noFill/>
-              </p:spPr>
-              <p:txBody>
-                <a:bodyPr wrap="square" rtlCol="0">
-                  <a:spAutoFit/>
-                </a:bodyPr>
-                <a:lstStyle/>
-                <a:p>
-                  <a:pPr algn="ctr"/>
-                  <a:r>
-                    <a:rPr lang="pl-PL" sz="1100" dirty="0">
-                      <a:solidFill>
-                        <a:schemeClr val="bg1"/>
-                      </a:solidFill>
-                      <a:latin typeface="Arial" panose="020B0604020202020204" pitchFamily="34" charset="0"/>
-                      <a:cs typeface="Arial" panose="020B0604020202020204" pitchFamily="34" charset="0"/>
-                    </a:rPr>
-                    <a:t>PRESERVING</a:t>
-                  </a:r>
-                  <a:r>
-                    <a:rPr lang="pl-PL" sz="1200" dirty="0">
-                      <a:solidFill>
-                        <a:schemeClr val="bg1"/>
-                      </a:solidFill>
-                      <a:latin typeface="Arial" panose="020B0604020202020204" pitchFamily="34" charset="0"/>
-                      <a:cs typeface="Arial" panose="020B0604020202020204" pitchFamily="34" charset="0"/>
-                    </a:rPr>
-                    <a:t> DATA</a:t>
-                  </a:r>
-                  <a:endParaRPr lang="en-GB" sz="1200" dirty="0">
-                    <a:solidFill>
-                      <a:schemeClr val="bg1"/>
-                    </a:solidFill>
-                    <a:latin typeface="Arial" panose="020B0604020202020204" pitchFamily="34" charset="0"/>
-                    <a:cs typeface="Arial" panose="020B0604020202020204" pitchFamily="34" charset="0"/>
-                  </a:endParaRPr>
-                </a:p>
-              </p:txBody>
-            </p:sp>
-          </p:grpSp>
-          <p:grpSp>
-            <p:nvGrpSpPr>
-              <p:cNvPr id="17" name="Group 16"/>
-              <p:cNvGrpSpPr/>
-              <p:nvPr/>
-            </p:nvGrpSpPr>
-            <p:grpSpPr>
-              <a:xfrm>
-                <a:off x="1979712" y="4509120"/>
-                <a:ext cx="1224136" cy="1224136"/>
-                <a:chOff x="3923928" y="2564904"/>
-                <a:chExt cx="1224136" cy="1224136"/>
-              </a:xfrm>
-            </p:grpSpPr>
-            <p:sp>
-              <p:nvSpPr>
-                <p:cNvPr id="21" name="Oval 20"/>
-                <p:cNvSpPr/>
-                <p:nvPr/>
-              </p:nvSpPr>
-              <p:spPr>
-                <a:xfrm>
-                  <a:off x="3923928" y="2564904"/>
-                  <a:ext cx="1224136" cy="1224136"/>
-                </a:xfrm>
-                <a:prstGeom prst="ellipse">
-                  <a:avLst/>
-                </a:prstGeom>
-                <a:solidFill>
-                  <a:srgbClr val="FF0000"/>
-                </a:solidFill>
-              </p:spPr>
-              <p:style>
-                <a:lnRef idx="2">
-                  <a:schemeClr val="accent1">
-                    <a:shade val="50000"/>
-                  </a:schemeClr>
-                </a:lnRef>
-                <a:fillRef idx="1">
-                  <a:schemeClr val="accent1"/>
-                </a:fillRef>
-                <a:effectRef idx="0">
-                  <a:schemeClr val="accent1"/>
-                </a:effectRef>
-                <a:fontRef idx="minor">
-                  <a:schemeClr val="lt1"/>
-                </a:fontRef>
-              </p:style>
-              <p:txBody>
-                <a:bodyPr rtlCol="0" anchor="ctr"/>
-                <a:lstStyle/>
-                <a:p>
-                  <a:pPr algn="ctr"/>
-                  <a:endParaRPr lang="en-GB" sz="1000" dirty="0">
-                    <a:latin typeface="Arial" panose="020B0604020202020204" pitchFamily="34" charset="0"/>
-                    <a:cs typeface="Arial" panose="020B0604020202020204" pitchFamily="34" charset="0"/>
-                  </a:endParaRPr>
-                </a:p>
-              </p:txBody>
-            </p:sp>
-            <p:sp>
-              <p:nvSpPr>
-                <p:cNvPr id="22" name="TextBox 21"/>
-                <p:cNvSpPr txBox="1"/>
-                <p:nvPr/>
-              </p:nvSpPr>
-              <p:spPr>
-                <a:xfrm>
-                  <a:off x="3959932" y="2941834"/>
-                  <a:ext cx="1152128" cy="551892"/>
-                </a:xfrm>
-                <a:prstGeom prst="rect">
-                  <a:avLst/>
-                </a:prstGeom>
-                <a:noFill/>
-              </p:spPr>
-              <p:txBody>
-                <a:bodyPr wrap="square" rtlCol="0">
-                  <a:spAutoFit/>
-                </a:bodyPr>
-                <a:lstStyle/>
-                <a:p>
-                  <a:pPr algn="ctr"/>
-                  <a:r>
-                    <a:rPr lang="pl-PL" sz="1200" dirty="0">
-                      <a:solidFill>
-                        <a:schemeClr val="bg1"/>
-                      </a:solidFill>
-                      <a:latin typeface="Arial" panose="020B0604020202020204" pitchFamily="34" charset="0"/>
-                      <a:cs typeface="Arial" panose="020B0604020202020204" pitchFamily="34" charset="0"/>
-                    </a:rPr>
-                    <a:t>SHARING</a:t>
-                  </a:r>
-                </a:p>
-                <a:p>
-                  <a:pPr algn="ctr"/>
-                  <a:r>
-                    <a:rPr lang="pl-PL" sz="1200" dirty="0">
-                      <a:solidFill>
-                        <a:schemeClr val="bg1"/>
-                      </a:solidFill>
-                      <a:latin typeface="Arial" panose="020B0604020202020204" pitchFamily="34" charset="0"/>
-                      <a:cs typeface="Arial" panose="020B0604020202020204" pitchFamily="34" charset="0"/>
-                    </a:rPr>
-                    <a:t>DATA</a:t>
-                  </a:r>
-                  <a:endParaRPr lang="en-GB" sz="1200" dirty="0">
-                    <a:solidFill>
-                      <a:schemeClr val="bg1"/>
-                    </a:solidFill>
-                    <a:latin typeface="Arial" panose="020B0604020202020204" pitchFamily="34" charset="0"/>
-                    <a:cs typeface="Arial" panose="020B0604020202020204" pitchFamily="34" charset="0"/>
-                  </a:endParaRPr>
-                </a:p>
-              </p:txBody>
-            </p:sp>
-          </p:grpSp>
-          <p:grpSp>
-            <p:nvGrpSpPr>
-              <p:cNvPr id="18" name="Group 17"/>
-              <p:cNvGrpSpPr/>
-              <p:nvPr/>
-            </p:nvGrpSpPr>
-            <p:grpSpPr>
-              <a:xfrm>
-                <a:off x="1979712" y="2708920"/>
-                <a:ext cx="1224136" cy="1224136"/>
-                <a:chOff x="3923928" y="2420888"/>
-                <a:chExt cx="1224136" cy="1224136"/>
-              </a:xfrm>
-            </p:grpSpPr>
-            <p:sp>
-              <p:nvSpPr>
-                <p:cNvPr id="19" name="Oval 18"/>
-                <p:cNvSpPr/>
-                <p:nvPr/>
-              </p:nvSpPr>
-              <p:spPr>
-                <a:xfrm>
-                  <a:off x="3923928" y="2420888"/>
-                  <a:ext cx="1224136" cy="1224136"/>
-                </a:xfrm>
-                <a:prstGeom prst="ellipse">
-                  <a:avLst/>
-                </a:prstGeom>
-              </p:spPr>
-              <p:style>
-                <a:lnRef idx="2">
-                  <a:schemeClr val="accent1">
-                    <a:shade val="50000"/>
-                  </a:schemeClr>
-                </a:lnRef>
-                <a:fillRef idx="1">
-                  <a:schemeClr val="accent1"/>
-                </a:fillRef>
-                <a:effectRef idx="0">
-                  <a:schemeClr val="accent1"/>
-                </a:effectRef>
-                <a:fontRef idx="minor">
-                  <a:schemeClr val="lt1"/>
-                </a:fontRef>
-              </p:style>
-              <p:txBody>
-                <a:bodyPr rtlCol="0" anchor="ctr"/>
-                <a:lstStyle/>
-                <a:p>
-                  <a:pPr algn="ctr"/>
-                  <a:endParaRPr lang="en-GB" sz="1000" dirty="0">
-                    <a:latin typeface="Arial" panose="020B0604020202020204" pitchFamily="34" charset="0"/>
-                    <a:cs typeface="Arial" panose="020B0604020202020204" pitchFamily="34" charset="0"/>
-                  </a:endParaRPr>
-                </a:p>
-              </p:txBody>
-            </p:sp>
-            <p:sp>
-              <p:nvSpPr>
-                <p:cNvPr id="20" name="TextBox 19"/>
-                <p:cNvSpPr txBox="1"/>
-                <p:nvPr/>
-              </p:nvSpPr>
-              <p:spPr>
-                <a:xfrm>
-                  <a:off x="3959932" y="2813809"/>
-                  <a:ext cx="1152128" cy="551892"/>
-                </a:xfrm>
-                <a:prstGeom prst="rect">
-                  <a:avLst/>
-                </a:prstGeom>
-                <a:noFill/>
-              </p:spPr>
-              <p:txBody>
-                <a:bodyPr wrap="square" rtlCol="0">
-                  <a:spAutoFit/>
-                </a:bodyPr>
-                <a:lstStyle/>
-                <a:p>
-                  <a:pPr algn="ctr"/>
-                  <a:r>
-                    <a:rPr lang="pl-PL" sz="1200" dirty="0">
-                      <a:solidFill>
-                        <a:schemeClr val="bg1"/>
-                      </a:solidFill>
-                      <a:latin typeface="Arial" panose="020B0604020202020204" pitchFamily="34" charset="0"/>
-                      <a:cs typeface="Arial" panose="020B0604020202020204" pitchFamily="34" charset="0"/>
-                    </a:rPr>
-                    <a:t>RE-USING DATA</a:t>
-                  </a:r>
-                  <a:endParaRPr lang="en-GB" sz="1200" dirty="0">
-                    <a:solidFill>
-                      <a:schemeClr val="bg1"/>
-                    </a:solidFill>
-                    <a:latin typeface="Arial" panose="020B0604020202020204" pitchFamily="34" charset="0"/>
-                    <a:cs typeface="Arial" panose="020B0604020202020204" pitchFamily="34" charset="0"/>
-                  </a:endParaRPr>
-                </a:p>
-              </p:txBody>
-            </p:sp>
-          </p:grpSp>
-        </p:grpSp>
-        <p:sp>
-          <p:nvSpPr>
-            <p:cNvPr id="6" name="Right Arrow 5"/>
-            <p:cNvSpPr/>
-            <p:nvPr/>
-          </p:nvSpPr>
-          <p:spPr>
-            <a:xfrm rot="1619807" flipV="1">
-              <a:off x="5174188" y="2303398"/>
-              <a:ext cx="253828" cy="151064"/>
-            </a:xfrm>
-            <a:prstGeom prst="rightArrow">
-              <a:avLst>
-                <a:gd name="adj1" fmla="val 27886"/>
-                <a:gd name="adj2" fmla="val 50000"/>
-              </a:avLst>
-            </a:prstGeom>
-            <a:solidFill>
-              <a:srgbClr val="91C6F7"/>
-            </a:solidFill>
-            <a:ln>
-              <a:solidFill>
-                <a:srgbClr val="91C6F7"/>
-              </a:solidFill>
-            </a:ln>
-          </p:spPr>
-          <p:style>
-            <a:lnRef idx="2">
-              <a:schemeClr val="accent1">
-                <a:shade val="50000"/>
-              </a:schemeClr>
-            </a:lnRef>
-            <a:fillRef idx="1">
-              <a:schemeClr val="accent1"/>
-            </a:fillRef>
-            <a:effectRef idx="0">
-              <a:schemeClr val="accent1"/>
-            </a:effectRef>
-            <a:fontRef idx="minor">
-              <a:schemeClr val="lt1"/>
-            </a:fontRef>
-          </p:style>
-          <p:txBody>
-            <a:bodyPr rtlCol="0" anchor="ctr"/>
-            <a:lstStyle/>
-            <a:p>
-              <a:pPr algn="ctr"/>
-              <a:endParaRPr lang="en-GB" dirty="0"/>
-            </a:p>
-          </p:txBody>
-        </p:sp>
-        <p:sp>
-          <p:nvSpPr>
-            <p:cNvPr id="7" name="Right Arrow 6"/>
-            <p:cNvSpPr/>
-            <p:nvPr/>
-          </p:nvSpPr>
-          <p:spPr>
-            <a:xfrm rot="5212365" flipV="1">
-              <a:off x="6197255" y="3995999"/>
-              <a:ext cx="253828" cy="151064"/>
-            </a:xfrm>
-            <a:prstGeom prst="rightArrow">
-              <a:avLst>
-                <a:gd name="adj1" fmla="val 27886"/>
-                <a:gd name="adj2" fmla="val 50000"/>
-              </a:avLst>
-            </a:prstGeom>
-            <a:solidFill>
-              <a:srgbClr val="91C6F7"/>
-            </a:solidFill>
-            <a:ln>
-              <a:solidFill>
-                <a:srgbClr val="91C6F7"/>
-              </a:solidFill>
-            </a:ln>
-          </p:spPr>
-          <p:style>
-            <a:lnRef idx="2">
-              <a:schemeClr val="accent1">
-                <a:shade val="50000"/>
-              </a:schemeClr>
-            </a:lnRef>
-            <a:fillRef idx="1">
-              <a:schemeClr val="accent1"/>
-            </a:fillRef>
-            <a:effectRef idx="0">
-              <a:schemeClr val="accent1"/>
-            </a:effectRef>
-            <a:fontRef idx="minor">
-              <a:schemeClr val="lt1"/>
-            </a:fontRef>
-          </p:style>
-          <p:txBody>
-            <a:bodyPr rtlCol="0" anchor="ctr"/>
-            <a:lstStyle/>
-            <a:p>
-              <a:pPr algn="ctr"/>
-              <a:endParaRPr lang="en-GB" dirty="0"/>
-            </a:p>
-          </p:txBody>
-        </p:sp>
-        <p:sp>
-          <p:nvSpPr>
-            <p:cNvPr id="8" name="Right Arrow 7"/>
-            <p:cNvSpPr/>
-            <p:nvPr/>
-          </p:nvSpPr>
-          <p:spPr>
-            <a:xfrm rot="8847248" flipV="1">
-              <a:off x="5300817" y="5674556"/>
-              <a:ext cx="253828" cy="151064"/>
-            </a:xfrm>
-            <a:prstGeom prst="rightArrow">
-              <a:avLst>
-                <a:gd name="adj1" fmla="val 27886"/>
-                <a:gd name="adj2" fmla="val 50000"/>
-              </a:avLst>
-            </a:prstGeom>
-            <a:solidFill>
-              <a:srgbClr val="91C6F7"/>
-            </a:solidFill>
-            <a:ln>
-              <a:solidFill>
-                <a:srgbClr val="91C6F7"/>
-              </a:solidFill>
-            </a:ln>
-          </p:spPr>
-          <p:style>
-            <a:lnRef idx="2">
-              <a:schemeClr val="accent1">
-                <a:shade val="50000"/>
-              </a:schemeClr>
-            </a:lnRef>
-            <a:fillRef idx="1">
-              <a:schemeClr val="accent1"/>
-            </a:fillRef>
-            <a:effectRef idx="0">
-              <a:schemeClr val="accent1"/>
-            </a:effectRef>
-            <a:fontRef idx="minor">
-              <a:schemeClr val="lt1"/>
-            </a:fontRef>
-          </p:style>
-          <p:txBody>
-            <a:bodyPr rtlCol="0" anchor="ctr"/>
-            <a:lstStyle/>
-            <a:p>
-              <a:pPr algn="ctr"/>
-              <a:endParaRPr lang="en-GB" dirty="0"/>
-            </a:p>
-          </p:txBody>
-        </p:sp>
-        <p:sp>
-          <p:nvSpPr>
-            <p:cNvPr id="9" name="Right Arrow 8"/>
-            <p:cNvSpPr/>
-            <p:nvPr/>
-          </p:nvSpPr>
-          <p:spPr>
-            <a:xfrm rot="12776736" flipV="1">
-              <a:off x="3097300" y="5646115"/>
-              <a:ext cx="253828" cy="151064"/>
-            </a:xfrm>
-            <a:prstGeom prst="rightArrow">
-              <a:avLst>
-                <a:gd name="adj1" fmla="val 27886"/>
-                <a:gd name="adj2" fmla="val 50000"/>
-              </a:avLst>
-            </a:prstGeom>
-            <a:solidFill>
-              <a:srgbClr val="91C6F7"/>
-            </a:solidFill>
-            <a:ln>
-              <a:solidFill>
-                <a:srgbClr val="91C6F7"/>
-              </a:solidFill>
-            </a:ln>
-          </p:spPr>
-          <p:style>
-            <a:lnRef idx="2">
-              <a:schemeClr val="accent1">
-                <a:shade val="50000"/>
-              </a:schemeClr>
-            </a:lnRef>
-            <a:fillRef idx="1">
-              <a:schemeClr val="accent1"/>
-            </a:fillRef>
-            <a:effectRef idx="0">
-              <a:schemeClr val="accent1"/>
-            </a:effectRef>
-            <a:fontRef idx="minor">
-              <a:schemeClr val="lt1"/>
-            </a:fontRef>
-          </p:style>
-          <p:txBody>
-            <a:bodyPr rtlCol="0" anchor="ctr"/>
-            <a:lstStyle/>
-            <a:p>
-              <a:pPr algn="ctr"/>
-              <a:endParaRPr lang="en-GB" dirty="0"/>
-            </a:p>
-          </p:txBody>
-        </p:sp>
-        <p:sp>
-          <p:nvSpPr>
-            <p:cNvPr id="10" name="Right Arrow 9"/>
-            <p:cNvSpPr/>
-            <p:nvPr/>
-          </p:nvSpPr>
-          <p:spPr>
-            <a:xfrm rot="16200000" flipV="1">
-              <a:off x="2254352" y="3914627"/>
-              <a:ext cx="253828" cy="151064"/>
-            </a:xfrm>
-            <a:prstGeom prst="rightArrow">
-              <a:avLst>
-                <a:gd name="adj1" fmla="val 27886"/>
-                <a:gd name="adj2" fmla="val 50000"/>
-              </a:avLst>
-            </a:prstGeom>
-            <a:solidFill>
-              <a:srgbClr val="91C6F7"/>
-            </a:solidFill>
-            <a:ln>
-              <a:solidFill>
-                <a:srgbClr val="91C6F7"/>
-              </a:solidFill>
-            </a:ln>
-          </p:spPr>
-          <p:style>
-            <a:lnRef idx="2">
-              <a:schemeClr val="accent1">
-                <a:shade val="50000"/>
-              </a:schemeClr>
-            </a:lnRef>
-            <a:fillRef idx="1">
-              <a:schemeClr val="accent1"/>
-            </a:fillRef>
-            <a:effectRef idx="0">
-              <a:schemeClr val="accent1"/>
-            </a:effectRef>
-            <a:fontRef idx="minor">
-              <a:schemeClr val="lt1"/>
-            </a:fontRef>
-          </p:style>
-          <p:txBody>
-            <a:bodyPr rtlCol="0" anchor="ctr"/>
-            <a:lstStyle/>
-            <a:p>
-              <a:pPr algn="ctr"/>
-              <a:endParaRPr lang="en-GB" dirty="0"/>
-            </a:p>
-          </p:txBody>
-        </p:sp>
-        <p:sp>
-          <p:nvSpPr>
-            <p:cNvPr id="11" name="Right Arrow 10"/>
-            <p:cNvSpPr/>
-            <p:nvPr/>
-          </p:nvSpPr>
-          <p:spPr>
-            <a:xfrm rot="19590936" flipV="1">
-              <a:off x="3218543" y="2332540"/>
-              <a:ext cx="253828" cy="151064"/>
-            </a:xfrm>
-            <a:prstGeom prst="rightArrow">
-              <a:avLst>
-                <a:gd name="adj1" fmla="val 27886"/>
-                <a:gd name="adj2" fmla="val 50000"/>
-              </a:avLst>
-            </a:prstGeom>
-            <a:solidFill>
-              <a:srgbClr val="91C6F7"/>
-            </a:solidFill>
-            <a:ln>
-              <a:solidFill>
-                <a:srgbClr val="91C6F7"/>
-              </a:solidFill>
-            </a:ln>
-          </p:spPr>
-          <p:style>
-            <a:lnRef idx="2">
-              <a:schemeClr val="accent1">
-                <a:shade val="50000"/>
-              </a:schemeClr>
-            </a:lnRef>
-            <a:fillRef idx="1">
-              <a:schemeClr val="accent1"/>
-            </a:fillRef>
-            <a:effectRef idx="0">
-              <a:schemeClr val="accent1"/>
-            </a:effectRef>
-            <a:fontRef idx="minor">
-              <a:schemeClr val="lt1"/>
-            </a:fontRef>
-          </p:style>
-          <p:txBody>
-            <a:bodyPr rtlCol="0" anchor="ctr"/>
-            <a:lstStyle/>
-            <a:p>
-              <a:pPr algn="ctr"/>
-              <a:endParaRPr lang="en-GB" dirty="0"/>
-            </a:p>
-          </p:txBody>
-        </p:sp>
-      </p:grpSp>
-      <p:cxnSp>
-        <p:nvCxnSpPr>
-          <p:cNvPr id="31" name="Straight Arrow Connector 30"/>
-          <p:cNvCxnSpPr/>
-          <p:nvPr/>
-        </p:nvCxnSpPr>
-        <p:spPr>
-          <a:xfrm flipV="1">
-            <a:off x="3035359" y="1083188"/>
-            <a:ext cx="0" cy="5032437"/>
-          </a:xfrm>
-          <a:prstGeom prst="straightConnector1">
-            <a:avLst/>
-          </a:prstGeom>
-          <a:ln w="38100">
-            <a:solidFill>
-              <a:schemeClr val="tx1"/>
-            </a:solidFill>
-            <a:tailEnd type="triangle"/>
-          </a:ln>
-        </p:spPr>
-        <p:style>
-          <a:lnRef idx="1">
-            <a:schemeClr val="accent1"/>
-          </a:lnRef>
-          <a:fillRef idx="0">
-            <a:schemeClr val="accent1"/>
-          </a:fillRef>
-          <a:effectRef idx="0">
-            <a:schemeClr val="accent1"/>
-          </a:effectRef>
-          <a:fontRef idx="minor">
-            <a:schemeClr val="tx1"/>
-          </a:fontRef>
-        </p:style>
-      </p:cxnSp>
-      <p:sp>
-        <p:nvSpPr>
-          <p:cNvPr id="32" name="TextBox 31"/>
-          <p:cNvSpPr txBox="1"/>
-          <p:nvPr/>
-        </p:nvSpPr>
-        <p:spPr>
-          <a:xfrm rot="16200000">
-            <a:off x="2017903" y="3319325"/>
-            <a:ext cx="1471813" cy="338554"/>
-          </a:xfrm>
-          <a:prstGeom prst="rect">
-            <a:avLst/>
-          </a:prstGeom>
-          <a:noFill/>
-        </p:spPr>
-        <p:txBody>
-          <a:bodyPr wrap="none" rtlCol="0">
-            <a:spAutoFit/>
-          </a:bodyPr>
-          <a:lstStyle/>
-          <a:p>
-            <a:r>
-              <a:rPr lang="pl-PL" sz="1600" dirty="0"/>
-              <a:t>Time and effort</a:t>
-            </a:r>
-            <a:endParaRPr lang="en-GB" sz="1600" dirty="0"/>
-          </a:p>
-        </p:txBody>
-      </p:sp>
-      <p:sp>
-        <p:nvSpPr>
-          <p:cNvPr id="33" name="Rectangle 32"/>
-          <p:cNvSpPr/>
-          <p:nvPr/>
-        </p:nvSpPr>
-        <p:spPr>
-          <a:xfrm>
-            <a:off x="3211997" y="1510141"/>
-            <a:ext cx="648072" cy="4608512"/>
-          </a:xfrm>
-          <a:prstGeom prst="rect">
-            <a:avLst/>
-          </a:prstGeom>
-          <a:solidFill>
-            <a:srgbClr val="FF0000"/>
-          </a:solidFill>
-          <a:ln>
-            <a:solidFill>
-              <a:srgbClr val="C00000"/>
-            </a:solidFill>
-          </a:ln>
-        </p:spPr>
-        <p:style>
-          <a:lnRef idx="2">
-            <a:schemeClr val="accent1">
-              <a:shade val="50000"/>
-            </a:schemeClr>
-          </a:lnRef>
-          <a:fillRef idx="1">
-            <a:schemeClr val="accent1"/>
-          </a:fillRef>
-          <a:effectRef idx="0">
-            <a:schemeClr val="accent1"/>
-          </a:effectRef>
-          <a:fontRef idx="minor">
-            <a:schemeClr val="lt1"/>
-          </a:fontRef>
-        </p:style>
-        <p:txBody>
-          <a:bodyPr rtlCol="0" anchor="ctr"/>
-          <a:lstStyle/>
-          <a:p>
-            <a:pPr algn="ctr"/>
-            <a:endParaRPr lang="en-GB"/>
-          </a:p>
-        </p:txBody>
-      </p:sp>
-      <p:grpSp>
-        <p:nvGrpSpPr>
-          <p:cNvPr id="34" name="Group 33"/>
-          <p:cNvGrpSpPr/>
-          <p:nvPr/>
-        </p:nvGrpSpPr>
-        <p:grpSpPr>
-          <a:xfrm>
-            <a:off x="3541430" y="1135455"/>
-            <a:ext cx="1425574" cy="1079202"/>
-            <a:chOff x="1589065" y="1341402"/>
-            <a:chExt cx="1425574" cy="1079202"/>
-          </a:xfrm>
-        </p:grpSpPr>
-        <p:sp>
-          <p:nvSpPr>
-            <p:cNvPr id="35" name="AutoShape 17"/>
-            <p:cNvSpPr>
-              <a:spLocks noChangeArrowheads="1"/>
-            </p:cNvSpPr>
-            <p:nvPr/>
-          </p:nvSpPr>
-          <p:spPr bwMode="auto">
-            <a:xfrm rot="16200000">
-              <a:off x="2076427" y="1396964"/>
-              <a:ext cx="800100" cy="1076325"/>
-            </a:xfrm>
-            <a:prstGeom prst="foldedCorner">
-              <a:avLst>
-                <a:gd name="adj" fmla="val 12500"/>
-              </a:avLst>
-            </a:prstGeom>
-            <a:gradFill rotWithShape="1">
-              <a:gsLst>
-                <a:gs pos="0">
-                  <a:srgbClr val="FFFF99">
-                    <a:gamma/>
-                    <a:shade val="85490"/>
-                    <a:invGamma/>
-                  </a:srgbClr>
-                </a:gs>
-                <a:gs pos="100000">
-                  <a:srgbClr val="FFFF99"/>
-                </a:gs>
-              </a:gsLst>
-              <a:lin ang="0" scaled="1"/>
-            </a:gradFill>
-            <a:ln w="9525">
-              <a:solidFill>
-                <a:schemeClr val="tx1"/>
-              </a:solidFill>
-              <a:round/>
-              <a:headEnd/>
-              <a:tailEnd/>
-            </a:ln>
-            <a:effectLst/>
-            <a:extLst>
-              <a:ext uri="{AF507438-7753-43e0-B8FC-AC1667EBCBE1}">
-                <a14:hiddenEffects xmlns:a14="http://schemas.microsoft.com/office/drawing/2010/main" xmlns="">
-                  <a:effectLst>
-                    <a:outerShdw dist="35921" dir="2700000" algn="ctr" rotWithShape="0">
-                      <a:schemeClr val="bg2"/>
-                    </a:outerShdw>
-                  </a:effectLst>
-                </a14:hiddenEffects>
-              </a:ext>
-            </a:extLst>
-          </p:spPr>
-          <p:txBody>
-            <a:bodyPr wrap="none" anchor="ctr"/>
-            <a:lstStyle/>
-            <a:p>
-              <a:endParaRPr lang="en-GB" dirty="0"/>
-            </a:p>
-          </p:txBody>
-        </p:sp>
-        <p:sp>
-          <p:nvSpPr>
-            <p:cNvPr id="36" name="AutoShape 18"/>
-            <p:cNvSpPr>
-              <a:spLocks noChangeArrowheads="1"/>
-            </p:cNvSpPr>
-            <p:nvPr/>
-          </p:nvSpPr>
-          <p:spPr bwMode="auto">
-            <a:xfrm rot="16200000">
-              <a:off x="1901802" y="1203289"/>
-              <a:ext cx="800100" cy="1076325"/>
-            </a:xfrm>
-            <a:prstGeom prst="foldedCorner">
-              <a:avLst>
-                <a:gd name="adj" fmla="val 12500"/>
-              </a:avLst>
-            </a:prstGeom>
-            <a:gradFill rotWithShape="1">
-              <a:gsLst>
-                <a:gs pos="0">
-                  <a:srgbClr val="FFFF99">
-                    <a:gamma/>
-                    <a:shade val="85490"/>
-                    <a:invGamma/>
-                  </a:srgbClr>
-                </a:gs>
-                <a:gs pos="100000">
-                  <a:srgbClr val="FFFF99"/>
-                </a:gs>
-              </a:gsLst>
-              <a:lin ang="0" scaled="1"/>
-            </a:gradFill>
-            <a:ln w="9525">
-              <a:solidFill>
-                <a:schemeClr val="tx1"/>
-              </a:solidFill>
-              <a:round/>
-              <a:headEnd/>
-              <a:tailEnd/>
-            </a:ln>
-            <a:effectLst/>
-            <a:extLst>
-              <a:ext uri="{AF507438-7753-43e0-B8FC-AC1667EBCBE1}">
-                <a14:hiddenEffects xmlns:a14="http://schemas.microsoft.com/office/drawing/2010/main" xmlns="">
-                  <a:effectLst>
-                    <a:outerShdw dist="35921" dir="2700000" algn="ctr" rotWithShape="0">
-                      <a:schemeClr val="bg2"/>
-                    </a:outerShdw>
-                  </a:effectLst>
-                </a14:hiddenEffects>
-              </a:ext>
-            </a:extLst>
-          </p:spPr>
-          <p:txBody>
-            <a:bodyPr wrap="none" anchor="ctr"/>
-            <a:lstStyle/>
-            <a:p>
-              <a:endParaRPr lang="en-GB" dirty="0"/>
-            </a:p>
-          </p:txBody>
-        </p:sp>
-        <p:sp>
-          <p:nvSpPr>
-            <p:cNvPr id="37" name="AutoShape 17"/>
-            <p:cNvSpPr>
-              <a:spLocks noChangeArrowheads="1"/>
-            </p:cNvSpPr>
-            <p:nvPr/>
-          </p:nvSpPr>
-          <p:spPr bwMode="auto">
-            <a:xfrm rot="16200000">
-              <a:off x="1727178" y="1482391"/>
-              <a:ext cx="800100" cy="1076325"/>
-            </a:xfrm>
-            <a:prstGeom prst="foldedCorner">
-              <a:avLst>
-                <a:gd name="adj" fmla="val 12500"/>
-              </a:avLst>
-            </a:prstGeom>
-            <a:gradFill rotWithShape="1">
-              <a:gsLst>
-                <a:gs pos="0">
-                  <a:srgbClr val="FFFF99">
-                    <a:gamma/>
-                    <a:shade val="85490"/>
-                    <a:invGamma/>
-                  </a:srgbClr>
-                </a:gs>
-                <a:gs pos="100000">
-                  <a:srgbClr val="FFFF99"/>
-                </a:gs>
-              </a:gsLst>
-              <a:lin ang="0" scaled="1"/>
-            </a:gradFill>
-            <a:ln w="9525">
-              <a:solidFill>
-                <a:schemeClr val="tx1"/>
-              </a:solidFill>
-              <a:round/>
-              <a:headEnd/>
-              <a:tailEnd/>
-            </a:ln>
-            <a:effectLst/>
-            <a:extLst>
-              <a:ext uri="{AF507438-7753-43e0-B8FC-AC1667EBCBE1}">
-                <a14:hiddenEffects xmlns:a14="http://schemas.microsoft.com/office/drawing/2010/main" xmlns="">
-                  <a:effectLst>
-                    <a:outerShdw dist="35921" dir="2700000" algn="ctr" rotWithShape="0">
-                      <a:schemeClr val="bg2"/>
-                    </a:outerShdw>
-                  </a:effectLst>
-                </a14:hiddenEffects>
-              </a:ext>
-            </a:extLst>
-          </p:spPr>
-          <p:txBody>
-            <a:bodyPr wrap="none" anchor="ctr"/>
-            <a:lstStyle/>
-            <a:p>
-              <a:endParaRPr lang="en-GB" dirty="0"/>
-            </a:p>
-          </p:txBody>
-        </p:sp>
-      </p:grpSp>
-      <p:sp>
-        <p:nvSpPr>
-          <p:cNvPr id="38" name="Rectangle 37"/>
-          <p:cNvSpPr/>
-          <p:nvPr/>
-        </p:nvSpPr>
-        <p:spPr>
-          <a:xfrm>
-            <a:off x="4653622" y="6412881"/>
-            <a:ext cx="404414" cy="197924"/>
-          </a:xfrm>
-          <a:prstGeom prst="rect">
-            <a:avLst/>
-          </a:prstGeom>
-          <a:solidFill>
-            <a:srgbClr val="FF0000"/>
-          </a:solidFill>
-          <a:ln>
-            <a:solidFill>
-              <a:srgbClr val="C00000"/>
-            </a:solidFill>
-          </a:ln>
-        </p:spPr>
-        <p:style>
-          <a:lnRef idx="2">
-            <a:schemeClr val="accent1">
-              <a:shade val="50000"/>
-            </a:schemeClr>
-          </a:lnRef>
-          <a:fillRef idx="1">
-            <a:schemeClr val="accent1"/>
-          </a:fillRef>
-          <a:effectRef idx="0">
-            <a:schemeClr val="accent1"/>
-          </a:effectRef>
-          <a:fontRef idx="minor">
-            <a:schemeClr val="lt1"/>
-          </a:fontRef>
-        </p:style>
-        <p:txBody>
-          <a:bodyPr rtlCol="0" anchor="ctr"/>
-          <a:lstStyle/>
-          <a:p>
-            <a:pPr algn="ctr"/>
-            <a:endParaRPr lang="en-GB"/>
-          </a:p>
-        </p:txBody>
-      </p:sp>
-      <p:sp>
-        <p:nvSpPr>
-          <p:cNvPr id="39" name="TextBox 38"/>
-          <p:cNvSpPr txBox="1"/>
-          <p:nvPr/>
-        </p:nvSpPr>
-        <p:spPr>
-          <a:xfrm>
-            <a:off x="5063896" y="6382597"/>
-            <a:ext cx="3445880" cy="276999"/>
-          </a:xfrm>
-          <a:prstGeom prst="rect">
-            <a:avLst/>
-          </a:prstGeom>
-          <a:noFill/>
-        </p:spPr>
-        <p:txBody>
-          <a:bodyPr wrap="none" rtlCol="0">
-            <a:spAutoFit/>
-          </a:bodyPr>
-          <a:lstStyle/>
-          <a:p>
-            <a:r>
-              <a:rPr lang="pl-PL" sz="1200" dirty="0"/>
-              <a:t>work necessary to make outputs suitable for sharing</a:t>
-            </a:r>
-            <a:endParaRPr lang="en-GB" sz="1200" dirty="0"/>
-          </a:p>
-        </p:txBody>
-      </p:sp>
-    </p:spTree>
-    <p:extLst>
-      <p:ext uri="{BB962C8B-B14F-4D97-AF65-F5344CB8AC3E}">
-        <p14:creationId xmlns:p14="http://schemas.microsoft.com/office/powerpoint/2010/main" val="3440693774"/>
       </p:ext>
     </p:extLst>
   </p:cSld>

</xml_diff>